<commit_message>
Section 1: Commiting welcome page data
</commit_message>
<xml_diff>
--- a/PPT/Mastering Multithreading in DotNet.pptx
+++ b/PPT/Mastering Multithreading in DotNet.pptx
@@ -7,6 +7,13 @@
   <p:sldIdLst>
     <p:sldId id="266" r:id="rId5"/>
     <p:sldId id="308" r:id="rId6"/>
+    <p:sldId id="310" r:id="rId7"/>
+    <p:sldId id="311" r:id="rId8"/>
+    <p:sldId id="309" r:id="rId9"/>
+    <p:sldId id="313" r:id="rId10"/>
+    <p:sldId id="314" r:id="rId11"/>
+    <p:sldId id="312" r:id="rId12"/>
+    <p:sldId id="315" r:id="rId13"/>
   </p:sldIdLst>
   <p:sldSz cx="12192000" cy="6858000"/>
   <p:notesSz cx="6858000" cy="9144000"/>
@@ -6446,8 +6453,18 @@
             <a:pPr algn="ctr"/>
             <a:r>
               <a:rPr lang="en-US" sz="4000" dirty="0"/>
-              <a:t>Mastering Multithreading in .NET</a:t>
+              <a:t>Mastering Multithreading in .NET: </a:t>
             </a:r>
+            <a:r>
+              <a:rPr lang="en-US" sz="1800" b="1" dirty="0">
+                <a:effectLst/>
+                <a:latin typeface="Calibri" panose="020F0502020204030204" pitchFamily="34" charset="0"/>
+                <a:ea typeface="Calibri" panose="020F0502020204030204" pitchFamily="34" charset="0"/>
+                <a:cs typeface="Times New Roman" panose="02020603050405020304" pitchFamily="18" charset="0"/>
+              </a:rPr>
+              <a:t>From Basics to Concurrency Architect</a:t>
+            </a:r>
+            <a:endParaRPr lang="en-US" sz="4000" dirty="0"/>
           </a:p>
         </p:txBody>
       </p:sp>
@@ -6579,6 +6596,36 @@
           </a:fontRef>
         </p:style>
       </p:cxnSp>
+      <p:pic>
+        <p:nvPicPr>
+          <p:cNvPr id="5" name="Picture 4">
+            <a:extLst>
+              <a:ext uri="{FF2B5EF4-FFF2-40B4-BE49-F238E27FC236}">
+                <a16:creationId xmlns:a16="http://schemas.microsoft.com/office/drawing/2014/main" id="{1C63B319-5F17-70E7-D4F9-CE39CDC8BE4D}"/>
+              </a:ext>
+            </a:extLst>
+          </p:cNvPr>
+          <p:cNvPicPr>
+            <a:picLocks noChangeAspect="1"/>
+          </p:cNvPicPr>
+          <p:nvPr/>
+        </p:nvPicPr>
+        <p:blipFill>
+          <a:blip r:embed="rId4"/>
+          <a:stretch>
+            <a:fillRect/>
+          </a:stretch>
+        </p:blipFill>
+        <p:spPr>
+          <a:xfrm>
+            <a:off x="9857598" y="4497925"/>
+            <a:ext cx="1685474" cy="1683718"/>
+          </a:xfrm>
+          <a:prstGeom prst="rect">
+            <a:avLst/>
+          </a:prstGeom>
+        </p:spPr>
+      </p:pic>
     </p:spTree>
     <p:extLst>
       <p:ext uri="{BB962C8B-B14F-4D97-AF65-F5344CB8AC3E}">
@@ -6687,6 +6734,1505 @@
     <p:extLst>
       <p:ext uri="{BB962C8B-B14F-4D97-AF65-F5344CB8AC3E}">
         <p14:creationId xmlns:p14="http://schemas.microsoft.com/office/powerpoint/2010/main" val="265522590"/>
+      </p:ext>
+    </p:extLst>
+  </p:cSld>
+  <p:clrMapOvr>
+    <a:masterClrMapping/>
+  </p:clrMapOvr>
+</p:sld>
+</file>
+
+<file path=ppt/slides/slide3.xml><?xml version="1.0" encoding="utf-8"?>
+<p:sld xmlns:a="http://schemas.openxmlformats.org/drawingml/2006/main" xmlns:r="http://schemas.openxmlformats.org/officeDocument/2006/relationships" xmlns:p="http://schemas.openxmlformats.org/presentationml/2006/main">
+  <p:cSld>
+    <p:spTree>
+      <p:nvGrpSpPr>
+        <p:cNvPr id="1" name=""/>
+        <p:cNvGrpSpPr/>
+        <p:nvPr/>
+      </p:nvGrpSpPr>
+      <p:grpSpPr>
+        <a:xfrm>
+          <a:off x="0" y="0"/>
+          <a:ext cx="0" cy="0"/>
+          <a:chOff x="0" y="0"/>
+          <a:chExt cx="0" cy="0"/>
+        </a:xfrm>
+      </p:grpSpPr>
+      <p:sp>
+        <p:nvSpPr>
+          <p:cNvPr id="2" name="Title 1">
+            <a:extLst>
+              <a:ext uri="{FF2B5EF4-FFF2-40B4-BE49-F238E27FC236}">
+                <a16:creationId xmlns:a16="http://schemas.microsoft.com/office/drawing/2014/main" id="{DCED2693-32C1-DF56-0DA2-0753A7C38DC7}"/>
+              </a:ext>
+            </a:extLst>
+          </p:cNvPr>
+          <p:cNvSpPr>
+            <a:spLocks noGrp="1"/>
+          </p:cNvSpPr>
+          <p:nvPr>
+            <p:ph type="title"/>
+          </p:nvPr>
+        </p:nvSpPr>
+        <p:spPr/>
+        <p:txBody>
+          <a:bodyPr/>
+          <a:lstStyle/>
+          <a:p>
+            <a:r>
+              <a:rPr lang="en-US" dirty="0"/>
+              <a:t>Why Multithreading?</a:t>
+            </a:r>
+          </a:p>
+        </p:txBody>
+      </p:sp>
+      <p:sp>
+        <p:nvSpPr>
+          <p:cNvPr id="3" name="Content Placeholder 2">
+            <a:extLst>
+              <a:ext uri="{FF2B5EF4-FFF2-40B4-BE49-F238E27FC236}">
+                <a16:creationId xmlns:a16="http://schemas.microsoft.com/office/drawing/2014/main" id="{38D26AF0-D2F7-73DF-7FF3-87A8E064F40E}"/>
+              </a:ext>
+            </a:extLst>
+          </p:cNvPr>
+          <p:cNvSpPr>
+            <a:spLocks noGrp="1"/>
+          </p:cNvSpPr>
+          <p:nvPr>
+            <p:ph idx="1"/>
+          </p:nvPr>
+        </p:nvSpPr>
+        <p:spPr/>
+        <p:txBody>
+          <a:bodyPr>
+            <a:normAutofit/>
+          </a:bodyPr>
+          <a:lstStyle/>
+          <a:p>
+            <a:r>
+              <a:rPr lang="en-US" b="1" i="1" dirty="0"/>
+              <a:t>Multithreading is Key to Performance </a:t>
+            </a:r>
+          </a:p>
+          <a:p>
+            <a:pPr>
+              <a:buFont typeface="Arial" panose="020B0604020202020204" pitchFamily="34" charset="0"/>
+              <a:buChar char="•"/>
+            </a:pPr>
+            <a:endParaRPr lang="en-US" dirty="0"/>
+          </a:p>
+          <a:p>
+            <a:pPr>
+              <a:buNone/>
+            </a:pPr>
+            <a:endParaRPr lang="en-US" dirty="0"/>
+          </a:p>
+          <a:p>
+            <a:endParaRPr lang="en-US" b="1" dirty="0"/>
+          </a:p>
+        </p:txBody>
+      </p:sp>
+      <p:graphicFrame>
+        <p:nvGraphicFramePr>
+          <p:cNvPr id="4" name="Table 3">
+            <a:extLst>
+              <a:ext uri="{FF2B5EF4-FFF2-40B4-BE49-F238E27FC236}">
+                <a16:creationId xmlns:a16="http://schemas.microsoft.com/office/drawing/2014/main" id="{9AA8C5C7-87BE-1514-F80E-25994660E681}"/>
+              </a:ext>
+            </a:extLst>
+          </p:cNvPr>
+          <p:cNvGraphicFramePr>
+            <a:graphicFrameLocks noGrp="1"/>
+          </p:cNvGraphicFramePr>
+          <p:nvPr>
+            <p:extLst>
+              <p:ext uri="{D42A27DB-BD31-4B8C-83A1-F6EECF244321}">
+                <p14:modId xmlns:p14="http://schemas.microsoft.com/office/powerpoint/2010/main" val="3326042493"/>
+              </p:ext>
+            </p:extLst>
+          </p:nvPr>
+        </p:nvGraphicFramePr>
+        <p:xfrm>
+          <a:off x="1636074" y="2799926"/>
+          <a:ext cx="8128000" cy="2377440"/>
+        </p:xfrm>
+        <a:graphic>
+          <a:graphicData uri="http://schemas.openxmlformats.org/drawingml/2006/table">
+            <a:tbl>
+              <a:tblPr firstRow="1" bandRow="1">
+                <a:tableStyleId>{5C22544A-7EE6-4342-B048-85BDC9FD1C3A}</a:tableStyleId>
+              </a:tblPr>
+              <a:tblGrid>
+                <a:gridCol w="4064000">
+                  <a:extLst>
+                    <a:ext uri="{9D8B030D-6E8A-4147-A177-3AD203B41FA5}">
+                      <a16:colId xmlns:a16="http://schemas.microsoft.com/office/drawing/2014/main" val="4074594556"/>
+                    </a:ext>
+                  </a:extLst>
+                </a:gridCol>
+                <a:gridCol w="4064000">
+                  <a:extLst>
+                    <a:ext uri="{9D8B030D-6E8A-4147-A177-3AD203B41FA5}">
+                      <a16:colId xmlns:a16="http://schemas.microsoft.com/office/drawing/2014/main" val="459100150"/>
+                    </a:ext>
+                  </a:extLst>
+                </a:gridCol>
+              </a:tblGrid>
+              <a:tr h="370840">
+                <a:tc>
+                  <a:txBody>
+                    <a:bodyPr/>
+                    <a:lstStyle/>
+                    <a:p>
+                      <a:pPr marL="0" marR="0" lvl="0" indent="0" algn="l" defTabSz="914400" rtl="0" eaLnBrk="1" fontAlgn="auto" latinLnBrk="0" hangingPunct="1">
+                        <a:lnSpc>
+                          <a:spcPct val="100000"/>
+                        </a:lnSpc>
+                        <a:spcBef>
+                          <a:spcPts val="0"/>
+                        </a:spcBef>
+                        <a:spcAft>
+                          <a:spcPts val="0"/>
+                        </a:spcAft>
+                        <a:buClrTx/>
+                        <a:buSzTx/>
+                        <a:buFontTx/>
+                        <a:buNone/>
+                        <a:tabLst/>
+                        <a:defRPr/>
+                      </a:pPr>
+                      <a:r>
+                        <a:rPr lang="en-US" b="1" dirty="0"/>
+                        <a:t>	Real-World Applications:</a:t>
+                      </a:r>
+                    </a:p>
+                    <a:p>
+                      <a:endParaRPr lang="en-US" dirty="0"/>
+                    </a:p>
+                  </a:txBody>
+                  <a:tcPr/>
+                </a:tc>
+                <a:tc>
+                  <a:txBody>
+                    <a:bodyPr/>
+                    <a:lstStyle/>
+                    <a:p>
+                      <a:r>
+                        <a:rPr lang="en-US" b="1" dirty="0"/>
+                        <a:t>By the end of this course, you will:</a:t>
+                      </a:r>
+                      <a:endParaRPr lang="en-US" dirty="0"/>
+                    </a:p>
+                  </a:txBody>
+                  <a:tcPr/>
+                </a:tc>
+                <a:extLst>
+                  <a:ext uri="{0D108BD9-81ED-4DB2-BD59-A6C34878D82A}">
+                    <a16:rowId xmlns:a16="http://schemas.microsoft.com/office/drawing/2014/main" val="3638444553"/>
+                  </a:ext>
+                </a:extLst>
+              </a:tr>
+              <a:tr h="370840">
+                <a:tc>
+                  <a:txBody>
+                    <a:bodyPr/>
+                    <a:lstStyle/>
+                    <a:p>
+                      <a:pPr>
+                        <a:buFont typeface="Arial" panose="020B0604020202020204" pitchFamily="34" charset="0"/>
+                        <a:buChar char="•"/>
+                      </a:pPr>
+                      <a:r>
+                        <a:rPr lang="en-US" dirty="0"/>
+                        <a:t>Responsive UI applications</a:t>
+                      </a:r>
+                    </a:p>
+                    <a:p>
+                      <a:pPr>
+                        <a:buFont typeface="Arial" panose="020B0604020202020204" pitchFamily="34" charset="0"/>
+                        <a:buChar char="•"/>
+                      </a:pPr>
+                      <a:r>
+                        <a:rPr lang="en-US" dirty="0"/>
+                        <a:t>Efficient background services</a:t>
+                      </a:r>
+                    </a:p>
+                    <a:p>
+                      <a:pPr>
+                        <a:buFont typeface="Arial" panose="020B0604020202020204" pitchFamily="34" charset="0"/>
+                        <a:buChar char="•"/>
+                      </a:pPr>
+                      <a:r>
+                        <a:rPr lang="en-US" dirty="0"/>
+                        <a:t>Scalable backend systems</a:t>
+                      </a:r>
+                    </a:p>
+                    <a:p>
+                      <a:endParaRPr lang="en-US" dirty="0"/>
+                    </a:p>
+                  </a:txBody>
+                  <a:tcPr/>
+                </a:tc>
+                <a:tc>
+                  <a:txBody>
+                    <a:bodyPr/>
+                    <a:lstStyle/>
+                    <a:p>
+                      <a:pPr>
+                        <a:buFont typeface="Arial" panose="020B0604020202020204" pitchFamily="34" charset="0"/>
+                        <a:buChar char="•"/>
+                      </a:pPr>
+                      <a:r>
+                        <a:rPr lang="en-US" dirty="0"/>
+                        <a:t> Understand how threads work</a:t>
+                      </a:r>
+                    </a:p>
+                    <a:p>
+                      <a:pPr>
+                        <a:buFont typeface="Arial" panose="020B0604020202020204" pitchFamily="34" charset="0"/>
+                        <a:buChar char="•"/>
+                      </a:pPr>
+                      <a:r>
+                        <a:rPr lang="en-US" dirty="0"/>
+                        <a:t> Know </a:t>
+                      </a:r>
+                      <a:r>
+                        <a:rPr lang="en-US" b="1" dirty="0"/>
+                        <a:t>when</a:t>
+                      </a:r>
+                      <a:r>
+                        <a:rPr lang="en-US" dirty="0"/>
+                        <a:t> and </a:t>
+                      </a:r>
+                      <a:r>
+                        <a:rPr lang="en-US" b="1" dirty="0"/>
+                        <a:t>why</a:t>
+                      </a:r>
+                      <a:r>
+                        <a:rPr lang="en-US" dirty="0"/>
+                        <a:t> to use concurrency</a:t>
+                      </a:r>
+                    </a:p>
+                    <a:p>
+                      <a:pPr>
+                        <a:buFont typeface="Arial" panose="020B0604020202020204" pitchFamily="34" charset="0"/>
+                        <a:buChar char="•"/>
+                      </a:pPr>
+                      <a:r>
+                        <a:rPr lang="en-US" dirty="0"/>
+                        <a:t> Avoid common multithreading </a:t>
+                      </a:r>
+                      <a:r>
+                        <a:rPr lang="en-US" b="1" dirty="0"/>
+                        <a:t>pitfalls</a:t>
+                      </a:r>
+                      <a:endParaRPr lang="en-US" dirty="0"/>
+                    </a:p>
+                    <a:p>
+                      <a:pPr>
+                        <a:buFont typeface="Arial" panose="020B0604020202020204" pitchFamily="34" charset="0"/>
+                        <a:buChar char="•"/>
+                      </a:pPr>
+                      <a:r>
+                        <a:rPr lang="en-US" dirty="0"/>
+                        <a:t>  Write </a:t>
+                      </a:r>
+                      <a:r>
+                        <a:rPr lang="en-US" b="1" dirty="0"/>
+                        <a:t>thread-safe</a:t>
+                      </a:r>
+                      <a:r>
+                        <a:rPr lang="en-US" dirty="0"/>
+                        <a:t>, reliable code</a:t>
+                      </a:r>
+                    </a:p>
+                    <a:p>
+                      <a:endParaRPr lang="en-US" dirty="0"/>
+                    </a:p>
+                  </a:txBody>
+                  <a:tcPr/>
+                </a:tc>
+                <a:extLst>
+                  <a:ext uri="{0D108BD9-81ED-4DB2-BD59-A6C34878D82A}">
+                    <a16:rowId xmlns:a16="http://schemas.microsoft.com/office/drawing/2014/main" val="3873605183"/>
+                  </a:ext>
+                </a:extLst>
+              </a:tr>
+            </a:tbl>
+          </a:graphicData>
+        </a:graphic>
+      </p:graphicFrame>
+    </p:spTree>
+    <p:extLst>
+      <p:ext uri="{BB962C8B-B14F-4D97-AF65-F5344CB8AC3E}">
+        <p14:creationId xmlns:p14="http://schemas.microsoft.com/office/powerpoint/2010/main" val="1711160851"/>
+      </p:ext>
+    </p:extLst>
+  </p:cSld>
+  <p:clrMapOvr>
+    <a:masterClrMapping/>
+  </p:clrMapOvr>
+</p:sld>
+</file>
+
+<file path=ppt/slides/slide4.xml><?xml version="1.0" encoding="utf-8"?>
+<p:sld xmlns:a="http://schemas.openxmlformats.org/drawingml/2006/main" xmlns:r="http://schemas.openxmlformats.org/officeDocument/2006/relationships" xmlns:p="http://schemas.openxmlformats.org/presentationml/2006/main">
+  <p:cSld>
+    <p:spTree>
+      <p:nvGrpSpPr>
+        <p:cNvPr id="1" name=""/>
+        <p:cNvGrpSpPr/>
+        <p:nvPr/>
+      </p:nvGrpSpPr>
+      <p:grpSpPr>
+        <a:xfrm>
+          <a:off x="0" y="0"/>
+          <a:ext cx="0" cy="0"/>
+          <a:chOff x="0" y="0"/>
+          <a:chExt cx="0" cy="0"/>
+        </a:xfrm>
+      </p:grpSpPr>
+      <p:sp>
+        <p:nvSpPr>
+          <p:cNvPr id="2" name="Title 1">
+            <a:extLst>
+              <a:ext uri="{FF2B5EF4-FFF2-40B4-BE49-F238E27FC236}">
+                <a16:creationId xmlns:a16="http://schemas.microsoft.com/office/drawing/2014/main" id="{628902F5-D829-9935-A7D5-B57E9EB33743}"/>
+              </a:ext>
+            </a:extLst>
+          </p:cNvPr>
+          <p:cNvSpPr>
+            <a:spLocks noGrp="1"/>
+          </p:cNvSpPr>
+          <p:nvPr>
+            <p:ph type="title"/>
+          </p:nvPr>
+        </p:nvSpPr>
+        <p:spPr/>
+        <p:txBody>
+          <a:bodyPr/>
+          <a:lstStyle/>
+          <a:p>
+            <a:r>
+              <a:rPr lang="en-US" dirty="0"/>
+              <a:t>Why Multithreading?</a:t>
+            </a:r>
+          </a:p>
+        </p:txBody>
+      </p:sp>
+      <p:pic>
+        <p:nvPicPr>
+          <p:cNvPr id="6" name="Content Placeholder 5">
+            <a:extLst>
+              <a:ext uri="{FF2B5EF4-FFF2-40B4-BE49-F238E27FC236}">
+                <a16:creationId xmlns:a16="http://schemas.microsoft.com/office/drawing/2014/main" id="{728DE0ED-9D5B-2D8F-A748-895E3FB9659C}"/>
+              </a:ext>
+            </a:extLst>
+          </p:cNvPr>
+          <p:cNvPicPr>
+            <a:picLocks noGrp="1" noChangeAspect="1"/>
+          </p:cNvPicPr>
+          <p:nvPr>
+            <p:ph idx="1"/>
+          </p:nvPr>
+        </p:nvPicPr>
+        <p:blipFill>
+          <a:blip r:embed="rId2"/>
+          <a:stretch>
+            <a:fillRect/>
+          </a:stretch>
+        </p:blipFill>
+        <p:spPr>
+          <a:xfrm>
+            <a:off x="3299382" y="4253805"/>
+            <a:ext cx="1690598" cy="1690598"/>
+          </a:xfrm>
+        </p:spPr>
+      </p:pic>
+      <p:sp>
+        <p:nvSpPr>
+          <p:cNvPr id="4" name="Speech Bubble: Rectangle with Corners Rounded 3">
+            <a:extLst>
+              <a:ext uri="{FF2B5EF4-FFF2-40B4-BE49-F238E27FC236}">
+                <a16:creationId xmlns:a16="http://schemas.microsoft.com/office/drawing/2014/main" id="{762F7611-8033-D22C-4DED-345FE9AAC6B1}"/>
+              </a:ext>
+            </a:extLst>
+          </p:cNvPr>
+          <p:cNvSpPr/>
+          <p:nvPr/>
+        </p:nvSpPr>
+        <p:spPr>
+          <a:xfrm>
+            <a:off x="1227055" y="2219174"/>
+            <a:ext cx="9737889" cy="1687398"/>
+          </a:xfrm>
+          <a:prstGeom prst="wedgeRoundRectCallout">
+            <a:avLst/>
+          </a:prstGeom>
+        </p:spPr>
+        <p:style>
+          <a:lnRef idx="2">
+            <a:schemeClr val="accent1">
+              <a:shade val="15000"/>
+            </a:schemeClr>
+          </a:lnRef>
+          <a:fillRef idx="1">
+            <a:schemeClr val="accent1"/>
+          </a:fillRef>
+          <a:effectRef idx="0">
+            <a:schemeClr val="accent1"/>
+          </a:effectRef>
+          <a:fontRef idx="minor">
+            <a:schemeClr val="lt1"/>
+          </a:fontRef>
+        </p:style>
+        <p:txBody>
+          <a:bodyPr rtlCol="0" anchor="ctr"/>
+          <a:lstStyle/>
+          <a:p>
+            <a:r>
+              <a:rPr lang="en-US" sz="3200" dirty="0"/>
+              <a:t>"Concurrency is not just about performance—it's about writing smarter, more resilient software."</a:t>
+            </a:r>
+          </a:p>
+        </p:txBody>
+      </p:sp>
+    </p:spTree>
+    <p:extLst>
+      <p:ext uri="{BB962C8B-B14F-4D97-AF65-F5344CB8AC3E}">
+        <p14:creationId xmlns:p14="http://schemas.microsoft.com/office/powerpoint/2010/main" val="1691106395"/>
+      </p:ext>
+    </p:extLst>
+  </p:cSld>
+  <p:clrMapOvr>
+    <a:masterClrMapping/>
+  </p:clrMapOvr>
+</p:sld>
+</file>
+
+<file path=ppt/slides/slide5.xml><?xml version="1.0" encoding="utf-8"?>
+<p:sld xmlns:a="http://schemas.openxmlformats.org/drawingml/2006/main" xmlns:r="http://schemas.openxmlformats.org/officeDocument/2006/relationships" xmlns:p="http://schemas.openxmlformats.org/presentationml/2006/main">
+  <p:cSld>
+    <p:spTree>
+      <p:nvGrpSpPr>
+        <p:cNvPr id="1" name=""/>
+        <p:cNvGrpSpPr/>
+        <p:nvPr/>
+      </p:nvGrpSpPr>
+      <p:grpSpPr>
+        <a:xfrm>
+          <a:off x="0" y="0"/>
+          <a:ext cx="0" cy="0"/>
+          <a:chOff x="0" y="0"/>
+          <a:chExt cx="0" cy="0"/>
+        </a:xfrm>
+      </p:grpSpPr>
+      <p:sp>
+        <p:nvSpPr>
+          <p:cNvPr id="2" name="Title 1">
+            <a:extLst>
+              <a:ext uri="{FF2B5EF4-FFF2-40B4-BE49-F238E27FC236}">
+                <a16:creationId xmlns:a16="http://schemas.microsoft.com/office/drawing/2014/main" id="{7228DDF7-8CAD-6E3D-25D8-01386EAA46C8}"/>
+              </a:ext>
+            </a:extLst>
+          </p:cNvPr>
+          <p:cNvSpPr>
+            <a:spLocks noGrp="1"/>
+          </p:cNvSpPr>
+          <p:nvPr>
+            <p:ph type="title"/>
+          </p:nvPr>
+        </p:nvSpPr>
+        <p:spPr/>
+        <p:txBody>
+          <a:bodyPr>
+            <a:normAutofit/>
+          </a:bodyPr>
+          <a:lstStyle/>
+          <a:p>
+            <a:r>
+              <a:rPr lang="en-US" dirty="0"/>
+              <a:t>What You'll Learn</a:t>
+            </a:r>
+          </a:p>
+        </p:txBody>
+      </p:sp>
+      <p:graphicFrame>
+        <p:nvGraphicFramePr>
+          <p:cNvPr id="5" name="Content Placeholder 4">
+            <a:extLst>
+              <a:ext uri="{FF2B5EF4-FFF2-40B4-BE49-F238E27FC236}">
+                <a16:creationId xmlns:a16="http://schemas.microsoft.com/office/drawing/2014/main" id="{367BDB66-05C2-305E-7E43-7603AFE5D848}"/>
+              </a:ext>
+            </a:extLst>
+          </p:cNvPr>
+          <p:cNvGraphicFramePr>
+            <a:graphicFrameLocks noGrp="1"/>
+          </p:cNvGraphicFramePr>
+          <p:nvPr>
+            <p:ph idx="1"/>
+            <p:extLst>
+              <p:ext uri="{D42A27DB-BD31-4B8C-83A1-F6EECF244321}">
+                <p14:modId xmlns:p14="http://schemas.microsoft.com/office/powerpoint/2010/main" val="2974414982"/>
+              </p:ext>
+            </p:extLst>
+          </p:nvPr>
+        </p:nvGraphicFramePr>
+        <p:xfrm>
+          <a:off x="1096963" y="2108200"/>
+          <a:ext cx="10058400" cy="2595880"/>
+        </p:xfrm>
+        <a:graphic>
+          <a:graphicData uri="http://schemas.openxmlformats.org/drawingml/2006/table">
+            <a:tbl>
+              <a:tblPr firstRow="1" bandRow="1">
+                <a:tableStyleId>{5C22544A-7EE6-4342-B048-85BDC9FD1C3A}</a:tableStyleId>
+              </a:tblPr>
+              <a:tblGrid>
+                <a:gridCol w="10058400">
+                  <a:extLst>
+                    <a:ext uri="{9D8B030D-6E8A-4147-A177-3AD203B41FA5}">
+                      <a16:colId xmlns:a16="http://schemas.microsoft.com/office/drawing/2014/main" val="1877721821"/>
+                    </a:ext>
+                  </a:extLst>
+                </a:gridCol>
+              </a:tblGrid>
+              <a:tr h="370840">
+                <a:tc>
+                  <a:txBody>
+                    <a:bodyPr/>
+                    <a:lstStyle/>
+                    <a:p>
+                      <a:r>
+                        <a:rPr lang="en-US" dirty="0"/>
+                        <a:t>What You'll Learn</a:t>
+                      </a:r>
+                    </a:p>
+                  </a:txBody>
+                  <a:tcPr/>
+                </a:tc>
+                <a:extLst>
+                  <a:ext uri="{0D108BD9-81ED-4DB2-BD59-A6C34878D82A}">
+                    <a16:rowId xmlns:a16="http://schemas.microsoft.com/office/drawing/2014/main" val="3984080516"/>
+                  </a:ext>
+                </a:extLst>
+              </a:tr>
+              <a:tr h="370840">
+                <a:tc>
+                  <a:txBody>
+                    <a:bodyPr/>
+                    <a:lstStyle/>
+                    <a:p>
+                      <a:pPr marL="0" marR="0" lvl="0" indent="0" algn="l" defTabSz="914400" rtl="0" eaLnBrk="0" fontAlgn="base" latinLnBrk="0" hangingPunct="0">
+                        <a:lnSpc>
+                          <a:spcPct val="100000"/>
+                        </a:lnSpc>
+                        <a:spcBef>
+                          <a:spcPct val="0"/>
+                        </a:spcBef>
+                        <a:spcAft>
+                          <a:spcPct val="0"/>
+                        </a:spcAft>
+                        <a:buClrTx/>
+                        <a:buSzTx/>
+                        <a:buFontTx/>
+                        <a:buNone/>
+                        <a:tabLst/>
+                      </a:pPr>
+                      <a:r>
+                        <a:rPr kumimoji="0" lang="en-US" altLang="en-US" sz="1800" b="0" i="0" u="none" strike="noStrike" cap="none" normalizeH="0" baseline="0" dirty="0">
+                          <a:ln>
+                            <a:noFill/>
+                          </a:ln>
+                          <a:solidFill>
+                            <a:schemeClr val="tx1"/>
+                          </a:solidFill>
+                          <a:effectLst/>
+                          <a:latin typeface="Arial" panose="020B0604020202020204" pitchFamily="34" charset="0"/>
+                        </a:rPr>
+                        <a:t>Thread basics and life cycle</a:t>
+                      </a:r>
+                    </a:p>
+                  </a:txBody>
+                  <a:tcPr/>
+                </a:tc>
+                <a:extLst>
+                  <a:ext uri="{0D108BD9-81ED-4DB2-BD59-A6C34878D82A}">
+                    <a16:rowId xmlns:a16="http://schemas.microsoft.com/office/drawing/2014/main" val="3362932271"/>
+                  </a:ext>
+                </a:extLst>
+              </a:tr>
+              <a:tr h="370840">
+                <a:tc>
+                  <a:txBody>
+                    <a:bodyPr/>
+                    <a:lstStyle/>
+                    <a:p>
+                      <a:pPr marL="0" marR="0" lvl="0" indent="0" algn="l" defTabSz="914400" rtl="0" eaLnBrk="1" fontAlgn="auto" latinLnBrk="0" hangingPunct="1">
+                        <a:lnSpc>
+                          <a:spcPct val="100000"/>
+                        </a:lnSpc>
+                        <a:spcBef>
+                          <a:spcPts val="0"/>
+                        </a:spcBef>
+                        <a:spcAft>
+                          <a:spcPts val="0"/>
+                        </a:spcAft>
+                        <a:buClrTx/>
+                        <a:buSzTx/>
+                        <a:buFontTx/>
+                        <a:buNone/>
+                        <a:tabLst/>
+                        <a:defRPr/>
+                      </a:pPr>
+                      <a:r>
+                        <a:rPr kumimoji="0" lang="en-US" altLang="en-US" sz="1800" b="0" i="0" u="none" strike="noStrike" cap="none" normalizeH="0" baseline="0" dirty="0">
+                          <a:ln>
+                            <a:noFill/>
+                          </a:ln>
+                          <a:solidFill>
+                            <a:schemeClr val="tx1"/>
+                          </a:solidFill>
+                          <a:effectLst/>
+                          <a:latin typeface="Arial" panose="020B0604020202020204" pitchFamily="34" charset="0"/>
+                        </a:rPr>
+                        <a:t>Synchronization and locks</a:t>
+                      </a:r>
+                    </a:p>
+                  </a:txBody>
+                  <a:tcPr/>
+                </a:tc>
+                <a:extLst>
+                  <a:ext uri="{0D108BD9-81ED-4DB2-BD59-A6C34878D82A}">
+                    <a16:rowId xmlns:a16="http://schemas.microsoft.com/office/drawing/2014/main" val="414988102"/>
+                  </a:ext>
+                </a:extLst>
+              </a:tr>
+              <a:tr h="370840">
+                <a:tc>
+                  <a:txBody>
+                    <a:bodyPr/>
+                    <a:lstStyle/>
+                    <a:p>
+                      <a:pPr marL="0" marR="0" lvl="0" indent="0" algn="l" defTabSz="914400" rtl="0" eaLnBrk="1" fontAlgn="auto" latinLnBrk="0" hangingPunct="1">
+                        <a:lnSpc>
+                          <a:spcPct val="100000"/>
+                        </a:lnSpc>
+                        <a:spcBef>
+                          <a:spcPts val="0"/>
+                        </a:spcBef>
+                        <a:spcAft>
+                          <a:spcPts val="0"/>
+                        </a:spcAft>
+                        <a:buClrTx/>
+                        <a:buSzTx/>
+                        <a:buFontTx/>
+                        <a:buNone/>
+                        <a:tabLst/>
+                        <a:defRPr/>
+                      </a:pPr>
+                      <a:r>
+                        <a:rPr kumimoji="0" lang="en-US" altLang="en-US" sz="1800" b="0" i="0" u="none" strike="noStrike" cap="none" normalizeH="0" baseline="0" dirty="0">
+                          <a:ln>
+                            <a:noFill/>
+                          </a:ln>
+                          <a:solidFill>
+                            <a:schemeClr val="tx1"/>
+                          </a:solidFill>
+                          <a:effectLst/>
+                          <a:latin typeface="Arial" panose="020B0604020202020204" pitchFamily="34" charset="0"/>
+                        </a:rPr>
+                        <a:t>Thread pool vs Task-based concurrency</a:t>
+                      </a:r>
+                    </a:p>
+                  </a:txBody>
+                  <a:tcPr/>
+                </a:tc>
+                <a:extLst>
+                  <a:ext uri="{0D108BD9-81ED-4DB2-BD59-A6C34878D82A}">
+                    <a16:rowId xmlns:a16="http://schemas.microsoft.com/office/drawing/2014/main" val="361964325"/>
+                  </a:ext>
+                </a:extLst>
+              </a:tr>
+              <a:tr h="370840">
+                <a:tc>
+                  <a:txBody>
+                    <a:bodyPr/>
+                    <a:lstStyle/>
+                    <a:p>
+                      <a:pPr marL="0" marR="0" lvl="0" indent="0" algn="l" defTabSz="914400" rtl="0" eaLnBrk="1" fontAlgn="auto" latinLnBrk="0" hangingPunct="1">
+                        <a:lnSpc>
+                          <a:spcPct val="100000"/>
+                        </a:lnSpc>
+                        <a:spcBef>
+                          <a:spcPts val="0"/>
+                        </a:spcBef>
+                        <a:spcAft>
+                          <a:spcPts val="0"/>
+                        </a:spcAft>
+                        <a:buClrTx/>
+                        <a:buSzTx/>
+                        <a:buFontTx/>
+                        <a:buNone/>
+                        <a:tabLst/>
+                        <a:defRPr/>
+                      </a:pPr>
+                      <a:r>
+                        <a:rPr kumimoji="0" lang="en-US" altLang="en-US" sz="1800" b="0" i="0" u="none" strike="noStrike" cap="none" normalizeH="0" baseline="0" dirty="0">
+                          <a:ln>
+                            <a:noFill/>
+                          </a:ln>
+                          <a:solidFill>
+                            <a:schemeClr val="tx1"/>
+                          </a:solidFill>
+                          <a:effectLst/>
+                          <a:latin typeface="Arial" panose="020B0604020202020204" pitchFamily="34" charset="0"/>
+                        </a:rPr>
+                        <a:t>async/await best practices</a:t>
+                      </a:r>
+                    </a:p>
+                  </a:txBody>
+                  <a:tcPr/>
+                </a:tc>
+                <a:extLst>
+                  <a:ext uri="{0D108BD9-81ED-4DB2-BD59-A6C34878D82A}">
+                    <a16:rowId xmlns:a16="http://schemas.microsoft.com/office/drawing/2014/main" val="4033769892"/>
+                  </a:ext>
+                </a:extLst>
+              </a:tr>
+              <a:tr h="370840">
+                <a:tc>
+                  <a:txBody>
+                    <a:bodyPr/>
+                    <a:lstStyle/>
+                    <a:p>
+                      <a:pPr marL="0" marR="0" lvl="0" indent="0" algn="l" defTabSz="914400" rtl="0" eaLnBrk="1" fontAlgn="auto" latinLnBrk="0" hangingPunct="1">
+                        <a:lnSpc>
+                          <a:spcPct val="100000"/>
+                        </a:lnSpc>
+                        <a:spcBef>
+                          <a:spcPts val="0"/>
+                        </a:spcBef>
+                        <a:spcAft>
+                          <a:spcPts val="0"/>
+                        </a:spcAft>
+                        <a:buClrTx/>
+                        <a:buSzTx/>
+                        <a:buFontTx/>
+                        <a:buNone/>
+                        <a:tabLst/>
+                        <a:defRPr/>
+                      </a:pPr>
+                      <a:r>
+                        <a:rPr kumimoji="0" lang="en-US" altLang="en-US" sz="1800" b="0" i="0" u="none" strike="noStrike" cap="none" normalizeH="0" baseline="0" dirty="0">
+                          <a:ln>
+                            <a:noFill/>
+                          </a:ln>
+                          <a:solidFill>
+                            <a:schemeClr val="tx1"/>
+                          </a:solidFill>
+                          <a:effectLst/>
+                          <a:latin typeface="Arial" panose="020B0604020202020204" pitchFamily="34" charset="0"/>
+                        </a:rPr>
+                        <a:t>Capstone project and interview prep</a:t>
+                      </a:r>
+                    </a:p>
+                  </a:txBody>
+                  <a:tcPr/>
+                </a:tc>
+                <a:extLst>
+                  <a:ext uri="{0D108BD9-81ED-4DB2-BD59-A6C34878D82A}">
+                    <a16:rowId xmlns:a16="http://schemas.microsoft.com/office/drawing/2014/main" val="2695461211"/>
+                  </a:ext>
+                </a:extLst>
+              </a:tr>
+              <a:tr h="370840">
+                <a:tc>
+                  <a:txBody>
+                    <a:bodyPr/>
+                    <a:lstStyle/>
+                    <a:p>
+                      <a:pPr marL="0" marR="0" lvl="0" indent="0" algn="l" defTabSz="914400" rtl="0" eaLnBrk="1" fontAlgn="auto" latinLnBrk="0" hangingPunct="1">
+                        <a:lnSpc>
+                          <a:spcPct val="100000"/>
+                        </a:lnSpc>
+                        <a:spcBef>
+                          <a:spcPts val="0"/>
+                        </a:spcBef>
+                        <a:spcAft>
+                          <a:spcPts val="0"/>
+                        </a:spcAft>
+                        <a:buClrTx/>
+                        <a:buSzTx/>
+                        <a:buFontTx/>
+                        <a:buNone/>
+                        <a:tabLst/>
+                        <a:defRPr/>
+                      </a:pPr>
+                      <a:r>
+                        <a:rPr kumimoji="0" lang="en-US" altLang="en-US" sz="1800" b="0" i="0" u="none" strike="noStrike" cap="none" normalizeH="0" baseline="0" dirty="0">
+                          <a:ln>
+                            <a:noFill/>
+                          </a:ln>
+                          <a:solidFill>
+                            <a:schemeClr val="tx1"/>
+                          </a:solidFill>
+                          <a:effectLst/>
+                          <a:latin typeface="Arial" panose="020B0604020202020204" pitchFamily="34" charset="0"/>
+                        </a:rPr>
+                        <a:t>Patterns, pitfalls, and real-world examples</a:t>
+                      </a:r>
+                    </a:p>
+                  </a:txBody>
+                  <a:tcPr/>
+                </a:tc>
+                <a:extLst>
+                  <a:ext uri="{0D108BD9-81ED-4DB2-BD59-A6C34878D82A}">
+                    <a16:rowId xmlns:a16="http://schemas.microsoft.com/office/drawing/2014/main" val="2693737945"/>
+                  </a:ext>
+                </a:extLst>
+              </a:tr>
+            </a:tbl>
+          </a:graphicData>
+        </a:graphic>
+      </p:graphicFrame>
+    </p:spTree>
+    <p:extLst>
+      <p:ext uri="{BB962C8B-B14F-4D97-AF65-F5344CB8AC3E}">
+        <p14:creationId xmlns:p14="http://schemas.microsoft.com/office/powerpoint/2010/main" val="1426929906"/>
+      </p:ext>
+    </p:extLst>
+  </p:cSld>
+  <p:clrMapOvr>
+    <a:masterClrMapping/>
+  </p:clrMapOvr>
+</p:sld>
+</file>
+
+<file path=ppt/slides/slide6.xml><?xml version="1.0" encoding="utf-8"?>
+<p:sld xmlns:a="http://schemas.openxmlformats.org/drawingml/2006/main" xmlns:r="http://schemas.openxmlformats.org/officeDocument/2006/relationships" xmlns:p="http://schemas.openxmlformats.org/presentationml/2006/main">
+  <p:cSld>
+    <p:spTree>
+      <p:nvGrpSpPr>
+        <p:cNvPr id="1" name=""/>
+        <p:cNvGrpSpPr/>
+        <p:nvPr/>
+      </p:nvGrpSpPr>
+      <p:grpSpPr>
+        <a:xfrm>
+          <a:off x="0" y="0"/>
+          <a:ext cx="0" cy="0"/>
+          <a:chOff x="0" y="0"/>
+          <a:chExt cx="0" cy="0"/>
+        </a:xfrm>
+      </p:grpSpPr>
+      <p:sp>
+        <p:nvSpPr>
+          <p:cNvPr id="2" name="Title 1">
+            <a:extLst>
+              <a:ext uri="{FF2B5EF4-FFF2-40B4-BE49-F238E27FC236}">
+                <a16:creationId xmlns:a16="http://schemas.microsoft.com/office/drawing/2014/main" id="{7F1B2C70-E0C3-759A-B6F0-1A6FDA21D9BC}"/>
+              </a:ext>
+            </a:extLst>
+          </p:cNvPr>
+          <p:cNvSpPr>
+            <a:spLocks noGrp="1"/>
+          </p:cNvSpPr>
+          <p:nvPr>
+            <p:ph type="title"/>
+          </p:nvPr>
+        </p:nvSpPr>
+        <p:spPr/>
+        <p:txBody>
+          <a:bodyPr/>
+          <a:lstStyle/>
+          <a:p>
+            <a:r>
+              <a:rPr lang="en-US" dirty="0"/>
+              <a:t>Code and Quiz</a:t>
+            </a:r>
+          </a:p>
+        </p:txBody>
+      </p:sp>
+      <p:pic>
+        <p:nvPicPr>
+          <p:cNvPr id="10" name="Content Placeholder 4">
+            <a:extLst>
+              <a:ext uri="{FF2B5EF4-FFF2-40B4-BE49-F238E27FC236}">
+                <a16:creationId xmlns:a16="http://schemas.microsoft.com/office/drawing/2014/main" id="{3974518F-CB5C-8E5F-3360-31C3ACF08949}"/>
+              </a:ext>
+            </a:extLst>
+          </p:cNvPr>
+          <p:cNvPicPr>
+            <a:picLocks noGrp="1" noChangeAspect="1"/>
+          </p:cNvPicPr>
+          <p:nvPr>
+            <p:ph idx="1"/>
+          </p:nvPr>
+        </p:nvPicPr>
+        <p:blipFill>
+          <a:blip r:embed="rId2"/>
+          <a:stretch>
+            <a:fillRect/>
+          </a:stretch>
+        </p:blipFill>
+        <p:spPr>
+          <a:xfrm>
+            <a:off x="1226093" y="2061066"/>
+            <a:ext cx="7085221" cy="3760788"/>
+          </a:xfrm>
+        </p:spPr>
+      </p:pic>
+      <p:pic>
+        <p:nvPicPr>
+          <p:cNvPr id="13" name="Picture 12">
+            <a:extLst>
+              <a:ext uri="{FF2B5EF4-FFF2-40B4-BE49-F238E27FC236}">
+                <a16:creationId xmlns:a16="http://schemas.microsoft.com/office/drawing/2014/main" id="{7913011C-7FEA-585F-C0E5-97819FA51287}"/>
+              </a:ext>
+            </a:extLst>
+          </p:cNvPr>
+          <p:cNvPicPr>
+            <a:picLocks noChangeAspect="1"/>
+          </p:cNvPicPr>
+          <p:nvPr/>
+        </p:nvPicPr>
+        <p:blipFill>
+          <a:blip r:embed="rId3"/>
+          <a:stretch>
+            <a:fillRect/>
+          </a:stretch>
+        </p:blipFill>
+        <p:spPr>
+          <a:xfrm>
+            <a:off x="8634951" y="2540008"/>
+            <a:ext cx="3012379" cy="3012379"/>
+          </a:xfrm>
+          <a:prstGeom prst="rect">
+            <a:avLst/>
+          </a:prstGeom>
+        </p:spPr>
+      </p:pic>
+    </p:spTree>
+    <p:extLst>
+      <p:ext uri="{BB962C8B-B14F-4D97-AF65-F5344CB8AC3E}">
+        <p14:creationId xmlns:p14="http://schemas.microsoft.com/office/powerpoint/2010/main" val="3523810091"/>
+      </p:ext>
+    </p:extLst>
+  </p:cSld>
+  <p:clrMapOvr>
+    <a:masterClrMapping/>
+  </p:clrMapOvr>
+</p:sld>
+</file>
+
+<file path=ppt/slides/slide7.xml><?xml version="1.0" encoding="utf-8"?>
+<p:sld xmlns:a="http://schemas.openxmlformats.org/drawingml/2006/main" xmlns:r="http://schemas.openxmlformats.org/officeDocument/2006/relationships" xmlns:p="http://schemas.openxmlformats.org/presentationml/2006/main">
+  <p:cSld>
+    <p:spTree>
+      <p:nvGrpSpPr>
+        <p:cNvPr id="1" name=""/>
+        <p:cNvGrpSpPr/>
+        <p:nvPr/>
+      </p:nvGrpSpPr>
+      <p:grpSpPr>
+        <a:xfrm>
+          <a:off x="0" y="0"/>
+          <a:ext cx="0" cy="0"/>
+          <a:chOff x="0" y="0"/>
+          <a:chExt cx="0" cy="0"/>
+        </a:xfrm>
+      </p:grpSpPr>
+      <p:sp>
+        <p:nvSpPr>
+          <p:cNvPr id="2" name="Title 1">
+            <a:extLst>
+              <a:ext uri="{FF2B5EF4-FFF2-40B4-BE49-F238E27FC236}">
+                <a16:creationId xmlns:a16="http://schemas.microsoft.com/office/drawing/2014/main" id="{29F0AB32-2DF0-4303-A38B-FEF65C86DD7C}"/>
+              </a:ext>
+            </a:extLst>
+          </p:cNvPr>
+          <p:cNvSpPr>
+            <a:spLocks noGrp="1"/>
+          </p:cNvSpPr>
+          <p:nvPr>
+            <p:ph type="title"/>
+          </p:nvPr>
+        </p:nvSpPr>
+        <p:spPr/>
+        <p:txBody>
+          <a:bodyPr/>
+          <a:lstStyle/>
+          <a:p>
+            <a:r>
+              <a:rPr lang="en-US" dirty="0"/>
+              <a:t>What You’ll Need</a:t>
+            </a:r>
+          </a:p>
+        </p:txBody>
+      </p:sp>
+      <p:graphicFrame>
+        <p:nvGraphicFramePr>
+          <p:cNvPr id="4" name="Content Placeholder 3">
+            <a:extLst>
+              <a:ext uri="{FF2B5EF4-FFF2-40B4-BE49-F238E27FC236}">
+                <a16:creationId xmlns:a16="http://schemas.microsoft.com/office/drawing/2014/main" id="{8A2AA2DE-CAE4-504E-18BC-DDF4EEB8E479}"/>
+              </a:ext>
+            </a:extLst>
+          </p:cNvPr>
+          <p:cNvGraphicFramePr>
+            <a:graphicFrameLocks noGrp="1"/>
+          </p:cNvGraphicFramePr>
+          <p:nvPr>
+            <p:ph idx="1"/>
+            <p:extLst>
+              <p:ext uri="{D42A27DB-BD31-4B8C-83A1-F6EECF244321}">
+                <p14:modId xmlns:p14="http://schemas.microsoft.com/office/powerpoint/2010/main" val="2054174971"/>
+              </p:ext>
+            </p:extLst>
+          </p:nvPr>
+        </p:nvGraphicFramePr>
+        <p:xfrm>
+          <a:off x="1096963" y="2108200"/>
+          <a:ext cx="10058400" cy="1483360"/>
+        </p:xfrm>
+        <a:graphic>
+          <a:graphicData uri="http://schemas.openxmlformats.org/drawingml/2006/table">
+            <a:tbl>
+              <a:tblPr firstRow="1" bandRow="1">
+                <a:tableStyleId>{5C22544A-7EE6-4342-B048-85BDC9FD1C3A}</a:tableStyleId>
+              </a:tblPr>
+              <a:tblGrid>
+                <a:gridCol w="10058400">
+                  <a:extLst>
+                    <a:ext uri="{9D8B030D-6E8A-4147-A177-3AD203B41FA5}">
+                      <a16:colId xmlns:a16="http://schemas.microsoft.com/office/drawing/2014/main" val="599095725"/>
+                    </a:ext>
+                  </a:extLst>
+                </a:gridCol>
+              </a:tblGrid>
+              <a:tr h="370840">
+                <a:tc>
+                  <a:txBody>
+                    <a:bodyPr/>
+                    <a:lstStyle/>
+                    <a:p>
+                      <a:r>
+                        <a:rPr lang="en-US" dirty="0"/>
+                        <a:t>What You’ll Need</a:t>
+                      </a:r>
+                    </a:p>
+                  </a:txBody>
+                  <a:tcPr/>
+                </a:tc>
+                <a:extLst>
+                  <a:ext uri="{0D108BD9-81ED-4DB2-BD59-A6C34878D82A}">
+                    <a16:rowId xmlns:a16="http://schemas.microsoft.com/office/drawing/2014/main" val="1763001848"/>
+                  </a:ext>
+                </a:extLst>
+              </a:tr>
+              <a:tr h="370840">
+                <a:tc>
+                  <a:txBody>
+                    <a:bodyPr/>
+                    <a:lstStyle/>
+                    <a:p>
+                      <a:r>
+                        <a:rPr lang="en-US" dirty="0"/>
+                        <a:t>C#</a:t>
+                      </a:r>
+                    </a:p>
+                  </a:txBody>
+                  <a:tcPr/>
+                </a:tc>
+                <a:extLst>
+                  <a:ext uri="{0D108BD9-81ED-4DB2-BD59-A6C34878D82A}">
+                    <a16:rowId xmlns:a16="http://schemas.microsoft.com/office/drawing/2014/main" val="836295503"/>
+                  </a:ext>
+                </a:extLst>
+              </a:tr>
+              <a:tr h="370840">
+                <a:tc>
+                  <a:txBody>
+                    <a:bodyPr/>
+                    <a:lstStyle/>
+                    <a:p>
+                      <a:r>
+                        <a:rPr lang="en-US" dirty="0"/>
+                        <a:t>Visual Studio 2022</a:t>
+                      </a:r>
+                    </a:p>
+                  </a:txBody>
+                  <a:tcPr/>
+                </a:tc>
+                <a:extLst>
+                  <a:ext uri="{0D108BD9-81ED-4DB2-BD59-A6C34878D82A}">
+                    <a16:rowId xmlns:a16="http://schemas.microsoft.com/office/drawing/2014/main" val="247829621"/>
+                  </a:ext>
+                </a:extLst>
+              </a:tr>
+              <a:tr h="370840">
+                <a:tc>
+                  <a:txBody>
+                    <a:bodyPr/>
+                    <a:lstStyle/>
+                    <a:p>
+                      <a:r>
+                        <a:rPr lang="en-US" dirty="0"/>
+                        <a:t>.NET SDK 8.0</a:t>
+                      </a:r>
+                    </a:p>
+                  </a:txBody>
+                  <a:tcPr/>
+                </a:tc>
+                <a:extLst>
+                  <a:ext uri="{0D108BD9-81ED-4DB2-BD59-A6C34878D82A}">
+                    <a16:rowId xmlns:a16="http://schemas.microsoft.com/office/drawing/2014/main" val="2064168020"/>
+                  </a:ext>
+                </a:extLst>
+              </a:tr>
+            </a:tbl>
+          </a:graphicData>
+        </a:graphic>
+      </p:graphicFrame>
+      <p:pic>
+        <p:nvPicPr>
+          <p:cNvPr id="2050" name="Picture 2" descr="What is C#?">
+            <a:extLst>
+              <a:ext uri="{FF2B5EF4-FFF2-40B4-BE49-F238E27FC236}">
+                <a16:creationId xmlns:a16="http://schemas.microsoft.com/office/drawing/2014/main" id="{387D0CF9-0E80-6F71-D173-EA797471FDDF}"/>
+              </a:ext>
+            </a:extLst>
+          </p:cNvPr>
+          <p:cNvPicPr>
+            <a:picLocks noChangeAspect="1" noChangeArrowheads="1"/>
+          </p:cNvPicPr>
+          <p:nvPr/>
+        </p:nvPicPr>
+        <p:blipFill>
+          <a:blip r:embed="rId2">
+            <a:extLst>
+              <a:ext uri="{28A0092B-C50C-407E-A947-70E740481C1C}">
+                <a14:useLocalDpi xmlns:a14="http://schemas.microsoft.com/office/drawing/2010/main" val="0"/>
+              </a:ext>
+            </a:extLst>
+          </a:blip>
+          <a:srcRect/>
+          <a:stretch>
+            <a:fillRect/>
+          </a:stretch>
+        </p:blipFill>
+        <p:spPr bwMode="auto">
+          <a:xfrm>
+            <a:off x="1712782" y="3960043"/>
+            <a:ext cx="2695575" cy="1695450"/>
+          </a:xfrm>
+          <a:prstGeom prst="rect">
+            <a:avLst/>
+          </a:prstGeom>
+          <a:noFill/>
+          <a:extLst>
+            <a:ext uri="{909E8E84-426E-40DD-AFC4-6F175D3DCCD1}">
+              <a14:hiddenFill xmlns:a14="http://schemas.microsoft.com/office/drawing/2010/main">
+                <a:solidFill>
+                  <a:srgbClr val="FFFFFF"/>
+                </a:solidFill>
+              </a14:hiddenFill>
+            </a:ext>
+          </a:extLst>
+        </p:spPr>
+      </p:pic>
+      <p:pic>
+        <p:nvPicPr>
+          <p:cNvPr id="2052" name="Picture 4" descr="Visual Studio Community 2022 - Download and install on Windows | Microsoft  Store">
+            <a:extLst>
+              <a:ext uri="{FF2B5EF4-FFF2-40B4-BE49-F238E27FC236}">
+                <a16:creationId xmlns:a16="http://schemas.microsoft.com/office/drawing/2014/main" id="{AE3D63AB-1C50-9621-42AF-EEFB04FA77F0}"/>
+              </a:ext>
+            </a:extLst>
+          </p:cNvPr>
+          <p:cNvPicPr>
+            <a:picLocks noChangeAspect="1" noChangeArrowheads="1"/>
+          </p:cNvPicPr>
+          <p:nvPr/>
+        </p:nvPicPr>
+        <p:blipFill>
+          <a:blip r:embed="rId3">
+            <a:extLst>
+              <a:ext uri="{28A0092B-C50C-407E-A947-70E740481C1C}">
+                <a14:useLocalDpi xmlns:a14="http://schemas.microsoft.com/office/drawing/2010/main" val="0"/>
+              </a:ext>
+            </a:extLst>
+          </a:blip>
+          <a:srcRect/>
+          <a:stretch>
+            <a:fillRect/>
+          </a:stretch>
+        </p:blipFill>
+        <p:spPr bwMode="auto">
+          <a:xfrm>
+            <a:off x="5080654" y="3790359"/>
+            <a:ext cx="2030691" cy="2030691"/>
+          </a:xfrm>
+          <a:prstGeom prst="rect">
+            <a:avLst/>
+          </a:prstGeom>
+          <a:noFill/>
+          <a:extLst>
+            <a:ext uri="{909E8E84-426E-40DD-AFC4-6F175D3DCCD1}">
+              <a14:hiddenFill xmlns:a14="http://schemas.microsoft.com/office/drawing/2010/main">
+                <a:solidFill>
+                  <a:srgbClr val="FFFFFF"/>
+                </a:solidFill>
+              </a14:hiddenFill>
+            </a:ext>
+          </a:extLst>
+        </p:spPr>
+      </p:pic>
+      <p:pic>
+        <p:nvPicPr>
+          <p:cNvPr id="6" name="Picture 5">
+            <a:extLst>
+              <a:ext uri="{FF2B5EF4-FFF2-40B4-BE49-F238E27FC236}">
+                <a16:creationId xmlns:a16="http://schemas.microsoft.com/office/drawing/2014/main" id="{65E6CF5A-FEA7-38A4-9499-FC4086946BFA}"/>
+              </a:ext>
+            </a:extLst>
+          </p:cNvPr>
+          <p:cNvPicPr>
+            <a:picLocks noChangeAspect="1"/>
+          </p:cNvPicPr>
+          <p:nvPr/>
+        </p:nvPicPr>
+        <p:blipFill>
+          <a:blip r:embed="rId4"/>
+          <a:stretch>
+            <a:fillRect/>
+          </a:stretch>
+        </p:blipFill>
+        <p:spPr>
+          <a:xfrm>
+            <a:off x="8319825" y="3944530"/>
+            <a:ext cx="1792140" cy="1710963"/>
+          </a:xfrm>
+          <a:prstGeom prst="rect">
+            <a:avLst/>
+          </a:prstGeom>
+        </p:spPr>
+      </p:pic>
+    </p:spTree>
+    <p:extLst>
+      <p:ext uri="{BB962C8B-B14F-4D97-AF65-F5344CB8AC3E}">
+        <p14:creationId xmlns:p14="http://schemas.microsoft.com/office/powerpoint/2010/main" val="2800893774"/>
+      </p:ext>
+    </p:extLst>
+  </p:cSld>
+  <p:clrMapOvr>
+    <a:masterClrMapping/>
+  </p:clrMapOvr>
+</p:sld>
+</file>
+
+<file path=ppt/slides/slide8.xml><?xml version="1.0" encoding="utf-8"?>
+<p:sld xmlns:a="http://schemas.openxmlformats.org/drawingml/2006/main" xmlns:r="http://schemas.openxmlformats.org/officeDocument/2006/relationships" xmlns:p="http://schemas.openxmlformats.org/presentationml/2006/main">
+  <p:cSld>
+    <p:spTree>
+      <p:nvGrpSpPr>
+        <p:cNvPr id="1" name=""/>
+        <p:cNvGrpSpPr/>
+        <p:nvPr/>
+      </p:nvGrpSpPr>
+      <p:grpSpPr>
+        <a:xfrm>
+          <a:off x="0" y="0"/>
+          <a:ext cx="0" cy="0"/>
+          <a:chOff x="0" y="0"/>
+          <a:chExt cx="0" cy="0"/>
+        </a:xfrm>
+      </p:grpSpPr>
+      <p:sp>
+        <p:nvSpPr>
+          <p:cNvPr id="2" name="Title 1">
+            <a:extLst>
+              <a:ext uri="{FF2B5EF4-FFF2-40B4-BE49-F238E27FC236}">
+                <a16:creationId xmlns:a16="http://schemas.microsoft.com/office/drawing/2014/main" id="{710BF1D6-28EF-11C5-B7E1-E5D950B951E8}"/>
+              </a:ext>
+            </a:extLst>
+          </p:cNvPr>
+          <p:cNvSpPr>
+            <a:spLocks noGrp="1"/>
+          </p:cNvSpPr>
+          <p:nvPr>
+            <p:ph type="title"/>
+          </p:nvPr>
+        </p:nvSpPr>
+        <p:spPr/>
+        <p:txBody>
+          <a:bodyPr/>
+          <a:lstStyle/>
+          <a:p>
+            <a:r>
+              <a:rPr lang="en-US" dirty="0"/>
+              <a:t>Resources</a:t>
+            </a:r>
+          </a:p>
+        </p:txBody>
+      </p:sp>
+      <p:sp>
+        <p:nvSpPr>
+          <p:cNvPr id="3" name="Content Placeholder 2">
+            <a:extLst>
+              <a:ext uri="{FF2B5EF4-FFF2-40B4-BE49-F238E27FC236}">
+                <a16:creationId xmlns:a16="http://schemas.microsoft.com/office/drawing/2014/main" id="{9676D251-8673-E746-2C30-65C1874288E1}"/>
+              </a:ext>
+            </a:extLst>
+          </p:cNvPr>
+          <p:cNvSpPr>
+            <a:spLocks noGrp="1"/>
+          </p:cNvSpPr>
+          <p:nvPr>
+            <p:ph idx="1"/>
+          </p:nvPr>
+        </p:nvSpPr>
+        <p:spPr/>
+        <p:txBody>
+          <a:bodyPr/>
+          <a:lstStyle/>
+          <a:p>
+            <a:r>
+              <a:rPr lang="en-US" dirty="0">
+                <a:hlinkClick r:id="rId2"/>
+              </a:rPr>
+              <a:t>https://github.com/bhushanpoojary/MultiThreadingDotNet</a:t>
+            </a:r>
+            <a:endParaRPr lang="en-US" dirty="0"/>
+          </a:p>
+          <a:p>
+            <a:endParaRPr lang="en-US" dirty="0"/>
+          </a:p>
+        </p:txBody>
+      </p:sp>
+      <p:pic>
+        <p:nvPicPr>
+          <p:cNvPr id="5" name="Picture 4">
+            <a:extLst>
+              <a:ext uri="{FF2B5EF4-FFF2-40B4-BE49-F238E27FC236}">
+                <a16:creationId xmlns:a16="http://schemas.microsoft.com/office/drawing/2014/main" id="{3270659D-5A34-F151-802B-33C5D1CB20FF}"/>
+              </a:ext>
+            </a:extLst>
+          </p:cNvPr>
+          <p:cNvPicPr>
+            <a:picLocks noChangeAspect="1"/>
+          </p:cNvPicPr>
+          <p:nvPr/>
+        </p:nvPicPr>
+        <p:blipFill>
+          <a:blip r:embed="rId3"/>
+          <a:stretch>
+            <a:fillRect/>
+          </a:stretch>
+        </p:blipFill>
+        <p:spPr>
+          <a:xfrm>
+            <a:off x="3864988" y="3017362"/>
+            <a:ext cx="2077039" cy="2077039"/>
+          </a:xfrm>
+          <a:prstGeom prst="rect">
+            <a:avLst/>
+          </a:prstGeom>
+        </p:spPr>
+      </p:pic>
+    </p:spTree>
+    <p:extLst>
+      <p:ext uri="{BB962C8B-B14F-4D97-AF65-F5344CB8AC3E}">
+        <p14:creationId xmlns:p14="http://schemas.microsoft.com/office/powerpoint/2010/main" val="492216881"/>
+      </p:ext>
+    </p:extLst>
+  </p:cSld>
+  <p:clrMapOvr>
+    <a:masterClrMapping/>
+  </p:clrMapOvr>
+</p:sld>
+</file>
+
+<file path=ppt/slides/slide9.xml><?xml version="1.0" encoding="utf-8"?>
+<p:sld xmlns:a="http://schemas.openxmlformats.org/drawingml/2006/main" xmlns:r="http://schemas.openxmlformats.org/officeDocument/2006/relationships" xmlns:p="http://schemas.openxmlformats.org/presentationml/2006/main">
+  <p:cSld>
+    <p:spTree>
+      <p:nvGrpSpPr>
+        <p:cNvPr id="1" name=""/>
+        <p:cNvGrpSpPr/>
+        <p:nvPr/>
+      </p:nvGrpSpPr>
+      <p:grpSpPr>
+        <a:xfrm>
+          <a:off x="0" y="0"/>
+          <a:ext cx="0" cy="0"/>
+          <a:chOff x="0" y="0"/>
+          <a:chExt cx="0" cy="0"/>
+        </a:xfrm>
+      </p:grpSpPr>
+      <p:sp>
+        <p:nvSpPr>
+          <p:cNvPr id="2" name="Title 1">
+            <a:extLst>
+              <a:ext uri="{FF2B5EF4-FFF2-40B4-BE49-F238E27FC236}">
+                <a16:creationId xmlns:a16="http://schemas.microsoft.com/office/drawing/2014/main" id="{7D09D2D1-3609-93EC-8828-05DD82B8EDA9}"/>
+              </a:ext>
+            </a:extLst>
+          </p:cNvPr>
+          <p:cNvSpPr>
+            <a:spLocks noGrp="1"/>
+          </p:cNvSpPr>
+          <p:nvPr>
+            <p:ph type="title"/>
+          </p:nvPr>
+        </p:nvSpPr>
+        <p:spPr/>
+        <p:txBody>
+          <a:bodyPr/>
+          <a:lstStyle/>
+          <a:p>
+            <a:r>
+              <a:rPr lang="en-US" dirty="0"/>
+              <a:t>See You in the Next Module!</a:t>
+            </a:r>
+          </a:p>
+        </p:txBody>
+      </p:sp>
+      <p:sp>
+        <p:nvSpPr>
+          <p:cNvPr id="3" name="Content Placeholder 2">
+            <a:extLst>
+              <a:ext uri="{FF2B5EF4-FFF2-40B4-BE49-F238E27FC236}">
+                <a16:creationId xmlns:a16="http://schemas.microsoft.com/office/drawing/2014/main" id="{6EB83771-7D0D-2DC4-3741-2D4994DF405C}"/>
+              </a:ext>
+            </a:extLst>
+          </p:cNvPr>
+          <p:cNvSpPr>
+            <a:spLocks noGrp="1"/>
+          </p:cNvSpPr>
+          <p:nvPr>
+            <p:ph idx="1"/>
+          </p:nvPr>
+        </p:nvSpPr>
+        <p:spPr/>
+        <p:txBody>
+          <a:bodyPr/>
+          <a:lstStyle/>
+          <a:p>
+            <a:r>
+              <a:rPr lang="en-US" dirty="0"/>
+              <a:t>"I'm excited to be your guide on this journey. Let’s dive into the world of multithreading and make your .NET apps faster and smarter. See you in the next module!"</a:t>
+            </a:r>
+          </a:p>
+        </p:txBody>
+      </p:sp>
+    </p:spTree>
+    <p:extLst>
+      <p:ext uri="{BB962C8B-B14F-4D97-AF65-F5344CB8AC3E}">
+        <p14:creationId xmlns:p14="http://schemas.microsoft.com/office/powerpoint/2010/main" val="930953412"/>
       </p:ext>
     </p:extLst>
   </p:cSld>

</xml_diff>

<commit_message>
Added thread pool code and PPT
</commit_message>
<xml_diff>
--- a/PPT/Mastering Multithreading in DotNet.pptx
+++ b/PPT/Mastering Multithreading in DotNet.pptx
@@ -14,6 +14,13 @@
     <p:sldId id="314" r:id="rId11"/>
     <p:sldId id="312" r:id="rId12"/>
     <p:sldId id="315" r:id="rId13"/>
+    <p:sldId id="316" r:id="rId14"/>
+    <p:sldId id="317" r:id="rId15"/>
+    <p:sldId id="318" r:id="rId16"/>
+    <p:sldId id="319" r:id="rId17"/>
+    <p:sldId id="320" r:id="rId18"/>
+    <p:sldId id="321" r:id="rId19"/>
+    <p:sldId id="322" r:id="rId20"/>
   </p:sldIdLst>
   <p:sldSz cx="12192000" cy="6858000"/>
   <p:notesSz cx="6858000" cy="9144000"/>
@@ -3358,7 +3365,7 @@
           <a:p>
             <a:fld id="{9184DA70-C731-4C70-880D-CCD4705E623C}" type="datetime1">
               <a:rPr lang="en-US" smtClean="0"/>
-              <a:t>5/4/2025</a:t>
+              <a:t>5/5/2025</a:t>
             </a:fld>
             <a:endParaRPr lang="en-US" dirty="0"/>
           </a:p>
@@ -3546,7 +3553,7 @@
           <a:p>
             <a:fld id="{4BE1D723-8F53-4F53-90B0-1982A396982E}" type="datetime1">
               <a:rPr lang="en-US" smtClean="0"/>
-              <a:t>5/4/2025</a:t>
+              <a:t>5/5/2025</a:t>
             </a:fld>
             <a:endParaRPr lang="en-US" dirty="0"/>
           </a:p>
@@ -3919,7 +3926,7 @@
           <a:p>
             <a:fld id="{97669AF7-7BEB-44E4-9852-375E34362B5B}" type="datetime1">
               <a:rPr lang="en-US" smtClean="0"/>
-              <a:t>5/4/2025</a:t>
+              <a:t>5/5/2025</a:t>
             </a:fld>
             <a:endParaRPr lang="en-US" dirty="0"/>
           </a:p>
@@ -4174,7 +4181,7 @@
           <a:p>
             <a:fld id="{BAAAC38D-0552-4C82-B593-E6124DFADBE2}" type="datetime1">
               <a:rPr lang="en-US" smtClean="0"/>
-              <a:t>5/4/2025</a:t>
+              <a:t>5/5/2025</a:t>
             </a:fld>
             <a:endParaRPr lang="en-US" dirty="0"/>
           </a:p>
@@ -4571,7 +4578,7 @@
           <a:p>
             <a:fld id="{D9DF0F1C-5577-4ACB-BB62-DF8F3C494C7E}" type="datetime1">
               <a:rPr lang="en-US" smtClean="0"/>
-              <a:t>5/4/2025</a:t>
+              <a:t>5/5/2025</a:t>
             </a:fld>
             <a:endParaRPr lang="en-US" dirty="0"/>
           </a:p>
@@ -4707,7 +4714,7 @@
           <a:p>
             <a:fld id="{1775B394-D9F9-4F0C-B15D-605F45CB9E9F}" type="datetime1">
               <a:rPr lang="en-US" smtClean="0"/>
-              <a:t>5/4/2025</a:t>
+              <a:t>5/5/2025</a:t>
             </a:fld>
             <a:endParaRPr lang="en-US" dirty="0"/>
           </a:p>
@@ -4864,7 +4871,7 @@
           <a:p>
             <a:fld id="{39667345-2558-425A-8533-9BFDBCE15005}" type="datetime1">
               <a:rPr lang="en-US" smtClean="0"/>
-              <a:t>5/4/2025</a:t>
+              <a:t>5/5/2025</a:t>
             </a:fld>
             <a:endParaRPr lang="en-US" dirty="0"/>
           </a:p>
@@ -5193,7 +5200,7 @@
           <a:p>
             <a:fld id="{92BEA474-078D-4E9B-9B14-09A87B19DC46}" type="datetime1">
               <a:rPr lang="en-US" smtClean="0"/>
-              <a:t>5/4/2025</a:t>
+              <a:t>5/5/2025</a:t>
             </a:fld>
             <a:endParaRPr lang="en-US" dirty="0"/>
           </a:p>
@@ -5543,7 +5550,7 @@
           <a:p>
             <a:fld id="{4907D986-8816-4272-A432-0437A28A9828}" type="datetime1">
               <a:rPr lang="en-US" smtClean="0"/>
-              <a:t>5/4/2025</a:t>
+              <a:t>5/5/2025</a:t>
             </a:fld>
             <a:endParaRPr lang="en-US" dirty="0"/>
           </a:p>
@@ -5804,7 +5811,7 @@
           <a:p>
             <a:fld id="{62D6E202-B606-4609-B914-27C9371A1F6D}" type="datetime1">
               <a:rPr lang="en-US" smtClean="0"/>
-              <a:t>5/4/2025</a:t>
+              <a:t>5/5/2025</a:t>
             </a:fld>
             <a:endParaRPr lang="en-US" dirty="0"/>
           </a:p>
@@ -6630,6 +6637,2175 @@
     <p:extLst>
       <p:ext uri="{BB962C8B-B14F-4D97-AF65-F5344CB8AC3E}">
         <p14:creationId xmlns:p14="http://schemas.microsoft.com/office/powerpoint/2010/main" val="895915843"/>
+      </p:ext>
+    </p:extLst>
+  </p:cSld>
+  <p:clrMapOvr>
+    <a:masterClrMapping/>
+  </p:clrMapOvr>
+</p:sld>
+</file>
+
+<file path=ppt/slides/slide10.xml><?xml version="1.0" encoding="utf-8"?>
+<p:sld xmlns:a="http://schemas.openxmlformats.org/drawingml/2006/main" xmlns:r="http://schemas.openxmlformats.org/officeDocument/2006/relationships" xmlns:p="http://schemas.openxmlformats.org/presentationml/2006/main">
+  <p:cSld>
+    <p:spTree>
+      <p:nvGrpSpPr>
+        <p:cNvPr id="1" name=""/>
+        <p:cNvGrpSpPr/>
+        <p:nvPr/>
+      </p:nvGrpSpPr>
+      <p:grpSpPr>
+        <a:xfrm>
+          <a:off x="0" y="0"/>
+          <a:ext cx="0" cy="0"/>
+          <a:chOff x="0" y="0"/>
+          <a:chExt cx="0" cy="0"/>
+        </a:xfrm>
+      </p:grpSpPr>
+      <p:sp>
+        <p:nvSpPr>
+          <p:cNvPr id="2" name="Title 1">
+            <a:extLst>
+              <a:ext uri="{FF2B5EF4-FFF2-40B4-BE49-F238E27FC236}">
+                <a16:creationId xmlns:a16="http://schemas.microsoft.com/office/drawing/2014/main" id="{BF2C110E-7087-DB47-4088-493EBD65342B}"/>
+              </a:ext>
+            </a:extLst>
+          </p:cNvPr>
+          <p:cNvSpPr>
+            <a:spLocks noGrp="1"/>
+          </p:cNvSpPr>
+          <p:nvPr>
+            <p:ph type="title"/>
+          </p:nvPr>
+        </p:nvSpPr>
+        <p:spPr/>
+        <p:txBody>
+          <a:bodyPr>
+            <a:normAutofit/>
+          </a:bodyPr>
+          <a:lstStyle/>
+          <a:p>
+            <a:r>
+              <a:rPr lang="en-US" kern="100" dirty="0">
+                <a:effectLst/>
+                <a:latin typeface="Calibri" panose="020F0502020204030204" pitchFamily="34" charset="0"/>
+                <a:ea typeface="Calibri" panose="020F0502020204030204" pitchFamily="34" charset="0"/>
+                <a:cs typeface="Times New Roman" panose="02020603050405020304" pitchFamily="18" charset="0"/>
+              </a:rPr>
+              <a:t>Setting up the environment (Visual Studio, .NET SDK)</a:t>
+            </a:r>
+            <a:endParaRPr lang="en-US" dirty="0"/>
+          </a:p>
+        </p:txBody>
+      </p:sp>
+      <p:pic>
+        <p:nvPicPr>
+          <p:cNvPr id="4" name="Picture 4" descr="Visual Studio Community 2022 - Download and install on Windows | Microsoft  Store">
+            <a:extLst>
+              <a:ext uri="{FF2B5EF4-FFF2-40B4-BE49-F238E27FC236}">
+                <a16:creationId xmlns:a16="http://schemas.microsoft.com/office/drawing/2014/main" id="{A4C02EF9-B5AA-D5D9-C658-93F75D85BBC7}"/>
+              </a:ext>
+            </a:extLst>
+          </p:cNvPr>
+          <p:cNvPicPr>
+            <a:picLocks noGrp="1" noChangeAspect="1" noChangeArrowheads="1"/>
+          </p:cNvPicPr>
+          <p:nvPr>
+            <p:ph idx="1"/>
+          </p:nvPr>
+        </p:nvPicPr>
+        <p:blipFill>
+          <a:blip r:embed="rId2">
+            <a:extLst>
+              <a:ext uri="{28A0092B-C50C-407E-A947-70E740481C1C}">
+                <a14:useLocalDpi xmlns:a14="http://schemas.microsoft.com/office/drawing/2010/main" val="0"/>
+              </a:ext>
+            </a:extLst>
+          </a:blip>
+          <a:srcRect/>
+          <a:stretch>
+            <a:fillRect/>
+          </a:stretch>
+        </p:blipFill>
+        <p:spPr bwMode="auto">
+          <a:xfrm>
+            <a:off x="4281984" y="4127123"/>
+            <a:ext cx="905652" cy="905652"/>
+          </a:xfrm>
+          <a:prstGeom prst="rect">
+            <a:avLst/>
+          </a:prstGeom>
+          <a:noFill/>
+          <a:extLst>
+            <a:ext uri="{909E8E84-426E-40DD-AFC4-6F175D3DCCD1}">
+              <a14:hiddenFill xmlns:a14="http://schemas.microsoft.com/office/drawing/2010/main">
+                <a:solidFill>
+                  <a:srgbClr val="FFFFFF"/>
+                </a:solidFill>
+              </a14:hiddenFill>
+            </a:ext>
+          </a:extLst>
+        </p:spPr>
+      </p:pic>
+      <p:graphicFrame>
+        <p:nvGraphicFramePr>
+          <p:cNvPr id="5" name="Table 4">
+            <a:extLst>
+              <a:ext uri="{FF2B5EF4-FFF2-40B4-BE49-F238E27FC236}">
+                <a16:creationId xmlns:a16="http://schemas.microsoft.com/office/drawing/2014/main" id="{8603ECFA-C91E-E837-A308-428358C20CAC}"/>
+              </a:ext>
+            </a:extLst>
+          </p:cNvPr>
+          <p:cNvGraphicFramePr>
+            <a:graphicFrameLocks noGrp="1"/>
+          </p:cNvGraphicFramePr>
+          <p:nvPr>
+            <p:extLst>
+              <p:ext uri="{D42A27DB-BD31-4B8C-83A1-F6EECF244321}">
+                <p14:modId xmlns:p14="http://schemas.microsoft.com/office/powerpoint/2010/main" val="4157949690"/>
+              </p:ext>
+            </p:extLst>
+          </p:nvPr>
+        </p:nvGraphicFramePr>
+        <p:xfrm>
+          <a:off x="1307722" y="2172631"/>
+          <a:ext cx="9927628" cy="1381760"/>
+        </p:xfrm>
+        <a:graphic>
+          <a:graphicData uri="http://schemas.openxmlformats.org/drawingml/2006/table">
+            <a:tbl>
+              <a:tblPr firstRow="1" bandRow="1">
+                <a:tableStyleId>{5C22544A-7EE6-4342-B048-85BDC9FD1C3A}</a:tableStyleId>
+              </a:tblPr>
+              <a:tblGrid>
+                <a:gridCol w="2730124">
+                  <a:extLst>
+                    <a:ext uri="{9D8B030D-6E8A-4147-A177-3AD203B41FA5}">
+                      <a16:colId xmlns:a16="http://schemas.microsoft.com/office/drawing/2014/main" val="4172380222"/>
+                    </a:ext>
+                  </a:extLst>
+                </a:gridCol>
+                <a:gridCol w="7197504">
+                  <a:extLst>
+                    <a:ext uri="{9D8B030D-6E8A-4147-A177-3AD203B41FA5}">
+                      <a16:colId xmlns:a16="http://schemas.microsoft.com/office/drawing/2014/main" val="3300661665"/>
+                    </a:ext>
+                  </a:extLst>
+                </a:gridCol>
+              </a:tblGrid>
+              <a:tr h="370840">
+                <a:tc>
+                  <a:txBody>
+                    <a:bodyPr/>
+                    <a:lstStyle/>
+                    <a:p>
+                      <a:r>
+                        <a:rPr lang="en-US" dirty="0"/>
+                        <a:t>Name</a:t>
+                      </a:r>
+                    </a:p>
+                  </a:txBody>
+                  <a:tcPr/>
+                </a:tc>
+                <a:tc>
+                  <a:txBody>
+                    <a:bodyPr/>
+                    <a:lstStyle/>
+                    <a:p>
+                      <a:r>
+                        <a:rPr lang="en-US" dirty="0" err="1"/>
+                        <a:t>Url</a:t>
+                      </a:r>
+                      <a:endParaRPr lang="en-US" dirty="0"/>
+                    </a:p>
+                  </a:txBody>
+                  <a:tcPr/>
+                </a:tc>
+                <a:extLst>
+                  <a:ext uri="{0D108BD9-81ED-4DB2-BD59-A6C34878D82A}">
+                    <a16:rowId xmlns:a16="http://schemas.microsoft.com/office/drawing/2014/main" val="1110177404"/>
+                  </a:ext>
+                </a:extLst>
+              </a:tr>
+              <a:tr h="370840">
+                <a:tc>
+                  <a:txBody>
+                    <a:bodyPr/>
+                    <a:lstStyle/>
+                    <a:p>
+                      <a:pPr marL="0" marR="0" lvl="0" indent="0" algn="l" defTabSz="914400" rtl="0" eaLnBrk="1" fontAlgn="auto" latinLnBrk="0" hangingPunct="1">
+                        <a:lnSpc>
+                          <a:spcPct val="100000"/>
+                        </a:lnSpc>
+                        <a:spcBef>
+                          <a:spcPts val="0"/>
+                        </a:spcBef>
+                        <a:spcAft>
+                          <a:spcPts val="0"/>
+                        </a:spcAft>
+                        <a:buClrTx/>
+                        <a:buSzTx/>
+                        <a:buFontTx/>
+                        <a:buNone/>
+                        <a:tabLst/>
+                        <a:defRPr/>
+                      </a:pPr>
+                      <a:r>
+                        <a:rPr lang="en-US" sz="1800" b="0" i="0" kern="1200" dirty="0">
+                          <a:solidFill>
+                            <a:schemeClr val="dk1"/>
+                          </a:solidFill>
+                          <a:effectLst/>
+                          <a:latin typeface="+mn-lt"/>
+                          <a:ea typeface="+mn-ea"/>
+                          <a:cs typeface="+mn-cs"/>
+                        </a:rPr>
+                        <a:t>Visual Studio Community 2022</a:t>
+                      </a:r>
+                    </a:p>
+                  </a:txBody>
+                  <a:tcPr/>
+                </a:tc>
+                <a:tc>
+                  <a:txBody>
+                    <a:bodyPr/>
+                    <a:lstStyle/>
+                    <a:p>
+                      <a:r>
+                        <a:rPr lang="en-US" dirty="0"/>
+                        <a:t>https://visualstudio.microsoft.com/vs/community/</a:t>
+                      </a:r>
+                    </a:p>
+                  </a:txBody>
+                  <a:tcPr/>
+                </a:tc>
+                <a:extLst>
+                  <a:ext uri="{0D108BD9-81ED-4DB2-BD59-A6C34878D82A}">
+                    <a16:rowId xmlns:a16="http://schemas.microsoft.com/office/drawing/2014/main" val="723696455"/>
+                  </a:ext>
+                </a:extLst>
+              </a:tr>
+              <a:tr h="370840">
+                <a:tc>
+                  <a:txBody>
+                    <a:bodyPr/>
+                    <a:lstStyle/>
+                    <a:p>
+                      <a:r>
+                        <a:rPr lang="en-US" dirty="0"/>
+                        <a:t>.NET SDK 8</a:t>
+                      </a:r>
+                    </a:p>
+                  </a:txBody>
+                  <a:tcPr/>
+                </a:tc>
+                <a:tc>
+                  <a:txBody>
+                    <a:bodyPr/>
+                    <a:lstStyle/>
+                    <a:p>
+                      <a:r>
+                        <a:rPr lang="en-US" dirty="0"/>
+                        <a:t>https://dotnet.microsoft.com/en-us/download/dotnet/8.0</a:t>
+                      </a:r>
+                    </a:p>
+                  </a:txBody>
+                  <a:tcPr/>
+                </a:tc>
+                <a:extLst>
+                  <a:ext uri="{0D108BD9-81ED-4DB2-BD59-A6C34878D82A}">
+                    <a16:rowId xmlns:a16="http://schemas.microsoft.com/office/drawing/2014/main" val="350345609"/>
+                  </a:ext>
+                </a:extLst>
+              </a:tr>
+            </a:tbl>
+          </a:graphicData>
+        </a:graphic>
+      </p:graphicFrame>
+      <p:pic>
+        <p:nvPicPr>
+          <p:cNvPr id="7" name="Picture 6">
+            <a:extLst>
+              <a:ext uri="{FF2B5EF4-FFF2-40B4-BE49-F238E27FC236}">
+                <a16:creationId xmlns:a16="http://schemas.microsoft.com/office/drawing/2014/main" id="{C83CCE40-8980-899E-0A25-90F5D3ADA7C7}"/>
+              </a:ext>
+            </a:extLst>
+          </p:cNvPr>
+          <p:cNvPicPr>
+            <a:picLocks noChangeAspect="1"/>
+          </p:cNvPicPr>
+          <p:nvPr/>
+        </p:nvPicPr>
+        <p:blipFill>
+          <a:blip r:embed="rId3"/>
+          <a:stretch>
+            <a:fillRect/>
+          </a:stretch>
+        </p:blipFill>
+        <p:spPr>
+          <a:xfrm>
+            <a:off x="5739587" y="4127123"/>
+            <a:ext cx="948621" cy="905652"/>
+          </a:xfrm>
+          <a:prstGeom prst="rect">
+            <a:avLst/>
+          </a:prstGeom>
+        </p:spPr>
+      </p:pic>
+    </p:spTree>
+    <p:extLst>
+      <p:ext uri="{BB962C8B-B14F-4D97-AF65-F5344CB8AC3E}">
+        <p14:creationId xmlns:p14="http://schemas.microsoft.com/office/powerpoint/2010/main" val="3455485619"/>
+      </p:ext>
+    </p:extLst>
+  </p:cSld>
+  <p:clrMapOvr>
+    <a:masterClrMapping/>
+  </p:clrMapOvr>
+</p:sld>
+</file>
+
+<file path=ppt/slides/slide11.xml><?xml version="1.0" encoding="utf-8"?>
+<p:sld xmlns:a="http://schemas.openxmlformats.org/drawingml/2006/main" xmlns:r="http://schemas.openxmlformats.org/officeDocument/2006/relationships" xmlns:p="http://schemas.openxmlformats.org/presentationml/2006/main">
+  <p:cSld>
+    <p:spTree>
+      <p:nvGrpSpPr>
+        <p:cNvPr id="1" name=""/>
+        <p:cNvGrpSpPr/>
+        <p:nvPr/>
+      </p:nvGrpSpPr>
+      <p:grpSpPr>
+        <a:xfrm>
+          <a:off x="0" y="0"/>
+          <a:ext cx="0" cy="0"/>
+          <a:chOff x="0" y="0"/>
+          <a:chExt cx="0" cy="0"/>
+        </a:xfrm>
+      </p:grpSpPr>
+      <p:sp>
+        <p:nvSpPr>
+          <p:cNvPr id="2" name="Title 1">
+            <a:extLst>
+              <a:ext uri="{FF2B5EF4-FFF2-40B4-BE49-F238E27FC236}">
+                <a16:creationId xmlns:a16="http://schemas.microsoft.com/office/drawing/2014/main" id="{6F8822ED-B7D8-B5AE-CA7A-5D5479CACB8F}"/>
+              </a:ext>
+            </a:extLst>
+          </p:cNvPr>
+          <p:cNvSpPr>
+            <a:spLocks noGrp="1"/>
+          </p:cNvSpPr>
+          <p:nvPr>
+            <p:ph type="title"/>
+          </p:nvPr>
+        </p:nvSpPr>
+        <p:spPr/>
+        <p:txBody>
+          <a:bodyPr/>
+          <a:lstStyle/>
+          <a:p>
+            <a:r>
+              <a:rPr lang="en-US" dirty="0"/>
+              <a:t>Thread</a:t>
+            </a:r>
+          </a:p>
+        </p:txBody>
+      </p:sp>
+      <p:sp>
+        <p:nvSpPr>
+          <p:cNvPr id="3" name="Content Placeholder 2">
+            <a:extLst>
+              <a:ext uri="{FF2B5EF4-FFF2-40B4-BE49-F238E27FC236}">
+                <a16:creationId xmlns:a16="http://schemas.microsoft.com/office/drawing/2014/main" id="{1B5BFD9E-4864-23B1-5AAE-01DF18F1CC96}"/>
+              </a:ext>
+            </a:extLst>
+          </p:cNvPr>
+          <p:cNvSpPr>
+            <a:spLocks noGrp="1"/>
+          </p:cNvSpPr>
+          <p:nvPr>
+            <p:ph idx="1"/>
+          </p:nvPr>
+        </p:nvSpPr>
+        <p:spPr/>
+        <p:txBody>
+          <a:bodyPr/>
+          <a:lstStyle/>
+          <a:p>
+            <a:r>
+              <a:rPr lang="en-US" b="1" dirty="0"/>
+              <a:t>Thread </a:t>
+            </a:r>
+            <a:r>
+              <a:rPr lang="en-US" b="1" dirty="0" err="1"/>
+              <a:t>thread</a:t>
+            </a:r>
+            <a:r>
+              <a:rPr lang="en-US" b="1" dirty="0"/>
+              <a:t> = new Thread</a:t>
+            </a:r>
+            <a:r>
+              <a:rPr lang="en-US" dirty="0"/>
+              <a:t>(() =&gt;</a:t>
+            </a:r>
+          </a:p>
+          <a:p>
+            <a:r>
+              <a:rPr lang="en-US" dirty="0"/>
+              <a:t>{</a:t>
+            </a:r>
+          </a:p>
+          <a:p>
+            <a:r>
+              <a:rPr lang="en-US" dirty="0"/>
+              <a:t>    </a:t>
+            </a:r>
+            <a:r>
+              <a:rPr lang="en-US" dirty="0" err="1"/>
+              <a:t>Console.WriteLine</a:t>
+            </a:r>
+            <a:r>
+              <a:rPr lang="en-US" dirty="0"/>
+              <a:t>("Running in a separate thread");</a:t>
+            </a:r>
+          </a:p>
+          <a:p>
+            <a:r>
+              <a:rPr lang="en-US" dirty="0"/>
+              <a:t>});</a:t>
+            </a:r>
+          </a:p>
+          <a:p>
+            <a:r>
+              <a:rPr lang="en-US" dirty="0" err="1"/>
+              <a:t>thread.Start</a:t>
+            </a:r>
+            <a:r>
+              <a:rPr lang="en-US" dirty="0"/>
+              <a:t>();</a:t>
+            </a:r>
+          </a:p>
+          <a:p>
+            <a:endParaRPr lang="en-US" dirty="0"/>
+          </a:p>
+        </p:txBody>
+      </p:sp>
+      <p:graphicFrame>
+        <p:nvGraphicFramePr>
+          <p:cNvPr id="5" name="Table 4">
+            <a:extLst>
+              <a:ext uri="{FF2B5EF4-FFF2-40B4-BE49-F238E27FC236}">
+                <a16:creationId xmlns:a16="http://schemas.microsoft.com/office/drawing/2014/main" id="{2AF27341-CA05-0624-D9DF-1610759453FE}"/>
+              </a:ext>
+            </a:extLst>
+          </p:cNvPr>
+          <p:cNvGraphicFramePr>
+            <a:graphicFrameLocks noGrp="1"/>
+          </p:cNvGraphicFramePr>
+          <p:nvPr>
+            <p:extLst>
+              <p:ext uri="{D42A27DB-BD31-4B8C-83A1-F6EECF244321}">
+                <p14:modId xmlns:p14="http://schemas.microsoft.com/office/powerpoint/2010/main" val="1277999764"/>
+              </p:ext>
+            </p:extLst>
+          </p:nvPr>
+        </p:nvGraphicFramePr>
+        <p:xfrm>
+          <a:off x="1660808" y="4911421"/>
+          <a:ext cx="8128000" cy="1112520"/>
+        </p:xfrm>
+        <a:graphic>
+          <a:graphicData uri="http://schemas.openxmlformats.org/drawingml/2006/table">
+            <a:tbl>
+              <a:tblPr firstRow="1" bandRow="1">
+                <a:tableStyleId>{5C22544A-7EE6-4342-B048-85BDC9FD1C3A}</a:tableStyleId>
+              </a:tblPr>
+              <a:tblGrid>
+                <a:gridCol w="720253">
+                  <a:extLst>
+                    <a:ext uri="{9D8B030D-6E8A-4147-A177-3AD203B41FA5}">
+                      <a16:colId xmlns:a16="http://schemas.microsoft.com/office/drawing/2014/main" val="1710146614"/>
+                    </a:ext>
+                  </a:extLst>
+                </a:gridCol>
+                <a:gridCol w="7407747">
+                  <a:extLst>
+                    <a:ext uri="{9D8B030D-6E8A-4147-A177-3AD203B41FA5}">
+                      <a16:colId xmlns:a16="http://schemas.microsoft.com/office/drawing/2014/main" val="2688824305"/>
+                    </a:ext>
+                  </a:extLst>
+                </a:gridCol>
+              </a:tblGrid>
+              <a:tr h="370840">
+                <a:tc>
+                  <a:txBody>
+                    <a:bodyPr/>
+                    <a:lstStyle/>
+                    <a:p>
+                      <a:endParaRPr lang="en-US" dirty="0"/>
+                    </a:p>
+                  </a:txBody>
+                  <a:tcPr/>
+                </a:tc>
+                <a:tc>
+                  <a:txBody>
+                    <a:bodyPr/>
+                    <a:lstStyle/>
+                    <a:p>
+                      <a:r>
+                        <a:rPr lang="en-US" dirty="0"/>
+                        <a:t>Pros and Cons</a:t>
+                      </a:r>
+                    </a:p>
+                  </a:txBody>
+                  <a:tcPr/>
+                </a:tc>
+                <a:extLst>
+                  <a:ext uri="{0D108BD9-81ED-4DB2-BD59-A6C34878D82A}">
+                    <a16:rowId xmlns:a16="http://schemas.microsoft.com/office/drawing/2014/main" val="4168608603"/>
+                  </a:ext>
+                </a:extLst>
+              </a:tr>
+              <a:tr h="370840">
+                <a:tc>
+                  <a:txBody>
+                    <a:bodyPr/>
+                    <a:lstStyle/>
+                    <a:p>
+                      <a:endParaRPr lang="en-US" dirty="0"/>
+                    </a:p>
+                  </a:txBody>
+                  <a:tcPr/>
+                </a:tc>
+                <a:tc>
+                  <a:txBody>
+                    <a:bodyPr/>
+                    <a:lstStyle/>
+                    <a:p>
+                      <a:r>
+                        <a:rPr lang="en-US" dirty="0"/>
+                        <a:t>More control (e.g., priority, abort)</a:t>
+                      </a:r>
+                    </a:p>
+                  </a:txBody>
+                  <a:tcPr/>
+                </a:tc>
+                <a:extLst>
+                  <a:ext uri="{0D108BD9-81ED-4DB2-BD59-A6C34878D82A}">
+                    <a16:rowId xmlns:a16="http://schemas.microsoft.com/office/drawing/2014/main" val="1091119578"/>
+                  </a:ext>
+                </a:extLst>
+              </a:tr>
+              <a:tr h="370840">
+                <a:tc>
+                  <a:txBody>
+                    <a:bodyPr/>
+                    <a:lstStyle/>
+                    <a:p>
+                      <a:endParaRPr lang="en-US" dirty="0"/>
+                    </a:p>
+                  </a:txBody>
+                  <a:tcPr/>
+                </a:tc>
+                <a:tc>
+                  <a:txBody>
+                    <a:bodyPr/>
+                    <a:lstStyle/>
+                    <a:p>
+                      <a:r>
+                        <a:rPr lang="en-US" dirty="0"/>
+                        <a:t>Higher overhead than thread pool</a:t>
+                      </a:r>
+                    </a:p>
+                  </a:txBody>
+                  <a:tcPr/>
+                </a:tc>
+                <a:extLst>
+                  <a:ext uri="{0D108BD9-81ED-4DB2-BD59-A6C34878D82A}">
+                    <a16:rowId xmlns:a16="http://schemas.microsoft.com/office/drawing/2014/main" val="3362328269"/>
+                  </a:ext>
+                </a:extLst>
+              </a:tr>
+            </a:tbl>
+          </a:graphicData>
+        </a:graphic>
+      </p:graphicFrame>
+      <p:pic>
+        <p:nvPicPr>
+          <p:cNvPr id="7" name="Graphic 6" descr="Thumbs up sign with solid fill">
+            <a:extLst>
+              <a:ext uri="{FF2B5EF4-FFF2-40B4-BE49-F238E27FC236}">
+                <a16:creationId xmlns:a16="http://schemas.microsoft.com/office/drawing/2014/main" id="{7DE36768-E831-86A0-7E3B-980F13B4E704}"/>
+              </a:ext>
+            </a:extLst>
+          </p:cNvPr>
+          <p:cNvPicPr>
+            <a:picLocks noChangeAspect="1"/>
+          </p:cNvPicPr>
+          <p:nvPr/>
+        </p:nvPicPr>
+        <p:blipFill>
+          <a:blip r:embed="rId2">
+            <a:extLst>
+              <a:ext uri="{96DAC541-7B7A-43D3-8B79-37D633B846F1}">
+                <asvg:svgBlip xmlns:asvg="http://schemas.microsoft.com/office/drawing/2016/SVG/main" r:embed="rId3"/>
+              </a:ext>
+            </a:extLst>
+          </a:blip>
+          <a:stretch>
+            <a:fillRect/>
+          </a:stretch>
+        </p:blipFill>
+        <p:spPr>
+          <a:xfrm>
+            <a:off x="1845398" y="5284348"/>
+            <a:ext cx="374068" cy="374068"/>
+          </a:xfrm>
+          <a:prstGeom prst="rect">
+            <a:avLst/>
+          </a:prstGeom>
+        </p:spPr>
+      </p:pic>
+      <p:pic>
+        <p:nvPicPr>
+          <p:cNvPr id="8" name="Graphic 7" descr="Thumbs up sign with solid fill">
+            <a:extLst>
+              <a:ext uri="{FF2B5EF4-FFF2-40B4-BE49-F238E27FC236}">
+                <a16:creationId xmlns:a16="http://schemas.microsoft.com/office/drawing/2014/main" id="{4CA44AB4-3B07-7E4D-A077-77F7EC62CB58}"/>
+              </a:ext>
+            </a:extLst>
+          </p:cNvPr>
+          <p:cNvPicPr>
+            <a:picLocks noChangeAspect="1"/>
+          </p:cNvPicPr>
+          <p:nvPr/>
+        </p:nvPicPr>
+        <p:blipFill>
+          <a:blip r:embed="rId2">
+            <a:extLst>
+              <a:ext uri="{96DAC541-7B7A-43D3-8B79-37D633B846F1}">
+                <asvg:svgBlip xmlns:asvg="http://schemas.microsoft.com/office/drawing/2016/SVG/main" r:embed="rId3"/>
+              </a:ext>
+            </a:extLst>
+          </a:blip>
+          <a:stretch>
+            <a:fillRect/>
+          </a:stretch>
+        </p:blipFill>
+        <p:spPr>
+          <a:xfrm rot="10964654">
+            <a:off x="1836345" y="5672786"/>
+            <a:ext cx="374068" cy="374068"/>
+          </a:xfrm>
+          <a:prstGeom prst="rect">
+            <a:avLst/>
+          </a:prstGeom>
+        </p:spPr>
+      </p:pic>
+    </p:spTree>
+    <p:extLst>
+      <p:ext uri="{BB962C8B-B14F-4D97-AF65-F5344CB8AC3E}">
+        <p14:creationId xmlns:p14="http://schemas.microsoft.com/office/powerpoint/2010/main" val="1328459469"/>
+      </p:ext>
+    </p:extLst>
+  </p:cSld>
+  <p:clrMapOvr>
+    <a:masterClrMapping/>
+  </p:clrMapOvr>
+</p:sld>
+</file>
+
+<file path=ppt/slides/slide12.xml><?xml version="1.0" encoding="utf-8"?>
+<p:sld xmlns:a="http://schemas.openxmlformats.org/drawingml/2006/main" xmlns:r="http://schemas.openxmlformats.org/officeDocument/2006/relationships" xmlns:p="http://schemas.openxmlformats.org/presentationml/2006/main">
+  <p:cSld>
+    <p:spTree>
+      <p:nvGrpSpPr>
+        <p:cNvPr id="1" name=""/>
+        <p:cNvGrpSpPr/>
+        <p:nvPr/>
+      </p:nvGrpSpPr>
+      <p:grpSpPr>
+        <a:xfrm>
+          <a:off x="0" y="0"/>
+          <a:ext cx="0" cy="0"/>
+          <a:chOff x="0" y="0"/>
+          <a:chExt cx="0" cy="0"/>
+        </a:xfrm>
+      </p:grpSpPr>
+      <p:sp>
+        <p:nvSpPr>
+          <p:cNvPr id="2" name="Title 1">
+            <a:extLst>
+              <a:ext uri="{FF2B5EF4-FFF2-40B4-BE49-F238E27FC236}">
+                <a16:creationId xmlns:a16="http://schemas.microsoft.com/office/drawing/2014/main" id="{E9B90DF5-4992-9192-EF78-EB37712F276C}"/>
+              </a:ext>
+            </a:extLst>
+          </p:cNvPr>
+          <p:cNvSpPr>
+            <a:spLocks noGrp="1"/>
+          </p:cNvSpPr>
+          <p:nvPr>
+            <p:ph type="title"/>
+          </p:nvPr>
+        </p:nvSpPr>
+        <p:spPr/>
+        <p:txBody>
+          <a:bodyPr/>
+          <a:lstStyle/>
+          <a:p>
+            <a:r>
+              <a:rPr lang="en-US" dirty="0"/>
+              <a:t>Thread Pool</a:t>
+            </a:r>
+          </a:p>
+        </p:txBody>
+      </p:sp>
+      <p:sp>
+        <p:nvSpPr>
+          <p:cNvPr id="3" name="Content Placeholder 2">
+            <a:extLst>
+              <a:ext uri="{FF2B5EF4-FFF2-40B4-BE49-F238E27FC236}">
+                <a16:creationId xmlns:a16="http://schemas.microsoft.com/office/drawing/2014/main" id="{5CE7E4F8-204F-707E-45B9-EFDD4FD68E21}"/>
+              </a:ext>
+            </a:extLst>
+          </p:cNvPr>
+          <p:cNvSpPr>
+            <a:spLocks noGrp="1"/>
+          </p:cNvSpPr>
+          <p:nvPr>
+            <p:ph idx="1"/>
+          </p:nvPr>
+        </p:nvSpPr>
+        <p:spPr/>
+        <p:txBody>
+          <a:bodyPr>
+            <a:normAutofit fontScale="92500" lnSpcReduction="10000"/>
+          </a:bodyPr>
+          <a:lstStyle/>
+          <a:p>
+            <a:pPr>
+              <a:buNone/>
+            </a:pPr>
+            <a:r>
+              <a:rPr lang="en-US" dirty="0"/>
+              <a:t>In .NET, a </a:t>
+            </a:r>
+            <a:r>
+              <a:rPr lang="en-US" b="1" dirty="0"/>
+              <a:t>Thread Pool</a:t>
+            </a:r>
+            <a:r>
+              <a:rPr lang="en-US" dirty="0"/>
+              <a:t> is a pool of worker threads managed by the CLR (Common Language Runtime) that are used to perform tasks, process asynchronous calls, handle timers, and manage other background operations without the overhead of creating and destroying threads manually.</a:t>
+            </a:r>
+          </a:p>
+          <a:p>
+            <a:pPr>
+              <a:buNone/>
+            </a:pPr>
+            <a:r>
+              <a:rPr lang="en-US" b="1" dirty="0"/>
+              <a:t>Key Characteristics:</a:t>
+            </a:r>
+          </a:p>
+          <a:p>
+            <a:pPr>
+              <a:buFont typeface="Arial" panose="020B0604020202020204" pitchFamily="34" charset="0"/>
+              <a:buChar char="•"/>
+            </a:pPr>
+            <a:r>
+              <a:rPr lang="en-US" b="1" dirty="0"/>
+              <a:t>Managed by .NET runtime</a:t>
+            </a:r>
+            <a:r>
+              <a:rPr lang="en-US" dirty="0"/>
+              <a:t>: You don't need to create or destroy threads manually.</a:t>
+            </a:r>
+          </a:p>
+          <a:p>
+            <a:pPr>
+              <a:buFont typeface="Arial" panose="020B0604020202020204" pitchFamily="34" charset="0"/>
+              <a:buChar char="•"/>
+            </a:pPr>
+            <a:r>
+              <a:rPr lang="en-US" b="1" dirty="0"/>
+              <a:t>Reuses threads</a:t>
+            </a:r>
+            <a:r>
+              <a:rPr lang="en-US" dirty="0"/>
+              <a:t>: It reuses threads to avoid the overhead of frequent creation and destruction.</a:t>
+            </a:r>
+          </a:p>
+          <a:p>
+            <a:pPr>
+              <a:buFont typeface="Arial" panose="020B0604020202020204" pitchFamily="34" charset="0"/>
+              <a:buChar char="•"/>
+            </a:pPr>
+            <a:r>
+              <a:rPr lang="en-US" b="1" dirty="0"/>
+              <a:t>Limits the number of concurrent threads</a:t>
+            </a:r>
+            <a:r>
+              <a:rPr lang="en-US" dirty="0"/>
+              <a:t>: Prevents system overload by restricting the number of active threads.</a:t>
+            </a:r>
+          </a:p>
+          <a:p>
+            <a:pPr>
+              <a:buFont typeface="Arial" panose="020B0604020202020204" pitchFamily="34" charset="0"/>
+              <a:buChar char="•"/>
+            </a:pPr>
+            <a:r>
+              <a:rPr lang="en-US" b="1" dirty="0"/>
+              <a:t>Efficient for short-lived operations</a:t>
+            </a:r>
+            <a:r>
+              <a:rPr lang="en-US" dirty="0"/>
+              <a:t>: Ideal for I/O-bound or short-running tasks.</a:t>
+            </a:r>
+          </a:p>
+          <a:p>
+            <a:endParaRPr lang="en-US" dirty="0"/>
+          </a:p>
+          <a:p>
+            <a:endParaRPr lang="en-US" dirty="0"/>
+          </a:p>
+        </p:txBody>
+      </p:sp>
+    </p:spTree>
+    <p:extLst>
+      <p:ext uri="{BB962C8B-B14F-4D97-AF65-F5344CB8AC3E}">
+        <p14:creationId xmlns:p14="http://schemas.microsoft.com/office/powerpoint/2010/main" val="329885029"/>
+      </p:ext>
+    </p:extLst>
+  </p:cSld>
+  <p:clrMapOvr>
+    <a:masterClrMapping/>
+  </p:clrMapOvr>
+</p:sld>
+</file>
+
+<file path=ppt/slides/slide13.xml><?xml version="1.0" encoding="utf-8"?>
+<p:sld xmlns:a="http://schemas.openxmlformats.org/drawingml/2006/main" xmlns:r="http://schemas.openxmlformats.org/officeDocument/2006/relationships" xmlns:p="http://schemas.openxmlformats.org/presentationml/2006/main">
+  <p:cSld>
+    <p:spTree>
+      <p:nvGrpSpPr>
+        <p:cNvPr id="1" name="">
+          <a:extLst>
+            <a:ext uri="{FF2B5EF4-FFF2-40B4-BE49-F238E27FC236}">
+              <a16:creationId xmlns:a16="http://schemas.microsoft.com/office/drawing/2014/main" id="{9A4AD69E-550F-7E5B-3807-FDF5C2918E80}"/>
+            </a:ext>
+          </a:extLst>
+        </p:cNvPr>
+        <p:cNvGrpSpPr/>
+        <p:nvPr/>
+      </p:nvGrpSpPr>
+      <p:grpSpPr>
+        <a:xfrm>
+          <a:off x="0" y="0"/>
+          <a:ext cx="0" cy="0"/>
+          <a:chOff x="0" y="0"/>
+          <a:chExt cx="0" cy="0"/>
+        </a:xfrm>
+      </p:grpSpPr>
+      <p:sp>
+        <p:nvSpPr>
+          <p:cNvPr id="2" name="Title 1">
+            <a:extLst>
+              <a:ext uri="{FF2B5EF4-FFF2-40B4-BE49-F238E27FC236}">
+                <a16:creationId xmlns:a16="http://schemas.microsoft.com/office/drawing/2014/main" id="{A1C29236-05A4-31C8-11FA-92801164FB49}"/>
+              </a:ext>
+            </a:extLst>
+          </p:cNvPr>
+          <p:cNvSpPr>
+            <a:spLocks noGrp="1"/>
+          </p:cNvSpPr>
+          <p:nvPr>
+            <p:ph type="title"/>
+          </p:nvPr>
+        </p:nvSpPr>
+        <p:spPr/>
+        <p:txBody>
+          <a:bodyPr/>
+          <a:lstStyle/>
+          <a:p>
+            <a:r>
+              <a:rPr lang="en-US" dirty="0"/>
+              <a:t>Thread Pool</a:t>
+            </a:r>
+          </a:p>
+        </p:txBody>
+      </p:sp>
+      <p:sp>
+        <p:nvSpPr>
+          <p:cNvPr id="3" name="Content Placeholder 2">
+            <a:extLst>
+              <a:ext uri="{FF2B5EF4-FFF2-40B4-BE49-F238E27FC236}">
+                <a16:creationId xmlns:a16="http://schemas.microsoft.com/office/drawing/2014/main" id="{D86B0DBC-F14F-9E6F-991C-070698D42F8A}"/>
+              </a:ext>
+            </a:extLst>
+          </p:cNvPr>
+          <p:cNvSpPr>
+            <a:spLocks noGrp="1"/>
+          </p:cNvSpPr>
+          <p:nvPr>
+            <p:ph idx="1"/>
+          </p:nvPr>
+        </p:nvSpPr>
+        <p:spPr/>
+        <p:txBody>
+          <a:bodyPr>
+            <a:normAutofit/>
+          </a:bodyPr>
+          <a:lstStyle/>
+          <a:p>
+            <a:r>
+              <a:rPr lang="en-US" dirty="0" err="1"/>
+              <a:t>ThreadPool.</a:t>
+            </a:r>
+            <a:r>
+              <a:rPr lang="en-US" b="1" dirty="0" err="1"/>
+              <a:t>QueueUserWorkItem</a:t>
+            </a:r>
+            <a:r>
+              <a:rPr lang="en-US" dirty="0"/>
+              <a:t>(state =&gt;</a:t>
+            </a:r>
+          </a:p>
+          <a:p>
+            <a:r>
+              <a:rPr lang="en-US" dirty="0"/>
+              <a:t>{</a:t>
+            </a:r>
+          </a:p>
+          <a:p>
+            <a:r>
+              <a:rPr lang="en-US" dirty="0"/>
+              <a:t>    </a:t>
+            </a:r>
+            <a:r>
+              <a:rPr lang="en-US" dirty="0" err="1"/>
+              <a:t>Console.WriteLine</a:t>
+            </a:r>
+            <a:r>
+              <a:rPr lang="en-US" dirty="0"/>
+              <a:t>("Running in thread pool");</a:t>
+            </a:r>
+          </a:p>
+          <a:p>
+            <a:r>
+              <a:rPr lang="en-US" dirty="0"/>
+              <a:t>});</a:t>
+            </a:r>
+          </a:p>
+          <a:p>
+            <a:endParaRPr lang="en-US" dirty="0"/>
+          </a:p>
+          <a:p>
+            <a:endParaRPr lang="en-US" dirty="0"/>
+          </a:p>
+        </p:txBody>
+      </p:sp>
+    </p:spTree>
+    <p:extLst>
+      <p:ext uri="{BB962C8B-B14F-4D97-AF65-F5344CB8AC3E}">
+        <p14:creationId xmlns:p14="http://schemas.microsoft.com/office/powerpoint/2010/main" val="609492659"/>
+      </p:ext>
+    </p:extLst>
+  </p:cSld>
+  <p:clrMapOvr>
+    <a:masterClrMapping/>
+  </p:clrMapOvr>
+</p:sld>
+</file>
+
+<file path=ppt/slides/slide14.xml><?xml version="1.0" encoding="utf-8"?>
+<p:sld xmlns:a="http://schemas.openxmlformats.org/drawingml/2006/main" xmlns:r="http://schemas.openxmlformats.org/officeDocument/2006/relationships" xmlns:p="http://schemas.openxmlformats.org/presentationml/2006/main">
+  <p:cSld>
+    <p:spTree>
+      <p:nvGrpSpPr>
+        <p:cNvPr id="1" name="">
+          <a:extLst>
+            <a:ext uri="{FF2B5EF4-FFF2-40B4-BE49-F238E27FC236}">
+              <a16:creationId xmlns:a16="http://schemas.microsoft.com/office/drawing/2014/main" id="{47524348-74BF-27D8-6898-4BCE397BE2EE}"/>
+            </a:ext>
+          </a:extLst>
+        </p:cNvPr>
+        <p:cNvGrpSpPr/>
+        <p:nvPr/>
+      </p:nvGrpSpPr>
+      <p:grpSpPr>
+        <a:xfrm>
+          <a:off x="0" y="0"/>
+          <a:ext cx="0" cy="0"/>
+          <a:chOff x="0" y="0"/>
+          <a:chExt cx="0" cy="0"/>
+        </a:xfrm>
+      </p:grpSpPr>
+      <p:sp>
+        <p:nvSpPr>
+          <p:cNvPr id="2" name="Title 1">
+            <a:extLst>
+              <a:ext uri="{FF2B5EF4-FFF2-40B4-BE49-F238E27FC236}">
+                <a16:creationId xmlns:a16="http://schemas.microsoft.com/office/drawing/2014/main" id="{1B6CF97B-A673-9FE3-3DFC-B5E5A7B41D69}"/>
+              </a:ext>
+            </a:extLst>
+          </p:cNvPr>
+          <p:cNvSpPr>
+            <a:spLocks noGrp="1"/>
+          </p:cNvSpPr>
+          <p:nvPr>
+            <p:ph type="title"/>
+          </p:nvPr>
+        </p:nvSpPr>
+        <p:spPr>
+          <a:xfrm>
+            <a:off x="1097280" y="263529"/>
+            <a:ext cx="10058400" cy="1450757"/>
+          </a:xfrm>
+        </p:spPr>
+        <p:txBody>
+          <a:bodyPr/>
+          <a:lstStyle/>
+          <a:p>
+            <a:r>
+              <a:rPr lang="en-US" dirty="0"/>
+              <a:t>Thread Pool</a:t>
+            </a:r>
+          </a:p>
+        </p:txBody>
+      </p:sp>
+      <p:sp>
+        <p:nvSpPr>
+          <p:cNvPr id="3" name="Content Placeholder 2">
+            <a:extLst>
+              <a:ext uri="{FF2B5EF4-FFF2-40B4-BE49-F238E27FC236}">
+                <a16:creationId xmlns:a16="http://schemas.microsoft.com/office/drawing/2014/main" id="{156FDC72-0E03-12F6-4B8C-9677990E20FB}"/>
+              </a:ext>
+            </a:extLst>
+          </p:cNvPr>
+          <p:cNvSpPr>
+            <a:spLocks noGrp="1"/>
+          </p:cNvSpPr>
+          <p:nvPr>
+            <p:ph idx="1"/>
+          </p:nvPr>
+        </p:nvSpPr>
+        <p:spPr/>
+        <p:txBody>
+          <a:bodyPr>
+            <a:normAutofit fontScale="92500" lnSpcReduction="20000"/>
+          </a:bodyPr>
+          <a:lstStyle/>
+          <a:p>
+            <a:r>
+              <a:rPr lang="en-US" b="1" dirty="0"/>
+              <a:t>How many threads are there at max in thread pool in given time in C# ? </a:t>
+            </a:r>
+          </a:p>
+          <a:p>
+            <a:r>
+              <a:rPr lang="en-US" dirty="0" err="1"/>
+              <a:t>ThreadPool.GetMaxThreads</a:t>
+            </a:r>
+            <a:r>
+              <a:rPr lang="en-US" dirty="0"/>
+              <a:t>(out int </a:t>
+            </a:r>
+            <a:r>
+              <a:rPr lang="en-US" dirty="0" err="1"/>
+              <a:t>workerThreads</a:t>
+            </a:r>
+            <a:r>
+              <a:rPr lang="en-US" dirty="0"/>
+              <a:t>, out int </a:t>
+            </a:r>
+            <a:r>
+              <a:rPr lang="en-US" dirty="0" err="1"/>
+              <a:t>completionPortThreads</a:t>
+            </a:r>
+            <a:r>
+              <a:rPr lang="en-US" dirty="0"/>
+              <a:t>); </a:t>
+            </a:r>
+            <a:r>
+              <a:rPr lang="en-US" dirty="0" err="1"/>
+              <a:t>ThreadPool.SetMaxThreads</a:t>
+            </a:r>
+            <a:r>
+              <a:rPr lang="en-US" dirty="0"/>
+              <a:t>(100, 100);</a:t>
+            </a:r>
+          </a:p>
+          <a:p>
+            <a:r>
+              <a:rPr lang="en-US" b="1" dirty="0"/>
+              <a:t>How many threads are created by default minimum for a process ? </a:t>
+            </a:r>
+          </a:p>
+          <a:p>
+            <a:r>
+              <a:rPr lang="en-US" dirty="0" err="1"/>
+              <a:t>ThreadPool.GetMinThreads</a:t>
+            </a:r>
+            <a:r>
+              <a:rPr lang="en-US" dirty="0"/>
+              <a:t>(out int </a:t>
+            </a:r>
+            <a:r>
+              <a:rPr lang="en-US" dirty="0" err="1"/>
+              <a:t>workerThreads</a:t>
+            </a:r>
+            <a:r>
+              <a:rPr lang="en-US" dirty="0"/>
+              <a:t>, out int </a:t>
+            </a:r>
+            <a:r>
+              <a:rPr lang="en-US" dirty="0" err="1"/>
+              <a:t>completionPortThreads</a:t>
+            </a:r>
+            <a:r>
+              <a:rPr lang="en-US" dirty="0"/>
+              <a:t>);</a:t>
+            </a:r>
+          </a:p>
+          <a:p>
+            <a:r>
+              <a:rPr lang="en-US" dirty="0" err="1"/>
+              <a:t>ThreadPool.SetMinThreads</a:t>
+            </a:r>
+            <a:r>
+              <a:rPr lang="en-US" dirty="0"/>
+              <a:t>(8, 8); // Increases readiness to spawn more threads</a:t>
+            </a:r>
+          </a:p>
+          <a:p>
+            <a:r>
+              <a:rPr lang="en-US" b="1" dirty="0"/>
+              <a:t>How many threads are created by default minimum for a process ? </a:t>
+            </a:r>
+          </a:p>
+          <a:p>
+            <a:r>
+              <a:rPr lang="en-US" dirty="0" err="1"/>
+              <a:t>ThreadPool.GetMinThreads</a:t>
+            </a:r>
+            <a:r>
+              <a:rPr lang="en-US" dirty="0"/>
+              <a:t>(out int </a:t>
+            </a:r>
+            <a:r>
+              <a:rPr lang="en-US" dirty="0" err="1"/>
+              <a:t>workerThreads</a:t>
+            </a:r>
+            <a:r>
+              <a:rPr lang="en-US" dirty="0"/>
+              <a:t>, out int </a:t>
+            </a:r>
+            <a:r>
+              <a:rPr lang="en-US" dirty="0" err="1"/>
+              <a:t>completionPortThreads</a:t>
+            </a:r>
+            <a:r>
+              <a:rPr lang="en-US" dirty="0"/>
+              <a:t>);</a:t>
+            </a:r>
+            <a:endParaRPr lang="en-US" b="1" dirty="0"/>
+          </a:p>
+          <a:p>
+            <a:pPr marL="0" marR="0" lvl="0" indent="0" algn="l" defTabSz="914400" rtl="0" eaLnBrk="0" fontAlgn="base" latinLnBrk="0" hangingPunct="0">
+              <a:lnSpc>
+                <a:spcPct val="100000"/>
+              </a:lnSpc>
+              <a:spcBef>
+                <a:spcPct val="0"/>
+              </a:spcBef>
+              <a:spcAft>
+                <a:spcPct val="0"/>
+              </a:spcAft>
+              <a:buClrTx/>
+              <a:buSzTx/>
+              <a:buNone/>
+              <a:tabLst/>
+            </a:pPr>
+            <a:r>
+              <a:rPr lang="en-US" altLang="en-US" dirty="0"/>
+              <a:t> Worker threads: 1 × number of logical processors</a:t>
+            </a:r>
+          </a:p>
+          <a:p>
+            <a:pPr marL="0" marR="0" lvl="0" indent="0" algn="l" defTabSz="914400" rtl="0" eaLnBrk="0" fontAlgn="base" latinLnBrk="0" hangingPunct="0">
+              <a:lnSpc>
+                <a:spcPct val="100000"/>
+              </a:lnSpc>
+              <a:spcBef>
+                <a:spcPct val="0"/>
+              </a:spcBef>
+              <a:spcAft>
+                <a:spcPct val="0"/>
+              </a:spcAft>
+              <a:buClrTx/>
+              <a:buSzTx/>
+              <a:buNone/>
+              <a:tabLst/>
+            </a:pPr>
+            <a:r>
+              <a:rPr lang="en-US" altLang="en-US" dirty="0"/>
+              <a:t> I/O completion threads (IOCP): 1 × number of logical processors</a:t>
+            </a:r>
+          </a:p>
+          <a:p>
+            <a:endParaRPr lang="en-US" dirty="0"/>
+          </a:p>
+        </p:txBody>
+      </p:sp>
+    </p:spTree>
+    <p:extLst>
+      <p:ext uri="{BB962C8B-B14F-4D97-AF65-F5344CB8AC3E}">
+        <p14:creationId xmlns:p14="http://schemas.microsoft.com/office/powerpoint/2010/main" val="3369976342"/>
+      </p:ext>
+    </p:extLst>
+  </p:cSld>
+  <p:clrMapOvr>
+    <a:masterClrMapping/>
+  </p:clrMapOvr>
+</p:sld>
+</file>
+
+<file path=ppt/slides/slide15.xml><?xml version="1.0" encoding="utf-8"?>
+<p:sld xmlns:a="http://schemas.openxmlformats.org/drawingml/2006/main" xmlns:r="http://schemas.openxmlformats.org/officeDocument/2006/relationships" xmlns:p="http://schemas.openxmlformats.org/presentationml/2006/main">
+  <p:cSld>
+    <p:spTree>
+      <p:nvGrpSpPr>
+        <p:cNvPr id="1" name="">
+          <a:extLst>
+            <a:ext uri="{FF2B5EF4-FFF2-40B4-BE49-F238E27FC236}">
+              <a16:creationId xmlns:a16="http://schemas.microsoft.com/office/drawing/2014/main" id="{AF38CF94-9275-3ABF-4E26-E940091696CE}"/>
+            </a:ext>
+          </a:extLst>
+        </p:cNvPr>
+        <p:cNvGrpSpPr/>
+        <p:nvPr/>
+      </p:nvGrpSpPr>
+      <p:grpSpPr>
+        <a:xfrm>
+          <a:off x="0" y="0"/>
+          <a:ext cx="0" cy="0"/>
+          <a:chOff x="0" y="0"/>
+          <a:chExt cx="0" cy="0"/>
+        </a:xfrm>
+      </p:grpSpPr>
+      <p:sp>
+        <p:nvSpPr>
+          <p:cNvPr id="2" name="Title 1">
+            <a:extLst>
+              <a:ext uri="{FF2B5EF4-FFF2-40B4-BE49-F238E27FC236}">
+                <a16:creationId xmlns:a16="http://schemas.microsoft.com/office/drawing/2014/main" id="{D3E51B87-5887-4A46-DFDC-ABB064CB55C5}"/>
+              </a:ext>
+            </a:extLst>
+          </p:cNvPr>
+          <p:cNvSpPr>
+            <a:spLocks noGrp="1"/>
+          </p:cNvSpPr>
+          <p:nvPr>
+            <p:ph type="title"/>
+          </p:nvPr>
+        </p:nvSpPr>
+        <p:spPr>
+          <a:xfrm>
+            <a:off x="1097280" y="263529"/>
+            <a:ext cx="10058400" cy="1450757"/>
+          </a:xfrm>
+        </p:spPr>
+        <p:txBody>
+          <a:bodyPr/>
+          <a:lstStyle/>
+          <a:p>
+            <a:r>
+              <a:rPr lang="en-US" dirty="0"/>
+              <a:t>Thread Pool</a:t>
+            </a:r>
+          </a:p>
+        </p:txBody>
+      </p:sp>
+      <p:sp>
+        <p:nvSpPr>
+          <p:cNvPr id="3" name="Content Placeholder 2">
+            <a:extLst>
+              <a:ext uri="{FF2B5EF4-FFF2-40B4-BE49-F238E27FC236}">
+                <a16:creationId xmlns:a16="http://schemas.microsoft.com/office/drawing/2014/main" id="{AFC80A7B-C943-7B92-F67C-96336363BD58}"/>
+              </a:ext>
+            </a:extLst>
+          </p:cNvPr>
+          <p:cNvSpPr>
+            <a:spLocks noGrp="1"/>
+          </p:cNvSpPr>
+          <p:nvPr>
+            <p:ph idx="1"/>
+          </p:nvPr>
+        </p:nvSpPr>
+        <p:spPr/>
+        <p:txBody>
+          <a:bodyPr>
+            <a:normAutofit fontScale="85000" lnSpcReduction="20000"/>
+          </a:bodyPr>
+          <a:lstStyle/>
+          <a:p>
+            <a:r>
+              <a:rPr lang="en-US" b="1" dirty="0"/>
+              <a:t>   // Step 2: Offload email sending to </a:t>
+            </a:r>
+            <a:r>
+              <a:rPr lang="en-US" b="1" dirty="0" err="1"/>
+              <a:t>ThreadPool</a:t>
+            </a:r>
+            <a:endParaRPr lang="en-US" b="1" dirty="0"/>
+          </a:p>
+          <a:p>
+            <a:r>
+              <a:rPr lang="en-US" b="1" dirty="0"/>
+              <a:t>    </a:t>
+            </a:r>
+            <a:r>
+              <a:rPr lang="en-US" b="1" dirty="0" err="1"/>
+              <a:t>ThreadPool.QueueUserWorkItem</a:t>
+            </a:r>
+            <a:r>
+              <a:rPr lang="en-US" b="1" dirty="0"/>
+              <a:t>(state =&gt;</a:t>
+            </a:r>
+          </a:p>
+          <a:p>
+            <a:r>
+              <a:rPr lang="en-US" b="1" dirty="0"/>
+              <a:t>    {</a:t>
+            </a:r>
+          </a:p>
+          <a:p>
+            <a:r>
+              <a:rPr lang="en-US" b="1" dirty="0"/>
+              <a:t>        </a:t>
+            </a:r>
+            <a:r>
+              <a:rPr lang="en-US" b="1" dirty="0" err="1"/>
+              <a:t>SendEmailConfirmation</a:t>
+            </a:r>
+            <a:r>
+              <a:rPr lang="en-US" b="1" dirty="0"/>
+              <a:t>((Order)state);</a:t>
+            </a:r>
+          </a:p>
+          <a:p>
+            <a:r>
+              <a:rPr lang="en-US" b="1" dirty="0"/>
+              <a:t>    }, order);</a:t>
+            </a:r>
+          </a:p>
+          <a:p>
+            <a:pPr>
+              <a:buNone/>
+            </a:pPr>
+            <a:r>
+              <a:rPr lang="en-US" b="1" dirty="0"/>
+              <a:t>Why </a:t>
+            </a:r>
+            <a:r>
+              <a:rPr lang="en-US" b="1" dirty="0" err="1"/>
+              <a:t>ThreadPool</a:t>
+            </a:r>
+            <a:r>
+              <a:rPr lang="en-US" b="1" dirty="0"/>
+              <a:t> is a good fit here:</a:t>
+            </a:r>
+          </a:p>
+          <a:p>
+            <a:pPr>
+              <a:buFont typeface="Arial" panose="020B0604020202020204" pitchFamily="34" charset="0"/>
+              <a:buChar char="•"/>
+            </a:pPr>
+            <a:r>
+              <a:rPr lang="en-US" dirty="0"/>
+              <a:t>Email sending is a </a:t>
+            </a:r>
+            <a:r>
+              <a:rPr lang="en-US" b="1" dirty="0"/>
+              <a:t>short-lived</a:t>
+            </a:r>
+            <a:r>
+              <a:rPr lang="en-US" dirty="0"/>
+              <a:t>, </a:t>
+            </a:r>
+            <a:r>
+              <a:rPr lang="en-US" b="1" dirty="0"/>
+              <a:t>non-blocking</a:t>
+            </a:r>
+            <a:r>
+              <a:rPr lang="en-US" dirty="0"/>
+              <a:t> task.</a:t>
+            </a:r>
+          </a:p>
+          <a:p>
+            <a:pPr>
+              <a:buFont typeface="Arial" panose="020B0604020202020204" pitchFamily="34" charset="0"/>
+              <a:buChar char="•"/>
+            </a:pPr>
+            <a:r>
+              <a:rPr lang="en-US" dirty="0" err="1"/>
+              <a:t>ThreadPool</a:t>
+            </a:r>
+            <a:r>
+              <a:rPr lang="en-US" dirty="0"/>
+              <a:t> </a:t>
+            </a:r>
+            <a:r>
+              <a:rPr lang="en-US" b="1" dirty="0"/>
+              <a:t>reuses threads</a:t>
+            </a:r>
+            <a:r>
+              <a:rPr lang="en-US" dirty="0"/>
+              <a:t> — no overhead of creating new threads each time.</a:t>
+            </a:r>
+          </a:p>
+          <a:p>
+            <a:pPr>
+              <a:buFont typeface="Arial" panose="020B0604020202020204" pitchFamily="34" charset="0"/>
+              <a:buChar char="•"/>
+            </a:pPr>
+            <a:r>
+              <a:rPr lang="en-US" dirty="0"/>
+              <a:t>It’s </a:t>
+            </a:r>
+            <a:r>
+              <a:rPr lang="en-US" b="1" dirty="0"/>
+              <a:t>fire-and-forget</a:t>
+            </a:r>
+            <a:r>
+              <a:rPr lang="en-US" dirty="0"/>
+              <a:t> — you don’t need a return value or error handling in the main thread.</a:t>
+            </a:r>
+          </a:p>
+          <a:p>
+            <a:endParaRPr lang="en-US" dirty="0"/>
+          </a:p>
+        </p:txBody>
+      </p:sp>
+    </p:spTree>
+    <p:extLst>
+      <p:ext uri="{BB962C8B-B14F-4D97-AF65-F5344CB8AC3E}">
+        <p14:creationId xmlns:p14="http://schemas.microsoft.com/office/powerpoint/2010/main" val="672001229"/>
+      </p:ext>
+    </p:extLst>
+  </p:cSld>
+  <p:clrMapOvr>
+    <a:masterClrMapping/>
+  </p:clrMapOvr>
+</p:sld>
+</file>
+
+<file path=ppt/slides/slide16.xml><?xml version="1.0" encoding="utf-8"?>
+<p:sld xmlns:a="http://schemas.openxmlformats.org/drawingml/2006/main" xmlns:r="http://schemas.openxmlformats.org/officeDocument/2006/relationships" xmlns:p="http://schemas.openxmlformats.org/presentationml/2006/main">
+  <p:cSld>
+    <p:spTree>
+      <p:nvGrpSpPr>
+        <p:cNvPr id="1" name="">
+          <a:extLst>
+            <a:ext uri="{FF2B5EF4-FFF2-40B4-BE49-F238E27FC236}">
+              <a16:creationId xmlns:a16="http://schemas.microsoft.com/office/drawing/2014/main" id="{DC48E0A0-2992-88D8-4091-E7BA3A4DD919}"/>
+            </a:ext>
+          </a:extLst>
+        </p:cNvPr>
+        <p:cNvGrpSpPr/>
+        <p:nvPr/>
+      </p:nvGrpSpPr>
+      <p:grpSpPr>
+        <a:xfrm>
+          <a:off x="0" y="0"/>
+          <a:ext cx="0" cy="0"/>
+          <a:chOff x="0" y="0"/>
+          <a:chExt cx="0" cy="0"/>
+        </a:xfrm>
+      </p:grpSpPr>
+      <p:sp>
+        <p:nvSpPr>
+          <p:cNvPr id="2" name="Title 1">
+            <a:extLst>
+              <a:ext uri="{FF2B5EF4-FFF2-40B4-BE49-F238E27FC236}">
+                <a16:creationId xmlns:a16="http://schemas.microsoft.com/office/drawing/2014/main" id="{A702C639-4AF5-3DAB-3391-F2474955F4D4}"/>
+              </a:ext>
+            </a:extLst>
+          </p:cNvPr>
+          <p:cNvSpPr>
+            <a:spLocks noGrp="1"/>
+          </p:cNvSpPr>
+          <p:nvPr>
+            <p:ph type="title"/>
+          </p:nvPr>
+        </p:nvSpPr>
+        <p:spPr>
+          <a:xfrm>
+            <a:off x="1097280" y="263529"/>
+            <a:ext cx="10058400" cy="1450757"/>
+          </a:xfrm>
+        </p:spPr>
+        <p:txBody>
+          <a:bodyPr/>
+          <a:lstStyle/>
+          <a:p>
+            <a:r>
+              <a:rPr lang="en-US" dirty="0"/>
+              <a:t>Cons Thread Pool</a:t>
+            </a:r>
+          </a:p>
+        </p:txBody>
+      </p:sp>
+      <p:sp>
+        <p:nvSpPr>
+          <p:cNvPr id="3" name="Content Placeholder 2">
+            <a:extLst>
+              <a:ext uri="{FF2B5EF4-FFF2-40B4-BE49-F238E27FC236}">
+                <a16:creationId xmlns:a16="http://schemas.microsoft.com/office/drawing/2014/main" id="{07C1C1E9-0D28-689D-B5B9-F3507DAE1C7D}"/>
+              </a:ext>
+            </a:extLst>
+          </p:cNvPr>
+          <p:cNvSpPr>
+            <a:spLocks noGrp="1"/>
+          </p:cNvSpPr>
+          <p:nvPr>
+            <p:ph idx="1"/>
+          </p:nvPr>
+        </p:nvSpPr>
+        <p:spPr/>
+        <p:txBody>
+          <a:bodyPr>
+            <a:normAutofit fontScale="85000" lnSpcReduction="20000"/>
+          </a:bodyPr>
+          <a:lstStyle/>
+          <a:p>
+            <a:pPr marL="0" marR="0" lvl="0" indent="0" algn="l" defTabSz="914400" rtl="0" eaLnBrk="0" fontAlgn="base" latinLnBrk="0" hangingPunct="0">
+              <a:lnSpc>
+                <a:spcPct val="100000"/>
+              </a:lnSpc>
+              <a:spcBef>
+                <a:spcPct val="0"/>
+              </a:spcBef>
+              <a:spcAft>
+                <a:spcPct val="0"/>
+              </a:spcAft>
+              <a:buClrTx/>
+              <a:buSzTx/>
+              <a:buFontTx/>
+              <a:buAutoNum type="arabicPeriod"/>
+              <a:tabLst/>
+            </a:pPr>
+            <a:r>
+              <a:rPr lang="en-US" altLang="en-US" sz="1900" b="1" dirty="0">
+                <a:solidFill>
+                  <a:schemeClr val="tx1"/>
+                </a:solidFill>
+                <a:latin typeface="Arial" panose="020B0604020202020204" pitchFamily="34" charset="0"/>
+              </a:rPr>
+              <a:t> No return value or result tracking</a:t>
+            </a:r>
+          </a:p>
+          <a:p>
+            <a:pPr marL="457200" marR="0" lvl="1" indent="0" algn="l" defTabSz="914400" rtl="0" eaLnBrk="0" fontAlgn="base" latinLnBrk="0" hangingPunct="0">
+              <a:lnSpc>
+                <a:spcPct val="100000"/>
+              </a:lnSpc>
+              <a:spcBef>
+                <a:spcPct val="0"/>
+              </a:spcBef>
+              <a:spcAft>
+                <a:spcPct val="0"/>
+              </a:spcAft>
+              <a:buClrTx/>
+              <a:buSzTx/>
+              <a:buFontTx/>
+              <a:buChar char="•"/>
+              <a:tabLst/>
+            </a:pPr>
+            <a:r>
+              <a:rPr lang="en-US" altLang="en-US" sz="1900" dirty="0">
+                <a:solidFill>
+                  <a:schemeClr val="tx1"/>
+                </a:solidFill>
+                <a:latin typeface="Arial" panose="020B0604020202020204" pitchFamily="34" charset="0"/>
+              </a:rPr>
+              <a:t>Unlike Task&lt;T&gt;, you can’t get the result of the operation.</a:t>
+            </a:r>
+          </a:p>
+          <a:p>
+            <a:pPr marL="457200" marR="0" lvl="1" indent="0" algn="l" defTabSz="914400" rtl="0" eaLnBrk="0" fontAlgn="base" latinLnBrk="0" hangingPunct="0">
+              <a:lnSpc>
+                <a:spcPct val="100000"/>
+              </a:lnSpc>
+              <a:spcBef>
+                <a:spcPct val="0"/>
+              </a:spcBef>
+              <a:spcAft>
+                <a:spcPct val="0"/>
+              </a:spcAft>
+              <a:buClrTx/>
+              <a:buSzTx/>
+              <a:buFontTx/>
+              <a:buChar char="•"/>
+              <a:tabLst/>
+            </a:pPr>
+            <a:r>
+              <a:rPr kumimoji="0" lang="en-US" altLang="en-US" sz="1900" b="0" i="0" u="none" strike="noStrike" cap="none" normalizeH="0" baseline="0" dirty="0">
+                <a:ln>
+                  <a:noFill/>
+                </a:ln>
+                <a:solidFill>
+                  <a:schemeClr val="tx1"/>
+                </a:solidFill>
+                <a:effectLst/>
+                <a:latin typeface="Arial" panose="020B0604020202020204" pitchFamily="34" charset="0"/>
+              </a:rPr>
+              <a:t>No built-in way to </a:t>
+            </a:r>
+            <a:r>
+              <a:rPr kumimoji="0" lang="en-US" altLang="en-US" sz="1900" b="0" i="0" u="none" strike="noStrike" cap="none" normalizeH="0" baseline="0" dirty="0">
+                <a:ln>
+                  <a:noFill/>
+                </a:ln>
+                <a:solidFill>
+                  <a:schemeClr val="tx1"/>
+                </a:solidFill>
+                <a:effectLst/>
+                <a:latin typeface="Arial Unicode MS" panose="020B0604020202020204" pitchFamily="34" charset="-128"/>
+              </a:rPr>
+              <a:t>await</a:t>
+            </a:r>
+            <a:r>
+              <a:rPr kumimoji="0" lang="en-US" altLang="en-US" sz="1900" b="0" i="0" u="none" strike="noStrike" cap="none" normalizeH="0" baseline="0" dirty="0">
+                <a:ln>
+                  <a:noFill/>
+                </a:ln>
+                <a:solidFill>
+                  <a:schemeClr val="tx1"/>
+                </a:solidFill>
+                <a:effectLst/>
+              </a:rPr>
+              <a:t> the completion.</a:t>
+            </a:r>
+            <a:endParaRPr kumimoji="0" lang="en-US" altLang="en-US" sz="1900" b="0" i="0" u="none" strike="noStrike" cap="none" normalizeH="0" baseline="0" dirty="0">
+              <a:ln>
+                <a:noFill/>
+              </a:ln>
+              <a:solidFill>
+                <a:schemeClr val="tx1"/>
+              </a:solidFill>
+              <a:effectLst/>
+              <a:latin typeface="Arial" panose="020B0604020202020204" pitchFamily="34" charset="0"/>
+            </a:endParaRPr>
+          </a:p>
+          <a:p>
+            <a:pPr marL="0" marR="0" lvl="0" indent="0" algn="l" defTabSz="914400" rtl="0" eaLnBrk="0" fontAlgn="base" latinLnBrk="0" hangingPunct="0">
+              <a:lnSpc>
+                <a:spcPct val="100000"/>
+              </a:lnSpc>
+              <a:spcBef>
+                <a:spcPct val="0"/>
+              </a:spcBef>
+              <a:spcAft>
+                <a:spcPct val="0"/>
+              </a:spcAft>
+              <a:buClrTx/>
+              <a:buSzTx/>
+              <a:buFontTx/>
+              <a:buAutoNum type="arabicPeriod" startAt="2"/>
+              <a:tabLst/>
+            </a:pPr>
+            <a:r>
+              <a:rPr kumimoji="0" lang="en-US" altLang="en-US" sz="1900" b="1" i="0" u="none" strike="noStrike" cap="none" normalizeH="0" baseline="0" dirty="0">
+                <a:ln>
+                  <a:noFill/>
+                </a:ln>
+                <a:solidFill>
+                  <a:schemeClr val="tx1"/>
+                </a:solidFill>
+                <a:effectLst/>
+                <a:latin typeface="Arial" panose="020B0604020202020204" pitchFamily="34" charset="0"/>
+              </a:rPr>
+              <a:t> No built-in error handling</a:t>
+            </a:r>
+            <a:endParaRPr kumimoji="0" lang="en-US" altLang="en-US" sz="1900" b="0" i="0" u="none" strike="noStrike" cap="none" normalizeH="0" baseline="0" dirty="0">
+              <a:ln>
+                <a:noFill/>
+              </a:ln>
+              <a:solidFill>
+                <a:schemeClr val="tx1"/>
+              </a:solidFill>
+              <a:effectLst/>
+              <a:latin typeface="Arial" panose="020B0604020202020204" pitchFamily="34" charset="0"/>
+            </a:endParaRPr>
+          </a:p>
+          <a:p>
+            <a:pPr marL="457200" marR="0" lvl="1" indent="0" algn="l" defTabSz="914400" rtl="0" eaLnBrk="0" fontAlgn="base" latinLnBrk="0" hangingPunct="0">
+              <a:lnSpc>
+                <a:spcPct val="100000"/>
+              </a:lnSpc>
+              <a:spcBef>
+                <a:spcPct val="0"/>
+              </a:spcBef>
+              <a:spcAft>
+                <a:spcPct val="0"/>
+              </a:spcAft>
+              <a:buClrTx/>
+              <a:buSzTx/>
+              <a:buFontTx/>
+              <a:buChar char="•"/>
+              <a:tabLst/>
+            </a:pPr>
+            <a:r>
+              <a:rPr kumimoji="0" lang="en-US" altLang="en-US" sz="1900" b="0" i="0" u="none" strike="noStrike" cap="none" normalizeH="0" baseline="0" dirty="0">
+                <a:ln>
+                  <a:noFill/>
+                </a:ln>
+                <a:solidFill>
+                  <a:schemeClr val="tx1"/>
+                </a:solidFill>
+                <a:effectLst/>
+                <a:latin typeface="Arial" panose="020B0604020202020204" pitchFamily="34" charset="0"/>
+              </a:rPr>
+              <a:t>If an exception occurs in the thread pool thread, it may go unobserved and crash the process unless handled carefully.</a:t>
+            </a:r>
+          </a:p>
+          <a:p>
+            <a:pPr marL="0" marR="0" lvl="0" indent="0" algn="l" defTabSz="914400" rtl="0" eaLnBrk="0" fontAlgn="base" latinLnBrk="0" hangingPunct="0">
+              <a:lnSpc>
+                <a:spcPct val="100000"/>
+              </a:lnSpc>
+              <a:spcBef>
+                <a:spcPct val="0"/>
+              </a:spcBef>
+              <a:spcAft>
+                <a:spcPct val="0"/>
+              </a:spcAft>
+              <a:buClrTx/>
+              <a:buSzTx/>
+              <a:buFontTx/>
+              <a:buAutoNum type="arabicPeriod" startAt="3"/>
+              <a:tabLst/>
+            </a:pPr>
+            <a:r>
+              <a:rPr kumimoji="0" lang="en-US" altLang="en-US" sz="1900" b="1" i="0" u="none" strike="noStrike" cap="none" normalizeH="0" baseline="0" dirty="0">
+                <a:ln>
+                  <a:noFill/>
+                </a:ln>
+                <a:solidFill>
+                  <a:schemeClr val="tx1"/>
+                </a:solidFill>
+                <a:effectLst/>
+                <a:latin typeface="Arial" panose="020B0604020202020204" pitchFamily="34" charset="0"/>
+              </a:rPr>
+              <a:t> No cancellation support</a:t>
+            </a:r>
+            <a:endParaRPr kumimoji="0" lang="en-US" altLang="en-US" sz="1900" b="0" i="0" u="none" strike="noStrike" cap="none" normalizeH="0" baseline="0" dirty="0">
+              <a:ln>
+                <a:noFill/>
+              </a:ln>
+              <a:solidFill>
+                <a:schemeClr val="tx1"/>
+              </a:solidFill>
+              <a:effectLst/>
+              <a:latin typeface="Arial" panose="020B0604020202020204" pitchFamily="34" charset="0"/>
+            </a:endParaRPr>
+          </a:p>
+          <a:p>
+            <a:pPr marL="457200" marR="0" lvl="1" indent="0" algn="l" defTabSz="914400" rtl="0" eaLnBrk="0" fontAlgn="base" latinLnBrk="0" hangingPunct="0">
+              <a:lnSpc>
+                <a:spcPct val="100000"/>
+              </a:lnSpc>
+              <a:spcBef>
+                <a:spcPct val="0"/>
+              </a:spcBef>
+              <a:spcAft>
+                <a:spcPct val="0"/>
+              </a:spcAft>
+              <a:buClrTx/>
+              <a:buSzTx/>
+              <a:buFontTx/>
+              <a:buChar char="•"/>
+              <a:tabLst/>
+            </a:pPr>
+            <a:r>
+              <a:rPr kumimoji="0" lang="en-US" altLang="en-US" sz="1900" b="0" i="0" u="none" strike="noStrike" cap="none" normalizeH="0" baseline="0" dirty="0">
+                <a:ln>
+                  <a:noFill/>
+                </a:ln>
+                <a:solidFill>
+                  <a:schemeClr val="tx1"/>
+                </a:solidFill>
+                <a:effectLst/>
+                <a:latin typeface="Arial" panose="020B0604020202020204" pitchFamily="34" charset="0"/>
+              </a:rPr>
+              <a:t>You can’t easily cancel the work once it’s queued.</a:t>
+            </a:r>
+          </a:p>
+          <a:p>
+            <a:pPr marL="0" marR="0" lvl="0" indent="0" algn="l" defTabSz="914400" rtl="0" eaLnBrk="0" fontAlgn="base" latinLnBrk="0" hangingPunct="0">
+              <a:lnSpc>
+                <a:spcPct val="100000"/>
+              </a:lnSpc>
+              <a:spcBef>
+                <a:spcPct val="0"/>
+              </a:spcBef>
+              <a:spcAft>
+                <a:spcPct val="0"/>
+              </a:spcAft>
+              <a:buClrTx/>
+              <a:buSzTx/>
+              <a:buFontTx/>
+              <a:buAutoNum type="arabicPeriod" startAt="4"/>
+              <a:tabLst/>
+            </a:pPr>
+            <a:r>
+              <a:rPr kumimoji="0" lang="en-US" altLang="en-US" sz="1900" b="1" i="0" u="none" strike="noStrike" cap="none" normalizeH="0" baseline="0" dirty="0">
+                <a:ln>
+                  <a:noFill/>
+                </a:ln>
+                <a:solidFill>
+                  <a:schemeClr val="tx1"/>
+                </a:solidFill>
+                <a:effectLst/>
+                <a:latin typeface="Arial" panose="020B0604020202020204" pitchFamily="34" charset="0"/>
+              </a:rPr>
+              <a:t> No fine-grained control</a:t>
+            </a:r>
+            <a:endParaRPr kumimoji="0" lang="en-US" altLang="en-US" sz="1900" b="0" i="0" u="none" strike="noStrike" cap="none" normalizeH="0" baseline="0" dirty="0">
+              <a:ln>
+                <a:noFill/>
+              </a:ln>
+              <a:solidFill>
+                <a:schemeClr val="tx1"/>
+              </a:solidFill>
+              <a:effectLst/>
+              <a:latin typeface="Arial" panose="020B0604020202020204" pitchFamily="34" charset="0"/>
+            </a:endParaRPr>
+          </a:p>
+          <a:p>
+            <a:pPr marL="457200" marR="0" lvl="1" indent="0" algn="l" defTabSz="914400" rtl="0" eaLnBrk="0" fontAlgn="base" latinLnBrk="0" hangingPunct="0">
+              <a:lnSpc>
+                <a:spcPct val="100000"/>
+              </a:lnSpc>
+              <a:spcBef>
+                <a:spcPct val="0"/>
+              </a:spcBef>
+              <a:spcAft>
+                <a:spcPct val="0"/>
+              </a:spcAft>
+              <a:buClrTx/>
+              <a:buSzTx/>
+              <a:buFontTx/>
+              <a:buChar char="•"/>
+              <a:tabLst/>
+            </a:pPr>
+            <a:r>
+              <a:rPr kumimoji="0" lang="en-US" altLang="en-US" sz="1900" b="0" i="0" u="none" strike="noStrike" cap="none" normalizeH="0" baseline="0" dirty="0">
+                <a:ln>
+                  <a:noFill/>
+                </a:ln>
+                <a:solidFill>
+                  <a:schemeClr val="tx1"/>
+                </a:solidFill>
+                <a:effectLst/>
+                <a:latin typeface="Arial" panose="020B0604020202020204" pitchFamily="34" charset="0"/>
+              </a:rPr>
+              <a:t>You can’t set thread priorities, thread affinity, or custom scheduling behavior.</a:t>
+            </a:r>
+          </a:p>
+          <a:p>
+            <a:pPr marL="0" marR="0" lvl="0" indent="0" algn="l" defTabSz="914400" rtl="0" eaLnBrk="0" fontAlgn="base" latinLnBrk="0" hangingPunct="0">
+              <a:lnSpc>
+                <a:spcPct val="100000"/>
+              </a:lnSpc>
+              <a:spcBef>
+                <a:spcPct val="0"/>
+              </a:spcBef>
+              <a:spcAft>
+                <a:spcPct val="0"/>
+              </a:spcAft>
+              <a:buClrTx/>
+              <a:buSzTx/>
+              <a:buFontTx/>
+              <a:buAutoNum type="arabicPeriod" startAt="5"/>
+              <a:tabLst/>
+            </a:pPr>
+            <a:r>
+              <a:rPr kumimoji="0" lang="en-US" altLang="en-US" sz="1900" b="1" i="0" u="none" strike="noStrike" cap="none" normalizeH="0" baseline="0" dirty="0">
+                <a:ln>
+                  <a:noFill/>
+                </a:ln>
+                <a:solidFill>
+                  <a:schemeClr val="tx1"/>
+                </a:solidFill>
+                <a:effectLst/>
+                <a:latin typeface="Arial" panose="020B0604020202020204" pitchFamily="34" charset="0"/>
+              </a:rPr>
+              <a:t> Limited to short-lived tasks</a:t>
+            </a:r>
+            <a:endParaRPr kumimoji="0" lang="en-US" altLang="en-US" sz="1900" b="0" i="0" u="none" strike="noStrike" cap="none" normalizeH="0" baseline="0" dirty="0">
+              <a:ln>
+                <a:noFill/>
+              </a:ln>
+              <a:solidFill>
+                <a:schemeClr val="tx1"/>
+              </a:solidFill>
+              <a:effectLst/>
+              <a:latin typeface="Arial" panose="020B0604020202020204" pitchFamily="34" charset="0"/>
+            </a:endParaRPr>
+          </a:p>
+          <a:p>
+            <a:pPr marL="457200" marR="0" lvl="1" indent="0" algn="l" defTabSz="914400" rtl="0" eaLnBrk="0" fontAlgn="base" latinLnBrk="0" hangingPunct="0">
+              <a:lnSpc>
+                <a:spcPct val="100000"/>
+              </a:lnSpc>
+              <a:spcBef>
+                <a:spcPct val="0"/>
+              </a:spcBef>
+              <a:spcAft>
+                <a:spcPct val="0"/>
+              </a:spcAft>
+              <a:buClrTx/>
+              <a:buSzTx/>
+              <a:buFontTx/>
+              <a:buChar char="•"/>
+              <a:tabLst/>
+            </a:pPr>
+            <a:r>
+              <a:rPr kumimoji="0" lang="en-US" altLang="en-US" sz="1900" b="0" i="0" u="none" strike="noStrike" cap="none" normalizeH="0" baseline="0" dirty="0" err="1">
+                <a:ln>
+                  <a:noFill/>
+                </a:ln>
+                <a:solidFill>
+                  <a:schemeClr val="tx1"/>
+                </a:solidFill>
+                <a:effectLst/>
+                <a:latin typeface="Arial" panose="020B0604020202020204" pitchFamily="34" charset="0"/>
+              </a:rPr>
+              <a:t>ThreadPool</a:t>
+            </a:r>
+            <a:r>
+              <a:rPr kumimoji="0" lang="en-US" altLang="en-US" sz="1900" b="0" i="0" u="none" strike="noStrike" cap="none" normalizeH="0" baseline="0" dirty="0">
+                <a:ln>
+                  <a:noFill/>
+                </a:ln>
+                <a:solidFill>
+                  <a:schemeClr val="tx1"/>
+                </a:solidFill>
+                <a:effectLst/>
+                <a:latin typeface="Arial" panose="020B0604020202020204" pitchFamily="34" charset="0"/>
+              </a:rPr>
+              <a:t> is designed for </a:t>
+            </a:r>
+            <a:r>
+              <a:rPr kumimoji="0" lang="en-US" altLang="en-US" sz="1900" b="1" i="0" u="none" strike="noStrike" cap="none" normalizeH="0" baseline="0" dirty="0">
+                <a:ln>
+                  <a:noFill/>
+                </a:ln>
+                <a:solidFill>
+                  <a:schemeClr val="tx1"/>
+                </a:solidFill>
+                <a:effectLst/>
+                <a:latin typeface="Arial" panose="020B0604020202020204" pitchFamily="34" charset="0"/>
+              </a:rPr>
+              <a:t>fast, short tasks</a:t>
+            </a:r>
+            <a:r>
+              <a:rPr kumimoji="0" lang="en-US" altLang="en-US" sz="1900" b="0" i="0" u="none" strike="noStrike" cap="none" normalizeH="0" baseline="0" dirty="0">
+                <a:ln>
+                  <a:noFill/>
+                </a:ln>
+                <a:solidFill>
+                  <a:schemeClr val="tx1"/>
+                </a:solidFill>
+                <a:effectLst/>
+                <a:latin typeface="Arial" panose="020B0604020202020204" pitchFamily="34" charset="0"/>
+              </a:rPr>
+              <a:t>. Long-running tasks can block thread pool threads and exhaust available threads.</a:t>
+            </a:r>
+          </a:p>
+          <a:p>
+            <a:pPr marL="0" marR="0" lvl="0" indent="0" algn="l" defTabSz="914400" rtl="0" eaLnBrk="0" fontAlgn="base" latinLnBrk="0" hangingPunct="0">
+              <a:lnSpc>
+                <a:spcPct val="100000"/>
+              </a:lnSpc>
+              <a:spcBef>
+                <a:spcPct val="0"/>
+              </a:spcBef>
+              <a:spcAft>
+                <a:spcPct val="0"/>
+              </a:spcAft>
+              <a:buClrTx/>
+              <a:buSzTx/>
+              <a:buFontTx/>
+              <a:buAutoNum type="arabicPeriod" startAt="6"/>
+              <a:tabLst/>
+            </a:pPr>
+            <a:r>
+              <a:rPr kumimoji="0" lang="en-US" altLang="en-US" sz="1900" b="1" i="0" u="none" strike="noStrike" cap="none" normalizeH="0" baseline="0" dirty="0">
+                <a:ln>
+                  <a:noFill/>
+                </a:ln>
+                <a:solidFill>
+                  <a:schemeClr val="tx1"/>
+                </a:solidFill>
+                <a:effectLst/>
+                <a:latin typeface="Arial" panose="020B0604020202020204" pitchFamily="34" charset="0"/>
+              </a:rPr>
+              <a:t> Difficult debugging and tracing</a:t>
+            </a:r>
+            <a:endParaRPr kumimoji="0" lang="en-US" altLang="en-US" sz="1900" b="0" i="0" u="none" strike="noStrike" cap="none" normalizeH="0" baseline="0" dirty="0">
+              <a:ln>
+                <a:noFill/>
+              </a:ln>
+              <a:solidFill>
+                <a:schemeClr val="tx1"/>
+              </a:solidFill>
+              <a:effectLst/>
+              <a:latin typeface="Arial" panose="020B0604020202020204" pitchFamily="34" charset="0"/>
+            </a:endParaRPr>
+          </a:p>
+          <a:p>
+            <a:pPr marL="457200" marR="0" lvl="1" indent="0" algn="l" defTabSz="914400" rtl="0" eaLnBrk="0" fontAlgn="base" latinLnBrk="0" hangingPunct="0">
+              <a:lnSpc>
+                <a:spcPct val="100000"/>
+              </a:lnSpc>
+              <a:spcBef>
+                <a:spcPct val="0"/>
+              </a:spcBef>
+              <a:spcAft>
+                <a:spcPct val="0"/>
+              </a:spcAft>
+              <a:buClrTx/>
+              <a:buSzTx/>
+              <a:buFontTx/>
+              <a:buChar char="•"/>
+              <a:tabLst/>
+            </a:pPr>
+            <a:r>
+              <a:rPr kumimoji="0" lang="en-US" altLang="en-US" sz="1900" b="0" i="0" u="none" strike="noStrike" cap="none" normalizeH="0" baseline="0" dirty="0">
+                <a:ln>
+                  <a:noFill/>
+                </a:ln>
+                <a:solidFill>
+                  <a:schemeClr val="tx1"/>
+                </a:solidFill>
+                <a:effectLst/>
+                <a:latin typeface="Arial" panose="020B0604020202020204" pitchFamily="34" charset="0"/>
+              </a:rPr>
+              <a:t>Since the threads are pooled and reused, stack traces and debugging behavior can be harder to follow.</a:t>
+            </a:r>
+          </a:p>
+          <a:p>
+            <a:pPr marL="0" marR="0" lvl="0" indent="0" algn="l" defTabSz="914400" rtl="0" eaLnBrk="0" fontAlgn="base" latinLnBrk="0" hangingPunct="0">
+              <a:lnSpc>
+                <a:spcPct val="100000"/>
+              </a:lnSpc>
+              <a:spcBef>
+                <a:spcPct val="0"/>
+              </a:spcBef>
+              <a:spcAft>
+                <a:spcPct val="0"/>
+              </a:spcAft>
+              <a:buClrTx/>
+              <a:buSzTx/>
+              <a:buFontTx/>
+              <a:buAutoNum type="arabicPeriod" startAt="7"/>
+              <a:tabLst/>
+            </a:pPr>
+            <a:r>
+              <a:rPr kumimoji="0" lang="en-US" altLang="en-US" sz="1900" b="1" i="0" u="none" strike="noStrike" cap="none" normalizeH="0" baseline="0" dirty="0">
+                <a:ln>
+                  <a:noFill/>
+                </a:ln>
+                <a:solidFill>
+                  <a:schemeClr val="tx1"/>
+                </a:solidFill>
+                <a:effectLst/>
+                <a:latin typeface="Arial" panose="020B0604020202020204" pitchFamily="34" charset="0"/>
+              </a:rPr>
+              <a:t> No dependency injection or scoped lifetime support</a:t>
+            </a:r>
+            <a:endParaRPr kumimoji="0" lang="en-US" altLang="en-US" sz="1900" b="0" i="0" u="none" strike="noStrike" cap="none" normalizeH="0" baseline="0" dirty="0">
+              <a:ln>
+                <a:noFill/>
+              </a:ln>
+              <a:solidFill>
+                <a:schemeClr val="tx1"/>
+              </a:solidFill>
+              <a:effectLst/>
+              <a:latin typeface="Arial" panose="020B0604020202020204" pitchFamily="34" charset="0"/>
+            </a:endParaRPr>
+          </a:p>
+          <a:p>
+            <a:pPr marL="457200" marR="0" lvl="1" indent="0" algn="l" defTabSz="914400" rtl="0" eaLnBrk="0" fontAlgn="base" latinLnBrk="0" hangingPunct="0">
+              <a:lnSpc>
+                <a:spcPct val="100000"/>
+              </a:lnSpc>
+              <a:spcBef>
+                <a:spcPct val="0"/>
+              </a:spcBef>
+              <a:spcAft>
+                <a:spcPct val="0"/>
+              </a:spcAft>
+              <a:buClrTx/>
+              <a:buSzTx/>
+              <a:buFontTx/>
+              <a:buChar char="•"/>
+              <a:tabLst/>
+            </a:pPr>
+            <a:r>
+              <a:rPr kumimoji="0" lang="en-US" altLang="en-US" sz="1900" b="0" i="0" u="none" strike="noStrike" cap="none" normalizeH="0" baseline="0" dirty="0">
+                <a:ln>
+                  <a:noFill/>
+                </a:ln>
+                <a:solidFill>
+                  <a:schemeClr val="tx1"/>
+                </a:solidFill>
+                <a:effectLst/>
+                <a:latin typeface="Arial" panose="020B0604020202020204" pitchFamily="34" charset="0"/>
+              </a:rPr>
+              <a:t>In ASP.NET Core, </a:t>
+            </a:r>
+            <a:r>
+              <a:rPr kumimoji="0" lang="en-US" altLang="en-US" sz="1900" b="0" i="0" u="none" strike="noStrike" cap="none" normalizeH="0" baseline="0" dirty="0" err="1">
+                <a:ln>
+                  <a:noFill/>
+                </a:ln>
+                <a:solidFill>
+                  <a:schemeClr val="tx1"/>
+                </a:solidFill>
+                <a:effectLst/>
+                <a:latin typeface="Arial" panose="020B0604020202020204" pitchFamily="34" charset="0"/>
+              </a:rPr>
+              <a:t>ThreadPool</a:t>
+            </a:r>
+            <a:r>
+              <a:rPr kumimoji="0" lang="en-US" altLang="en-US" sz="1900" b="0" i="0" u="none" strike="noStrike" cap="none" normalizeH="0" baseline="0" dirty="0">
+                <a:ln>
+                  <a:noFill/>
+                </a:ln>
+                <a:solidFill>
+                  <a:schemeClr val="tx1"/>
+                </a:solidFill>
+                <a:effectLst/>
+                <a:latin typeface="Arial" panose="020B0604020202020204" pitchFamily="34" charset="0"/>
+              </a:rPr>
+              <a:t> threads don’t have access to scoped services. Using them can lead to service lifetime violations.</a:t>
+            </a:r>
+          </a:p>
+          <a:p>
+            <a:endParaRPr lang="en-US" dirty="0"/>
+          </a:p>
+        </p:txBody>
+      </p:sp>
+    </p:spTree>
+    <p:extLst>
+      <p:ext uri="{BB962C8B-B14F-4D97-AF65-F5344CB8AC3E}">
+        <p14:creationId xmlns:p14="http://schemas.microsoft.com/office/powerpoint/2010/main" val="1042238587"/>
       </p:ext>
     </p:extLst>
   </p:cSld>

</xml_diff>

<commit_message>
Renamed the file for threadpool and added details for task in PPT
</commit_message>
<xml_diff>
--- a/PPT/Mastering Multithreading in DotNet.pptx
+++ b/PPT/Mastering Multithreading in DotNet.pptx
@@ -21,6 +21,10 @@
     <p:sldId id="320" r:id="rId18"/>
     <p:sldId id="321" r:id="rId19"/>
     <p:sldId id="322" r:id="rId20"/>
+    <p:sldId id="323" r:id="rId21"/>
+    <p:sldId id="324" r:id="rId22"/>
+    <p:sldId id="325" r:id="rId23"/>
+    <p:sldId id="326" r:id="rId24"/>
   </p:sldIdLst>
   <p:sldSz cx="12192000" cy="6858000"/>
   <p:notesSz cx="6858000" cy="9144000"/>
@@ -3365,7 +3369,7 @@
           <a:p>
             <a:fld id="{9184DA70-C731-4C70-880D-CCD4705E623C}" type="datetime1">
               <a:rPr lang="en-US" smtClean="0"/>
-              <a:t>5/5/2025</a:t>
+              <a:t>5/6/2025</a:t>
             </a:fld>
             <a:endParaRPr lang="en-US" dirty="0"/>
           </a:p>
@@ -3553,7 +3557,7 @@
           <a:p>
             <a:fld id="{4BE1D723-8F53-4F53-90B0-1982A396982E}" type="datetime1">
               <a:rPr lang="en-US" smtClean="0"/>
-              <a:t>5/5/2025</a:t>
+              <a:t>5/6/2025</a:t>
             </a:fld>
             <a:endParaRPr lang="en-US" dirty="0"/>
           </a:p>
@@ -3926,7 +3930,7 @@
           <a:p>
             <a:fld id="{97669AF7-7BEB-44E4-9852-375E34362B5B}" type="datetime1">
               <a:rPr lang="en-US" smtClean="0"/>
-              <a:t>5/5/2025</a:t>
+              <a:t>5/6/2025</a:t>
             </a:fld>
             <a:endParaRPr lang="en-US" dirty="0"/>
           </a:p>
@@ -4181,7 +4185,7 @@
           <a:p>
             <a:fld id="{BAAAC38D-0552-4C82-B593-E6124DFADBE2}" type="datetime1">
               <a:rPr lang="en-US" smtClean="0"/>
-              <a:t>5/5/2025</a:t>
+              <a:t>5/6/2025</a:t>
             </a:fld>
             <a:endParaRPr lang="en-US" dirty="0"/>
           </a:p>
@@ -4578,7 +4582,7 @@
           <a:p>
             <a:fld id="{D9DF0F1C-5577-4ACB-BB62-DF8F3C494C7E}" type="datetime1">
               <a:rPr lang="en-US" smtClean="0"/>
-              <a:t>5/5/2025</a:t>
+              <a:t>5/6/2025</a:t>
             </a:fld>
             <a:endParaRPr lang="en-US" dirty="0"/>
           </a:p>
@@ -4714,7 +4718,7 @@
           <a:p>
             <a:fld id="{1775B394-D9F9-4F0C-B15D-605F45CB9E9F}" type="datetime1">
               <a:rPr lang="en-US" smtClean="0"/>
-              <a:t>5/5/2025</a:t>
+              <a:t>5/6/2025</a:t>
             </a:fld>
             <a:endParaRPr lang="en-US" dirty="0"/>
           </a:p>
@@ -4871,7 +4875,7 @@
           <a:p>
             <a:fld id="{39667345-2558-425A-8533-9BFDBCE15005}" type="datetime1">
               <a:rPr lang="en-US" smtClean="0"/>
-              <a:t>5/5/2025</a:t>
+              <a:t>5/6/2025</a:t>
             </a:fld>
             <a:endParaRPr lang="en-US" dirty="0"/>
           </a:p>
@@ -5200,7 +5204,7 @@
           <a:p>
             <a:fld id="{92BEA474-078D-4E9B-9B14-09A87B19DC46}" type="datetime1">
               <a:rPr lang="en-US" smtClean="0"/>
-              <a:t>5/5/2025</a:t>
+              <a:t>5/6/2025</a:t>
             </a:fld>
             <a:endParaRPr lang="en-US" dirty="0"/>
           </a:p>
@@ -5550,7 +5554,7 @@
           <a:p>
             <a:fld id="{4907D986-8816-4272-A432-0437A28A9828}" type="datetime1">
               <a:rPr lang="en-US" smtClean="0"/>
-              <a:t>5/5/2025</a:t>
+              <a:t>5/6/2025</a:t>
             </a:fld>
             <a:endParaRPr lang="en-US" dirty="0"/>
           </a:p>
@@ -5811,7 +5815,7 @@
           <a:p>
             <a:fld id="{62D6E202-B606-4609-B914-27C9371A1F6D}" type="datetime1">
               <a:rPr lang="en-US" smtClean="0"/>
-              <a:t>5/5/2025</a:t>
+              <a:t>5/6/2025</a:t>
             </a:fld>
             <a:endParaRPr lang="en-US" dirty="0"/>
           </a:p>
@@ -8177,7 +8181,7 @@
         <p:spPr/>
         <p:txBody>
           <a:bodyPr>
-            <a:normAutofit fontScale="85000" lnSpcReduction="20000"/>
+            <a:normAutofit fontScale="70000" lnSpcReduction="20000"/>
           </a:bodyPr>
           <a:lstStyle/>
           <a:p>
@@ -8287,16 +8291,38 @@
                 </a:solidFill>
                 <a:effectLst/>
               </a:rPr>
-              <a:t> the completion.</a:t>
-            </a:r>
-            <a:endParaRPr kumimoji="0" lang="en-US" altLang="en-US" sz="1900" b="0" i="0" u="none" strike="noStrike" cap="none" normalizeH="0" baseline="0" dirty="0">
-              <a:ln>
-                <a:noFill/>
-              </a:ln>
+              <a:t> </a:t>
+            </a:r>
+            <a:r>
+              <a:rPr lang="en-US" altLang="en-US" sz="1900" dirty="0">
+                <a:solidFill>
+                  <a:schemeClr val="tx1"/>
+                </a:solidFill>
+                <a:latin typeface="Arial" panose="020B0604020202020204" pitchFamily="34" charset="0"/>
+              </a:rPr>
+              <a:t>the completion.</a:t>
+            </a:r>
+          </a:p>
+          <a:p>
+            <a:pPr marL="457200" marR="0" lvl="1" indent="0" algn="l" defTabSz="914400" rtl="0" eaLnBrk="0" fontAlgn="base" latinLnBrk="0" hangingPunct="0">
+              <a:lnSpc>
+                <a:spcPct val="100000"/>
+              </a:lnSpc>
+              <a:spcBef>
+                <a:spcPct val="0"/>
+              </a:spcBef>
+              <a:spcAft>
+                <a:spcPct val="0"/>
+              </a:spcAft>
+              <a:buClrTx/>
+              <a:buSzTx/>
+              <a:buNone/>
+              <a:tabLst/>
+            </a:pPr>
+            <a:endParaRPr lang="en-US" altLang="en-US" sz="1900" dirty="0">
               <a:solidFill>
                 <a:schemeClr val="tx1"/>
               </a:solidFill>
-              <a:effectLst/>
               <a:latin typeface="Arial" panose="020B0604020202020204" pitchFamily="34" charset="0"/>
             </a:endParaRPr>
           </a:p>
@@ -8373,6 +8399,33 @@
             </a:r>
           </a:p>
           <a:p>
+            <a:pPr marL="457200" marR="0" lvl="1" indent="0" algn="l" defTabSz="914400" rtl="0" eaLnBrk="0" fontAlgn="base" latinLnBrk="0" hangingPunct="0">
+              <a:lnSpc>
+                <a:spcPct val="100000"/>
+              </a:lnSpc>
+              <a:spcBef>
+                <a:spcPct val="0"/>
+              </a:spcBef>
+              <a:spcAft>
+                <a:spcPct val="0"/>
+              </a:spcAft>
+              <a:buClrTx/>
+              <a:buSzTx/>
+              <a:buNone/>
+              <a:tabLst/>
+            </a:pPr>
+            <a:endParaRPr kumimoji="0" lang="en-US" altLang="en-US" sz="1900" b="0" i="0" u="none" strike="noStrike" cap="none" normalizeH="0" baseline="0" dirty="0">
+              <a:ln>
+                <a:noFill/>
+              </a:ln>
+              <a:solidFill>
+                <a:schemeClr val="tx1"/>
+              </a:solidFill>
+              <a:effectLst/>
+              <a:latin typeface="Arial" panose="020B0604020202020204" pitchFamily="34" charset="0"/>
+            </a:endParaRPr>
+          </a:p>
+          <a:p>
             <a:pPr marL="0" marR="0" lvl="0" indent="0" algn="l" defTabSz="914400" rtl="0" eaLnBrk="0" fontAlgn="base" latinLnBrk="0" hangingPunct="0">
               <a:lnSpc>
                 <a:spcPct val="100000"/>
@@ -8445,6 +8498,33 @@
             </a:r>
           </a:p>
           <a:p>
+            <a:pPr marL="457200" marR="0" lvl="1" indent="0" algn="l" defTabSz="914400" rtl="0" eaLnBrk="0" fontAlgn="base" latinLnBrk="0" hangingPunct="0">
+              <a:lnSpc>
+                <a:spcPct val="100000"/>
+              </a:lnSpc>
+              <a:spcBef>
+                <a:spcPct val="0"/>
+              </a:spcBef>
+              <a:spcAft>
+                <a:spcPct val="0"/>
+              </a:spcAft>
+              <a:buClrTx/>
+              <a:buSzTx/>
+              <a:buNone/>
+              <a:tabLst/>
+            </a:pPr>
+            <a:endParaRPr kumimoji="0" lang="en-US" altLang="en-US" sz="1900" b="0" i="0" u="none" strike="noStrike" cap="none" normalizeH="0" baseline="0" dirty="0">
+              <a:ln>
+                <a:noFill/>
+              </a:ln>
+              <a:solidFill>
+                <a:schemeClr val="tx1"/>
+              </a:solidFill>
+              <a:effectLst/>
+              <a:latin typeface="Arial" panose="020B0604020202020204" pitchFamily="34" charset="0"/>
+            </a:endParaRPr>
+          </a:p>
+          <a:p>
             <a:pPr marL="0" marR="0" lvl="0" indent="0" algn="l" defTabSz="914400" rtl="0" eaLnBrk="0" fontAlgn="base" latinLnBrk="0" hangingPunct="0">
               <a:lnSpc>
                 <a:spcPct val="100000"/>
@@ -8517,6 +8597,33 @@
             </a:r>
           </a:p>
           <a:p>
+            <a:pPr marL="457200" marR="0" lvl="1" indent="0" algn="l" defTabSz="914400" rtl="0" eaLnBrk="0" fontAlgn="base" latinLnBrk="0" hangingPunct="0">
+              <a:lnSpc>
+                <a:spcPct val="100000"/>
+              </a:lnSpc>
+              <a:spcBef>
+                <a:spcPct val="0"/>
+              </a:spcBef>
+              <a:spcAft>
+                <a:spcPct val="0"/>
+              </a:spcAft>
+              <a:buClrTx/>
+              <a:buSzTx/>
+              <a:buNone/>
+              <a:tabLst/>
+            </a:pPr>
+            <a:endParaRPr kumimoji="0" lang="en-US" altLang="en-US" sz="1900" b="0" i="0" u="none" strike="noStrike" cap="none" normalizeH="0" baseline="0" dirty="0">
+              <a:ln>
+                <a:noFill/>
+              </a:ln>
+              <a:solidFill>
+                <a:schemeClr val="tx1"/>
+              </a:solidFill>
+              <a:effectLst/>
+              <a:latin typeface="Arial" panose="020B0604020202020204" pitchFamily="34" charset="0"/>
+            </a:endParaRPr>
+          </a:p>
+          <a:p>
             <a:pPr marL="0" marR="0" lvl="0" indent="0" algn="l" defTabSz="914400" rtl="0" eaLnBrk="0" fontAlgn="base" latinLnBrk="0" hangingPunct="0">
               <a:lnSpc>
                 <a:spcPct val="100000"/>
@@ -8628,6 +8735,33 @@
             </a:r>
           </a:p>
           <a:p>
+            <a:pPr marL="457200" marR="0" lvl="1" indent="0" algn="l" defTabSz="914400" rtl="0" eaLnBrk="0" fontAlgn="base" latinLnBrk="0" hangingPunct="0">
+              <a:lnSpc>
+                <a:spcPct val="100000"/>
+              </a:lnSpc>
+              <a:spcBef>
+                <a:spcPct val="0"/>
+              </a:spcBef>
+              <a:spcAft>
+                <a:spcPct val="0"/>
+              </a:spcAft>
+              <a:buClrTx/>
+              <a:buSzTx/>
+              <a:buNone/>
+              <a:tabLst/>
+            </a:pPr>
+            <a:endParaRPr kumimoji="0" lang="en-US" altLang="en-US" sz="1900" b="0" i="0" u="none" strike="noStrike" cap="none" normalizeH="0" baseline="0" dirty="0">
+              <a:ln>
+                <a:noFill/>
+              </a:ln>
+              <a:solidFill>
+                <a:schemeClr val="tx1"/>
+              </a:solidFill>
+              <a:effectLst/>
+              <a:latin typeface="Arial" panose="020B0604020202020204" pitchFamily="34" charset="0"/>
+            </a:endParaRPr>
+          </a:p>
+          <a:p>
             <a:pPr marL="0" marR="0" lvl="0" indent="0" algn="l" defTabSz="914400" rtl="0" eaLnBrk="0" fontAlgn="base" latinLnBrk="0" hangingPunct="0">
               <a:lnSpc>
                 <a:spcPct val="100000"/>
@@ -8700,6 +8834,33 @@
             </a:r>
           </a:p>
           <a:p>
+            <a:pPr marL="457200" marR="0" lvl="1" indent="0" algn="l" defTabSz="914400" rtl="0" eaLnBrk="0" fontAlgn="base" latinLnBrk="0" hangingPunct="0">
+              <a:lnSpc>
+                <a:spcPct val="100000"/>
+              </a:lnSpc>
+              <a:spcBef>
+                <a:spcPct val="0"/>
+              </a:spcBef>
+              <a:spcAft>
+                <a:spcPct val="0"/>
+              </a:spcAft>
+              <a:buClrTx/>
+              <a:buSzTx/>
+              <a:buNone/>
+              <a:tabLst/>
+            </a:pPr>
+            <a:endParaRPr kumimoji="0" lang="en-US" altLang="en-US" sz="1900" b="0" i="0" u="none" strike="noStrike" cap="none" normalizeH="0" baseline="0" dirty="0">
+              <a:ln>
+                <a:noFill/>
+              </a:ln>
+              <a:solidFill>
+                <a:schemeClr val="tx1"/>
+              </a:solidFill>
+              <a:effectLst/>
+              <a:latin typeface="Arial" panose="020B0604020202020204" pitchFamily="34" charset="0"/>
+            </a:endParaRPr>
+          </a:p>
+          <a:p>
             <a:pPr marL="0" marR="0" lvl="0" indent="0" algn="l" defTabSz="914400" rtl="0" eaLnBrk="0" fontAlgn="base" latinLnBrk="0" hangingPunct="0">
               <a:lnSpc>
                 <a:spcPct val="100000"/>
@@ -8806,6 +8967,1365 @@
     <p:extLst>
       <p:ext uri="{BB962C8B-B14F-4D97-AF65-F5344CB8AC3E}">
         <p14:creationId xmlns:p14="http://schemas.microsoft.com/office/powerpoint/2010/main" val="1042238587"/>
+      </p:ext>
+    </p:extLst>
+  </p:cSld>
+  <p:clrMapOvr>
+    <a:masterClrMapping/>
+  </p:clrMapOvr>
+</p:sld>
+</file>
+
+<file path=ppt/slides/slide17.xml><?xml version="1.0" encoding="utf-8"?>
+<p:sld xmlns:a="http://schemas.openxmlformats.org/drawingml/2006/main" xmlns:r="http://schemas.openxmlformats.org/officeDocument/2006/relationships" xmlns:p="http://schemas.openxmlformats.org/presentationml/2006/main">
+  <p:cSld>
+    <p:spTree>
+      <p:nvGrpSpPr>
+        <p:cNvPr id="1" name=""/>
+        <p:cNvGrpSpPr/>
+        <p:nvPr/>
+      </p:nvGrpSpPr>
+      <p:grpSpPr>
+        <a:xfrm>
+          <a:off x="0" y="0"/>
+          <a:ext cx="0" cy="0"/>
+          <a:chOff x="0" y="0"/>
+          <a:chExt cx="0" cy="0"/>
+        </a:xfrm>
+      </p:grpSpPr>
+      <p:sp>
+        <p:nvSpPr>
+          <p:cNvPr id="4" name="Rectangle 1">
+            <a:extLst>
+              <a:ext uri="{FF2B5EF4-FFF2-40B4-BE49-F238E27FC236}">
+                <a16:creationId xmlns:a16="http://schemas.microsoft.com/office/drawing/2014/main" id="{CDB77960-E31B-9B51-CDFA-A87A7CEDD9D4}"/>
+              </a:ext>
+            </a:extLst>
+          </p:cNvPr>
+          <p:cNvSpPr>
+            <a:spLocks noGrp="1" noChangeArrowheads="1"/>
+          </p:cNvSpPr>
+          <p:nvPr>
+            <p:ph type="title"/>
+          </p:nvPr>
+        </p:nvSpPr>
+        <p:spPr bwMode="auto">
+          <a:xfrm>
+            <a:off x="1097280" y="719594"/>
+            <a:ext cx="4745210" cy="584775"/>
+          </a:xfrm>
+          <a:prstGeom prst="rect">
+            <a:avLst/>
+          </a:prstGeom>
+          <a:noFill/>
+          <a:ln>
+            <a:noFill/>
+          </a:ln>
+          <a:effectLst/>
+          <a:extLst>
+            <a:ext uri="{909E8E84-426E-40DD-AFC4-6F175D3DCCD1}">
+              <a14:hiddenFill xmlns:a14="http://schemas.microsoft.com/office/drawing/2010/main">
+                <a:solidFill>
+                  <a:schemeClr val="accent1"/>
+                </a:solidFill>
+              </a14:hiddenFill>
+            </a:ext>
+            <a:ext uri="{91240B29-F687-4F45-9708-019B960494DF}">
+              <a14:hiddenLine xmlns:a14="http://schemas.microsoft.com/office/drawing/2010/main" w="9525">
+                <a:solidFill>
+                  <a:schemeClr val="tx1"/>
+                </a:solidFill>
+                <a:miter lim="800000"/>
+                <a:headEnd/>
+                <a:tailEnd/>
+              </a14:hiddenLine>
+            </a:ext>
+            <a:ext uri="{AF507438-7753-43E0-B8FC-AC1667EBCBE1}">
+              <a14:hiddenEffects xmlns:a14="http://schemas.microsoft.com/office/drawing/2010/main">
+                <a:effectLst>
+                  <a:outerShdw dist="35921" dir="2700000" algn="ctr" rotWithShape="0">
+                    <a:schemeClr val="bg2"/>
+                  </a:outerShdw>
+                </a:effectLst>
+              </a14:hiddenEffects>
+            </a:ext>
+          </a:extLst>
+        </p:spPr>
+        <p:txBody>
+          <a:bodyPr vert="horz" wrap="none" lIns="91440" tIns="45720" rIns="91440" bIns="45720" numCol="1" anchor="ctr" anchorCtr="0" compatLnSpc="1">
+            <a:prstTxWarp prst="textNoShape">
+              <a:avLst/>
+            </a:prstTxWarp>
+            <a:spAutoFit/>
+          </a:bodyPr>
+          <a:lstStyle/>
+          <a:p>
+            <a:pPr marL="0" marR="0" lvl="0" indent="0" algn="l" defTabSz="914400" rtl="0" eaLnBrk="0" fontAlgn="base" latinLnBrk="0" hangingPunct="0">
+              <a:lnSpc>
+                <a:spcPct val="100000"/>
+              </a:lnSpc>
+              <a:spcBef>
+                <a:spcPct val="0"/>
+              </a:spcBef>
+              <a:spcAft>
+                <a:spcPct val="0"/>
+              </a:spcAft>
+              <a:buClrTx/>
+              <a:buSzTx/>
+              <a:buFontTx/>
+              <a:buNone/>
+              <a:tabLst/>
+            </a:pPr>
+            <a:r>
+              <a:rPr kumimoji="0" lang="en-US" altLang="en-US" sz="3200" b="0" i="0" u="none" strike="noStrike" cap="none" normalizeH="0" baseline="0" dirty="0">
+                <a:ln>
+                  <a:noFill/>
+                </a:ln>
+                <a:solidFill>
+                  <a:schemeClr val="tx1"/>
+                </a:solidFill>
+                <a:effectLst/>
+                <a:latin typeface="Arial" panose="020B0604020202020204" pitchFamily="34" charset="0"/>
+              </a:rPr>
+              <a:t>Why was </a:t>
+            </a:r>
+            <a:r>
+              <a:rPr kumimoji="0" lang="en-US" altLang="en-US" sz="3200" b="0" i="0" u="none" strike="noStrike" cap="none" normalizeH="0" baseline="0" dirty="0">
+                <a:ln>
+                  <a:noFill/>
+                </a:ln>
+                <a:solidFill>
+                  <a:schemeClr val="tx1"/>
+                </a:solidFill>
+                <a:effectLst/>
+                <a:latin typeface="Arial Unicode MS" panose="020B0604020202020204" pitchFamily="34" charset="-128"/>
+              </a:rPr>
+              <a:t>Task</a:t>
+            </a:r>
+            <a:r>
+              <a:rPr kumimoji="0" lang="en-US" altLang="en-US" sz="3200" b="0" i="0" u="none" strike="noStrike" cap="none" normalizeH="0" baseline="0" dirty="0">
+                <a:ln>
+                  <a:noFill/>
+                </a:ln>
+                <a:solidFill>
+                  <a:schemeClr val="tx1"/>
+                </a:solidFill>
+                <a:effectLst/>
+              </a:rPr>
+              <a:t> introduced? </a:t>
+            </a:r>
+            <a:endParaRPr kumimoji="0" lang="en-US" altLang="en-US" sz="3200" b="0" i="0" u="none" strike="noStrike" cap="none" normalizeH="0" baseline="0" dirty="0">
+              <a:ln>
+                <a:noFill/>
+              </a:ln>
+              <a:solidFill>
+                <a:schemeClr val="tx1"/>
+              </a:solidFill>
+              <a:effectLst/>
+              <a:latin typeface="Arial" panose="020B0604020202020204" pitchFamily="34" charset="0"/>
+            </a:endParaRPr>
+          </a:p>
+        </p:txBody>
+      </p:sp>
+      <p:sp>
+        <p:nvSpPr>
+          <p:cNvPr id="5" name="Rectangle 2">
+            <a:extLst>
+              <a:ext uri="{FF2B5EF4-FFF2-40B4-BE49-F238E27FC236}">
+                <a16:creationId xmlns:a16="http://schemas.microsoft.com/office/drawing/2014/main" id="{F9E66C66-FC7A-AF6B-41D4-FA289A75842F}"/>
+              </a:ext>
+            </a:extLst>
+          </p:cNvPr>
+          <p:cNvSpPr>
+            <a:spLocks noGrp="1" noChangeArrowheads="1"/>
+          </p:cNvSpPr>
+          <p:nvPr>
+            <p:ph idx="1"/>
+          </p:nvPr>
+        </p:nvSpPr>
+        <p:spPr bwMode="auto">
+          <a:xfrm>
+            <a:off x="1097280" y="2141989"/>
+            <a:ext cx="9852121" cy="3693319"/>
+          </a:xfrm>
+          <a:prstGeom prst="rect">
+            <a:avLst/>
+          </a:prstGeom>
+          <a:noFill/>
+          <a:ln>
+            <a:noFill/>
+          </a:ln>
+          <a:effectLst/>
+          <a:extLst>
+            <a:ext uri="{909E8E84-426E-40DD-AFC4-6F175D3DCCD1}">
+              <a14:hiddenFill xmlns:a14="http://schemas.microsoft.com/office/drawing/2010/main">
+                <a:solidFill>
+                  <a:schemeClr val="accent1"/>
+                </a:solidFill>
+              </a14:hiddenFill>
+            </a:ext>
+            <a:ext uri="{91240B29-F687-4F45-9708-019B960494DF}">
+              <a14:hiddenLine xmlns:a14="http://schemas.microsoft.com/office/drawing/2010/main" w="9525">
+                <a:solidFill>
+                  <a:schemeClr val="tx1"/>
+                </a:solidFill>
+                <a:miter lim="800000"/>
+                <a:headEnd/>
+                <a:tailEnd/>
+              </a14:hiddenLine>
+            </a:ext>
+            <a:ext uri="{AF507438-7753-43E0-B8FC-AC1667EBCBE1}">
+              <a14:hiddenEffects xmlns:a14="http://schemas.microsoft.com/office/drawing/2010/main">
+                <a:effectLst>
+                  <a:outerShdw dist="35921" dir="2700000" algn="ctr" rotWithShape="0">
+                    <a:schemeClr val="bg2"/>
+                  </a:outerShdw>
+                </a:effectLst>
+              </a14:hiddenEffects>
+            </a:ext>
+          </a:extLst>
+        </p:spPr>
+        <p:txBody>
+          <a:bodyPr vert="horz" wrap="none" lIns="91440" tIns="45720" rIns="91440" bIns="45720" numCol="1" anchor="ctr" anchorCtr="0" compatLnSpc="1">
+            <a:prstTxWarp prst="textNoShape">
+              <a:avLst/>
+            </a:prstTxWarp>
+            <a:spAutoFit/>
+          </a:bodyPr>
+          <a:lstStyle/>
+          <a:p>
+            <a:pPr marL="0" marR="0" lvl="0" indent="0" algn="l" defTabSz="914400" rtl="0" eaLnBrk="0" fontAlgn="base" latinLnBrk="0" hangingPunct="0">
+              <a:lnSpc>
+                <a:spcPct val="100000"/>
+              </a:lnSpc>
+              <a:spcBef>
+                <a:spcPct val="0"/>
+              </a:spcBef>
+              <a:spcAft>
+                <a:spcPct val="0"/>
+              </a:spcAft>
+              <a:buClrTx/>
+              <a:buSzTx/>
+              <a:buFontTx/>
+              <a:buNone/>
+              <a:tabLst/>
+            </a:pPr>
+            <a:endParaRPr kumimoji="0" lang="en-US" altLang="en-US" sz="1800" b="0" i="0" u="none" strike="noStrike" cap="none" normalizeH="0" baseline="0" dirty="0">
+              <a:ln>
+                <a:noFill/>
+              </a:ln>
+              <a:solidFill>
+                <a:schemeClr val="tx1"/>
+              </a:solidFill>
+              <a:effectLst/>
+              <a:latin typeface="Arial" panose="020B0604020202020204" pitchFamily="34" charset="0"/>
+            </a:endParaRPr>
+          </a:p>
+          <a:p>
+            <a:pPr marL="0" marR="0" lvl="0" indent="0" algn="l" defTabSz="914400" rtl="0" eaLnBrk="0" fontAlgn="base" latinLnBrk="0" hangingPunct="0">
+              <a:lnSpc>
+                <a:spcPct val="100000"/>
+              </a:lnSpc>
+              <a:spcBef>
+                <a:spcPct val="0"/>
+              </a:spcBef>
+              <a:spcAft>
+                <a:spcPct val="0"/>
+              </a:spcAft>
+              <a:buClrTx/>
+              <a:buSzTx/>
+              <a:buFontTx/>
+              <a:buChar char="•"/>
+              <a:tabLst/>
+            </a:pPr>
+            <a:r>
+              <a:rPr kumimoji="0" lang="en-US" altLang="en-US" sz="1800" b="1" i="0" u="none" strike="noStrike" cap="none" normalizeH="0" baseline="0" dirty="0">
+                <a:ln>
+                  <a:noFill/>
+                </a:ln>
+                <a:solidFill>
+                  <a:schemeClr val="tx1"/>
+                </a:solidFill>
+                <a:effectLst/>
+                <a:latin typeface="Arial" panose="020B0604020202020204" pitchFamily="34" charset="0"/>
+              </a:rPr>
+              <a:t>Threads</a:t>
+            </a:r>
+            <a:r>
+              <a:rPr kumimoji="0" lang="en-US" altLang="en-US" sz="1800" b="0" i="0" u="none" strike="noStrike" cap="none" normalizeH="0" baseline="0" dirty="0">
+                <a:ln>
+                  <a:noFill/>
+                </a:ln>
+                <a:solidFill>
+                  <a:schemeClr val="tx1"/>
+                </a:solidFill>
+                <a:effectLst/>
+                <a:latin typeface="Arial" panose="020B0604020202020204" pitchFamily="34" charset="0"/>
+              </a:rPr>
+              <a:t>: Manual, heavy, and harder to manage (e.g., synchronization, pooling, exceptions).</a:t>
+            </a:r>
+          </a:p>
+          <a:p>
+            <a:pPr marL="0" marR="0" lvl="0" indent="0" algn="l" defTabSz="914400" rtl="0" eaLnBrk="0" fontAlgn="base" latinLnBrk="0" hangingPunct="0">
+              <a:lnSpc>
+                <a:spcPct val="100000"/>
+              </a:lnSpc>
+              <a:spcBef>
+                <a:spcPct val="0"/>
+              </a:spcBef>
+              <a:spcAft>
+                <a:spcPct val="0"/>
+              </a:spcAft>
+              <a:buClrTx/>
+              <a:buSzTx/>
+              <a:buNone/>
+              <a:tabLst/>
+            </a:pPr>
+            <a:endParaRPr kumimoji="0" lang="en-US" altLang="en-US" sz="1800" b="0" i="0" u="none" strike="noStrike" cap="none" normalizeH="0" baseline="0" dirty="0">
+              <a:ln>
+                <a:noFill/>
+              </a:ln>
+              <a:solidFill>
+                <a:schemeClr val="tx1"/>
+              </a:solidFill>
+              <a:effectLst/>
+              <a:latin typeface="Arial" panose="020B0604020202020204" pitchFamily="34" charset="0"/>
+            </a:endParaRPr>
+          </a:p>
+          <a:p>
+            <a:pPr marL="0" marR="0" lvl="0" indent="0" algn="l" defTabSz="914400" rtl="0" eaLnBrk="0" fontAlgn="base" latinLnBrk="0" hangingPunct="0">
+              <a:lnSpc>
+                <a:spcPct val="100000"/>
+              </a:lnSpc>
+              <a:spcBef>
+                <a:spcPct val="0"/>
+              </a:spcBef>
+              <a:spcAft>
+                <a:spcPct val="0"/>
+              </a:spcAft>
+              <a:buClrTx/>
+              <a:buSzTx/>
+              <a:buFontTx/>
+              <a:buChar char="•"/>
+              <a:tabLst/>
+            </a:pPr>
+            <a:r>
+              <a:rPr kumimoji="0" lang="en-US" altLang="en-US" sz="1800" b="1" i="0" u="none" strike="noStrike" cap="none" normalizeH="0" baseline="0" dirty="0" err="1">
+                <a:ln>
+                  <a:noFill/>
+                </a:ln>
+                <a:solidFill>
+                  <a:schemeClr val="tx1"/>
+                </a:solidFill>
+                <a:effectLst/>
+                <a:latin typeface="Arial" panose="020B0604020202020204" pitchFamily="34" charset="0"/>
+              </a:rPr>
+              <a:t>ThreadPool</a:t>
+            </a:r>
+            <a:r>
+              <a:rPr kumimoji="0" lang="en-US" altLang="en-US" sz="1800" b="0" i="0" u="none" strike="noStrike" cap="none" normalizeH="0" baseline="0" dirty="0">
+                <a:ln>
+                  <a:noFill/>
+                </a:ln>
+                <a:solidFill>
+                  <a:schemeClr val="tx1"/>
+                </a:solidFill>
+                <a:effectLst/>
+                <a:latin typeface="Arial" panose="020B0604020202020204" pitchFamily="34" charset="0"/>
+              </a:rPr>
+              <a:t>: Lightweight, reusable threads, but limited flexibility and control.</a:t>
+            </a:r>
+          </a:p>
+          <a:p>
+            <a:pPr marL="0" marR="0" lvl="0" indent="0" algn="l" defTabSz="914400" rtl="0" eaLnBrk="0" fontAlgn="base" latinLnBrk="0" hangingPunct="0">
+              <a:lnSpc>
+                <a:spcPct val="100000"/>
+              </a:lnSpc>
+              <a:spcBef>
+                <a:spcPct val="0"/>
+              </a:spcBef>
+              <a:spcAft>
+                <a:spcPct val="0"/>
+              </a:spcAft>
+              <a:buClrTx/>
+              <a:buSzTx/>
+              <a:buNone/>
+              <a:tabLst/>
+            </a:pPr>
+            <a:endParaRPr kumimoji="0" lang="en-US" altLang="en-US" sz="1800" b="0" i="0" u="none" strike="noStrike" cap="none" normalizeH="0" baseline="0" dirty="0">
+              <a:ln>
+                <a:noFill/>
+              </a:ln>
+              <a:solidFill>
+                <a:schemeClr val="tx1"/>
+              </a:solidFill>
+              <a:effectLst/>
+              <a:latin typeface="Arial" panose="020B0604020202020204" pitchFamily="34" charset="0"/>
+            </a:endParaRPr>
+          </a:p>
+          <a:p>
+            <a:pPr marL="0" marR="0" lvl="0" indent="0" algn="l" defTabSz="914400" rtl="0" eaLnBrk="0" fontAlgn="base" latinLnBrk="0" hangingPunct="0">
+              <a:lnSpc>
+                <a:spcPct val="100000"/>
+              </a:lnSpc>
+              <a:spcBef>
+                <a:spcPct val="0"/>
+              </a:spcBef>
+              <a:spcAft>
+                <a:spcPct val="0"/>
+              </a:spcAft>
+              <a:buClrTx/>
+              <a:buSzTx/>
+              <a:buFontTx/>
+              <a:buChar char="•"/>
+              <a:tabLst/>
+            </a:pPr>
+            <a:r>
+              <a:rPr kumimoji="0" lang="en-US" altLang="en-US" sz="1800" b="1" i="0" u="none" strike="noStrike" cap="none" normalizeH="0" baseline="0" dirty="0">
+                <a:ln>
+                  <a:noFill/>
+                </a:ln>
+                <a:solidFill>
+                  <a:schemeClr val="tx1"/>
+                </a:solidFill>
+                <a:effectLst/>
+                <a:latin typeface="Arial" panose="020B0604020202020204" pitchFamily="34" charset="0"/>
+              </a:rPr>
+              <a:t>Tasks (via TPL - Task Parallel Library)</a:t>
+            </a:r>
+            <a:r>
+              <a:rPr kumimoji="0" lang="en-US" altLang="en-US" sz="1800" b="0" i="0" u="none" strike="noStrike" cap="none" normalizeH="0" baseline="0" dirty="0">
+                <a:ln>
+                  <a:noFill/>
+                </a:ln>
+                <a:solidFill>
+                  <a:schemeClr val="tx1"/>
+                </a:solidFill>
+                <a:effectLst/>
+                <a:latin typeface="Arial" panose="020B0604020202020204" pitchFamily="34" charset="0"/>
+              </a:rPr>
+              <a:t> were introduced in .NET 4.0 to:</a:t>
+            </a:r>
+          </a:p>
+          <a:p>
+            <a:pPr marL="457200" marR="0" lvl="1" indent="0" algn="l" defTabSz="914400" rtl="0" eaLnBrk="0" fontAlgn="base" latinLnBrk="0" hangingPunct="0">
+              <a:lnSpc>
+                <a:spcPct val="100000"/>
+              </a:lnSpc>
+              <a:spcBef>
+                <a:spcPct val="0"/>
+              </a:spcBef>
+              <a:spcAft>
+                <a:spcPct val="0"/>
+              </a:spcAft>
+              <a:buClrTx/>
+              <a:buSzTx/>
+              <a:buFontTx/>
+              <a:buChar char="•"/>
+              <a:tabLst/>
+            </a:pPr>
+            <a:r>
+              <a:rPr kumimoji="0" lang="en-US" altLang="en-US" sz="1800" b="0" i="0" u="none" strike="noStrike" cap="none" normalizeH="0" baseline="0" dirty="0">
+                <a:ln>
+                  <a:noFill/>
+                </a:ln>
+                <a:solidFill>
+                  <a:schemeClr val="tx1"/>
+                </a:solidFill>
+                <a:effectLst/>
+                <a:latin typeface="Arial" panose="020B0604020202020204" pitchFamily="34" charset="0"/>
+              </a:rPr>
+              <a:t>Simplify asynchronous and parallel programming.</a:t>
+            </a:r>
+          </a:p>
+          <a:p>
+            <a:pPr marL="457200" marR="0" lvl="1" indent="0" algn="l" defTabSz="914400" rtl="0" eaLnBrk="0" fontAlgn="base" latinLnBrk="0" hangingPunct="0">
+              <a:lnSpc>
+                <a:spcPct val="100000"/>
+              </a:lnSpc>
+              <a:spcBef>
+                <a:spcPct val="0"/>
+              </a:spcBef>
+              <a:spcAft>
+                <a:spcPct val="0"/>
+              </a:spcAft>
+              <a:buClrTx/>
+              <a:buSzTx/>
+              <a:buFontTx/>
+              <a:buChar char="•"/>
+              <a:tabLst/>
+            </a:pPr>
+            <a:r>
+              <a:rPr kumimoji="0" lang="en-US" altLang="en-US" sz="1800" b="0" i="0" u="none" strike="noStrike" cap="none" normalizeH="0" baseline="0" dirty="0">
+                <a:ln>
+                  <a:noFill/>
+                </a:ln>
+                <a:solidFill>
+                  <a:schemeClr val="tx1"/>
+                </a:solidFill>
+                <a:effectLst/>
+                <a:latin typeface="Arial" panose="020B0604020202020204" pitchFamily="34" charset="0"/>
+              </a:rPr>
+              <a:t>Use thread pool threads efficiently under the hood.</a:t>
+            </a:r>
+          </a:p>
+          <a:p>
+            <a:pPr marL="457200" marR="0" lvl="1" indent="0" algn="l" defTabSz="914400" rtl="0" eaLnBrk="0" fontAlgn="base" latinLnBrk="0" hangingPunct="0">
+              <a:lnSpc>
+                <a:spcPct val="100000"/>
+              </a:lnSpc>
+              <a:spcBef>
+                <a:spcPct val="0"/>
+              </a:spcBef>
+              <a:spcAft>
+                <a:spcPct val="0"/>
+              </a:spcAft>
+              <a:buClrTx/>
+              <a:buSzTx/>
+              <a:buFontTx/>
+              <a:buChar char="•"/>
+              <a:tabLst/>
+            </a:pPr>
+            <a:r>
+              <a:rPr kumimoji="0" lang="en-US" altLang="en-US" sz="1800" b="0" i="0" u="none" strike="noStrike" cap="none" normalizeH="0" baseline="0" dirty="0">
+                <a:ln>
+                  <a:noFill/>
+                </a:ln>
+                <a:solidFill>
+                  <a:schemeClr val="tx1"/>
+                </a:solidFill>
+                <a:effectLst/>
+                <a:latin typeface="Arial" panose="020B0604020202020204" pitchFamily="34" charset="0"/>
+              </a:rPr>
+              <a:t>Provide a high-level abstraction over threads with more </a:t>
+            </a:r>
+            <a:r>
+              <a:rPr kumimoji="0" lang="en-US" altLang="en-US" sz="1800" b="1" i="0" u="none" strike="noStrike" cap="none" normalizeH="0" baseline="0" dirty="0">
+                <a:ln>
+                  <a:noFill/>
+                </a:ln>
+                <a:solidFill>
+                  <a:schemeClr val="tx1"/>
+                </a:solidFill>
+                <a:effectLst/>
+                <a:latin typeface="Arial" panose="020B0604020202020204" pitchFamily="34" charset="0"/>
+              </a:rPr>
+              <a:t>control</a:t>
+            </a:r>
+            <a:r>
+              <a:rPr kumimoji="0" lang="en-US" altLang="en-US" sz="1800" b="0" i="0" u="none" strike="noStrike" cap="none" normalizeH="0" baseline="0" dirty="0">
+                <a:ln>
+                  <a:noFill/>
+                </a:ln>
+                <a:solidFill>
+                  <a:schemeClr val="tx1"/>
+                </a:solidFill>
+                <a:effectLst/>
+                <a:latin typeface="Arial" panose="020B0604020202020204" pitchFamily="34" charset="0"/>
+              </a:rPr>
+              <a:t>, </a:t>
+            </a:r>
+          </a:p>
+          <a:p>
+            <a:pPr marL="457200" marR="0" lvl="1" indent="0" algn="l" defTabSz="914400" rtl="0" eaLnBrk="0" fontAlgn="base" latinLnBrk="0" hangingPunct="0">
+              <a:lnSpc>
+                <a:spcPct val="100000"/>
+              </a:lnSpc>
+              <a:spcBef>
+                <a:spcPct val="0"/>
+              </a:spcBef>
+              <a:spcAft>
+                <a:spcPct val="0"/>
+              </a:spcAft>
+              <a:buClrTx/>
+              <a:buSzTx/>
+              <a:buFontTx/>
+              <a:buChar char="•"/>
+              <a:tabLst/>
+            </a:pPr>
+            <a:r>
+              <a:rPr kumimoji="0" lang="en-US" altLang="en-US" sz="1800" b="1" i="0" u="none" strike="noStrike" cap="none" normalizeH="0" baseline="0" dirty="0">
+                <a:ln>
+                  <a:noFill/>
+                </a:ln>
+                <a:solidFill>
+                  <a:schemeClr val="tx1"/>
+                </a:solidFill>
+                <a:effectLst/>
+                <a:latin typeface="Arial" panose="020B0604020202020204" pitchFamily="34" charset="0"/>
+              </a:rPr>
+              <a:t>cancellation</a:t>
+            </a:r>
+            <a:r>
+              <a:rPr kumimoji="0" lang="en-US" altLang="en-US" sz="1800" b="0" i="0" u="none" strike="noStrike" cap="none" normalizeH="0" baseline="0" dirty="0">
+                <a:ln>
+                  <a:noFill/>
+                </a:ln>
+                <a:solidFill>
+                  <a:schemeClr val="tx1"/>
+                </a:solidFill>
+                <a:effectLst/>
+                <a:latin typeface="Arial" panose="020B0604020202020204" pitchFamily="34" charset="0"/>
+              </a:rPr>
+              <a:t>, </a:t>
+            </a:r>
+            <a:r>
+              <a:rPr kumimoji="0" lang="en-US" altLang="en-US" sz="1800" b="1" i="0" u="none" strike="noStrike" cap="none" normalizeH="0" baseline="0" dirty="0">
+                <a:ln>
+                  <a:noFill/>
+                </a:ln>
+                <a:solidFill>
+                  <a:schemeClr val="tx1"/>
+                </a:solidFill>
+                <a:effectLst/>
+                <a:latin typeface="Arial" panose="020B0604020202020204" pitchFamily="34" charset="0"/>
+              </a:rPr>
+              <a:t>continuations</a:t>
+            </a:r>
+            <a:r>
+              <a:rPr kumimoji="0" lang="en-US" altLang="en-US" sz="1800" b="0" i="0" u="none" strike="noStrike" cap="none" normalizeH="0" baseline="0" dirty="0">
+                <a:ln>
+                  <a:noFill/>
+                </a:ln>
+                <a:solidFill>
+                  <a:schemeClr val="tx1"/>
+                </a:solidFill>
+                <a:effectLst/>
+                <a:latin typeface="Arial" panose="020B0604020202020204" pitchFamily="34" charset="0"/>
+              </a:rPr>
+              <a:t>, </a:t>
+            </a:r>
+            <a:r>
+              <a:rPr kumimoji="0" lang="en-US" altLang="en-US" sz="1800" b="1" i="0" u="none" strike="noStrike" cap="none" normalizeH="0" baseline="0" dirty="0">
+                <a:ln>
+                  <a:noFill/>
+                </a:ln>
+                <a:solidFill>
+                  <a:schemeClr val="tx1"/>
+                </a:solidFill>
+                <a:effectLst/>
+                <a:latin typeface="Arial" panose="020B0604020202020204" pitchFamily="34" charset="0"/>
+              </a:rPr>
+              <a:t>exception handling</a:t>
+            </a:r>
+            <a:r>
+              <a:rPr kumimoji="0" lang="en-US" altLang="en-US" sz="1800" b="0" i="0" u="none" strike="noStrike" cap="none" normalizeH="0" baseline="0" dirty="0">
+                <a:ln>
+                  <a:noFill/>
+                </a:ln>
+                <a:solidFill>
+                  <a:schemeClr val="tx1"/>
+                </a:solidFill>
+                <a:effectLst/>
+                <a:latin typeface="Arial" panose="020B0604020202020204" pitchFamily="34" charset="0"/>
+              </a:rPr>
+              <a:t>, and </a:t>
+            </a:r>
+            <a:r>
+              <a:rPr kumimoji="0" lang="en-US" altLang="en-US" sz="1800" b="1" i="0" u="none" strike="noStrike" cap="none" normalizeH="0" baseline="0" dirty="0">
+                <a:ln>
+                  <a:noFill/>
+                </a:ln>
+                <a:solidFill>
+                  <a:schemeClr val="tx1"/>
+                </a:solidFill>
+                <a:effectLst/>
+                <a:latin typeface="Arial" panose="020B0604020202020204" pitchFamily="34" charset="0"/>
+              </a:rPr>
+              <a:t>composability</a:t>
+            </a:r>
+            <a:r>
+              <a:rPr kumimoji="0" lang="en-US" altLang="en-US" sz="1800" b="0" i="0" u="none" strike="noStrike" cap="none" normalizeH="0" baseline="0" dirty="0">
+                <a:ln>
+                  <a:noFill/>
+                </a:ln>
+                <a:solidFill>
+                  <a:schemeClr val="tx1"/>
+                </a:solidFill>
+                <a:effectLst/>
+                <a:latin typeface="Arial" panose="020B0604020202020204" pitchFamily="34" charset="0"/>
+              </a:rPr>
+              <a:t>.</a:t>
+            </a:r>
+          </a:p>
+          <a:p>
+            <a:pPr marL="457200" marR="0" lvl="1" indent="0" algn="l" defTabSz="914400" rtl="0" eaLnBrk="0" fontAlgn="base" latinLnBrk="0" hangingPunct="0">
+              <a:lnSpc>
+                <a:spcPct val="100000"/>
+              </a:lnSpc>
+              <a:spcBef>
+                <a:spcPct val="0"/>
+              </a:spcBef>
+              <a:spcAft>
+                <a:spcPct val="0"/>
+              </a:spcAft>
+              <a:buClrTx/>
+              <a:buSzTx/>
+              <a:buNone/>
+              <a:tabLst/>
+            </a:pPr>
+            <a:endParaRPr kumimoji="0" lang="en-US" altLang="en-US" sz="1800" b="0" i="0" u="none" strike="noStrike" cap="none" normalizeH="0" baseline="0" dirty="0">
+              <a:ln>
+                <a:noFill/>
+              </a:ln>
+              <a:solidFill>
+                <a:schemeClr val="tx1"/>
+              </a:solidFill>
+              <a:effectLst/>
+              <a:latin typeface="Arial" panose="020B0604020202020204" pitchFamily="34" charset="0"/>
+            </a:endParaRPr>
+          </a:p>
+          <a:p>
+            <a:pPr marL="0" marR="0" lvl="0" indent="0" algn="l" defTabSz="914400" rtl="0" eaLnBrk="0" fontAlgn="base" latinLnBrk="0" hangingPunct="0">
+              <a:lnSpc>
+                <a:spcPct val="100000"/>
+              </a:lnSpc>
+              <a:spcBef>
+                <a:spcPct val="0"/>
+              </a:spcBef>
+              <a:spcAft>
+                <a:spcPct val="0"/>
+              </a:spcAft>
+              <a:buClrTx/>
+              <a:buSzTx/>
+              <a:buFontTx/>
+              <a:buNone/>
+              <a:tabLst/>
+            </a:pPr>
+            <a:r>
+              <a:rPr kumimoji="0" lang="en-US" altLang="en-US" sz="1800" b="0" i="0" u="none" strike="noStrike" cap="none" normalizeH="0" baseline="0" dirty="0">
+                <a:ln>
+                  <a:noFill/>
+                </a:ln>
+                <a:solidFill>
+                  <a:schemeClr val="tx1"/>
+                </a:solidFill>
+                <a:effectLst/>
+                <a:latin typeface="Arial" panose="020B0604020202020204" pitchFamily="34" charset="0"/>
+              </a:rPr>
+              <a:t>🧠 Analogy: If a Thread is like creating a new worker every time, </a:t>
+            </a:r>
+          </a:p>
+          <a:p>
+            <a:pPr marL="0" marR="0" lvl="0" indent="0" algn="l" defTabSz="914400" rtl="0" eaLnBrk="0" fontAlgn="base" latinLnBrk="0" hangingPunct="0">
+              <a:lnSpc>
+                <a:spcPct val="100000"/>
+              </a:lnSpc>
+              <a:spcBef>
+                <a:spcPct val="0"/>
+              </a:spcBef>
+              <a:spcAft>
+                <a:spcPct val="0"/>
+              </a:spcAft>
+              <a:buClrTx/>
+              <a:buSzTx/>
+              <a:buFontTx/>
+              <a:buNone/>
+              <a:tabLst/>
+            </a:pPr>
+            <a:r>
+              <a:rPr kumimoji="0" lang="en-US" altLang="en-US" sz="1800" b="0" i="0" u="none" strike="noStrike" cap="none" normalizeH="0" baseline="0" dirty="0">
+                <a:ln>
+                  <a:noFill/>
+                </a:ln>
+                <a:solidFill>
+                  <a:schemeClr val="tx1"/>
+                </a:solidFill>
+                <a:effectLst/>
+                <a:latin typeface="Arial" panose="020B0604020202020204" pitchFamily="34" charset="0"/>
+              </a:rPr>
+              <a:t>a Task is like managing a group of pre-hired workers via a smart manager (</a:t>
+            </a:r>
+            <a:r>
+              <a:rPr kumimoji="0" lang="en-US" altLang="en-US" sz="1800" b="0" i="0" u="none" strike="noStrike" cap="none" normalizeH="0" baseline="0" dirty="0" err="1">
+                <a:ln>
+                  <a:noFill/>
+                </a:ln>
+                <a:solidFill>
+                  <a:schemeClr val="tx1"/>
+                </a:solidFill>
+                <a:effectLst/>
+                <a:latin typeface="Arial" panose="020B0604020202020204" pitchFamily="34" charset="0"/>
+              </a:rPr>
+              <a:t>ThreadPool</a:t>
+            </a:r>
+            <a:r>
+              <a:rPr kumimoji="0" lang="en-US" altLang="en-US" sz="1800" b="0" i="0" u="none" strike="noStrike" cap="none" normalizeH="0" baseline="0" dirty="0">
+                <a:ln>
+                  <a:noFill/>
+                </a:ln>
+                <a:solidFill>
+                  <a:schemeClr val="tx1"/>
+                </a:solidFill>
+                <a:effectLst/>
+                <a:latin typeface="Arial" panose="020B0604020202020204" pitchFamily="34" charset="0"/>
+              </a:rPr>
+              <a:t> + TPL).</a:t>
+            </a:r>
+          </a:p>
+        </p:txBody>
+      </p:sp>
+    </p:spTree>
+    <p:extLst>
+      <p:ext uri="{BB962C8B-B14F-4D97-AF65-F5344CB8AC3E}">
+        <p14:creationId xmlns:p14="http://schemas.microsoft.com/office/powerpoint/2010/main" val="344087931"/>
+      </p:ext>
+    </p:extLst>
+  </p:cSld>
+  <p:clrMapOvr>
+    <a:masterClrMapping/>
+  </p:clrMapOvr>
+</p:sld>
+</file>
+
+<file path=ppt/slides/slide18.xml><?xml version="1.0" encoding="utf-8"?>
+<p:sld xmlns:a="http://schemas.openxmlformats.org/drawingml/2006/main" xmlns:r="http://schemas.openxmlformats.org/officeDocument/2006/relationships" xmlns:p="http://schemas.openxmlformats.org/presentationml/2006/main">
+  <p:cSld>
+    <p:spTree>
+      <p:nvGrpSpPr>
+        <p:cNvPr id="1" name=""/>
+        <p:cNvGrpSpPr/>
+        <p:nvPr/>
+      </p:nvGrpSpPr>
+      <p:grpSpPr>
+        <a:xfrm>
+          <a:off x="0" y="0"/>
+          <a:ext cx="0" cy="0"/>
+          <a:chOff x="0" y="0"/>
+          <a:chExt cx="0" cy="0"/>
+        </a:xfrm>
+      </p:grpSpPr>
+      <p:sp>
+        <p:nvSpPr>
+          <p:cNvPr id="2" name="Title 1">
+            <a:extLst>
+              <a:ext uri="{FF2B5EF4-FFF2-40B4-BE49-F238E27FC236}">
+                <a16:creationId xmlns:a16="http://schemas.microsoft.com/office/drawing/2014/main" id="{BAD06358-AACF-A3FB-9DC7-8BAC9BCA835E}"/>
+              </a:ext>
+            </a:extLst>
+          </p:cNvPr>
+          <p:cNvSpPr>
+            <a:spLocks noGrp="1"/>
+          </p:cNvSpPr>
+          <p:nvPr>
+            <p:ph type="title"/>
+          </p:nvPr>
+        </p:nvSpPr>
+        <p:spPr/>
+        <p:txBody>
+          <a:bodyPr/>
+          <a:lstStyle/>
+          <a:p>
+            <a:r>
+              <a:rPr lang="en-US" dirty="0"/>
+              <a:t>Basic Thread vs Task Comparison</a:t>
+            </a:r>
+          </a:p>
+        </p:txBody>
+      </p:sp>
+      <p:graphicFrame>
+        <p:nvGraphicFramePr>
+          <p:cNvPr id="4" name="Content Placeholder 3">
+            <a:extLst>
+              <a:ext uri="{FF2B5EF4-FFF2-40B4-BE49-F238E27FC236}">
+                <a16:creationId xmlns:a16="http://schemas.microsoft.com/office/drawing/2014/main" id="{FA49E69F-5081-C892-FEE1-09D451913A7A}"/>
+              </a:ext>
+            </a:extLst>
+          </p:cNvPr>
+          <p:cNvGraphicFramePr>
+            <a:graphicFrameLocks noGrp="1"/>
+          </p:cNvGraphicFramePr>
+          <p:nvPr>
+            <p:ph idx="1"/>
+            <p:extLst>
+              <p:ext uri="{D42A27DB-BD31-4B8C-83A1-F6EECF244321}">
+                <p14:modId xmlns:p14="http://schemas.microsoft.com/office/powerpoint/2010/main" val="3233711018"/>
+              </p:ext>
+            </p:extLst>
+          </p:nvPr>
+        </p:nvGraphicFramePr>
+        <p:xfrm>
+          <a:off x="1096963" y="2108200"/>
+          <a:ext cx="10058400" cy="1559560"/>
+        </p:xfrm>
+        <a:graphic>
+          <a:graphicData uri="http://schemas.openxmlformats.org/drawingml/2006/table">
+            <a:tbl>
+              <a:tblPr firstRow="1" bandRow="1">
+                <a:tableStyleId>{5C22544A-7EE6-4342-B048-85BDC9FD1C3A}</a:tableStyleId>
+              </a:tblPr>
+              <a:tblGrid>
+                <a:gridCol w="5029200">
+                  <a:extLst>
+                    <a:ext uri="{9D8B030D-6E8A-4147-A177-3AD203B41FA5}">
+                      <a16:colId xmlns:a16="http://schemas.microsoft.com/office/drawing/2014/main" val="4220550799"/>
+                    </a:ext>
+                  </a:extLst>
+                </a:gridCol>
+                <a:gridCol w="5029200">
+                  <a:extLst>
+                    <a:ext uri="{9D8B030D-6E8A-4147-A177-3AD203B41FA5}">
+                      <a16:colId xmlns:a16="http://schemas.microsoft.com/office/drawing/2014/main" val="1285386997"/>
+                    </a:ext>
+                  </a:extLst>
+                </a:gridCol>
+              </a:tblGrid>
+              <a:tr h="370840">
+                <a:tc>
+                  <a:txBody>
+                    <a:bodyPr/>
+                    <a:lstStyle/>
+                    <a:p>
+                      <a:r>
+                        <a:rPr lang="en-US" dirty="0"/>
+                        <a:t>Thread</a:t>
+                      </a:r>
+                    </a:p>
+                  </a:txBody>
+                  <a:tcPr/>
+                </a:tc>
+                <a:tc>
+                  <a:txBody>
+                    <a:bodyPr/>
+                    <a:lstStyle/>
+                    <a:p>
+                      <a:r>
+                        <a:rPr lang="en-US" dirty="0"/>
+                        <a:t>Task</a:t>
+                      </a:r>
+                    </a:p>
+                  </a:txBody>
+                  <a:tcPr/>
+                </a:tc>
+                <a:extLst>
+                  <a:ext uri="{0D108BD9-81ED-4DB2-BD59-A6C34878D82A}">
+                    <a16:rowId xmlns:a16="http://schemas.microsoft.com/office/drawing/2014/main" val="1608612173"/>
+                  </a:ext>
+                </a:extLst>
+              </a:tr>
+              <a:tr h="370840">
+                <a:tc>
+                  <a:txBody>
+                    <a:bodyPr/>
+                    <a:lstStyle/>
+                    <a:p>
+                      <a:r>
+                        <a:rPr lang="en-US" dirty="0"/>
+                        <a:t>new Thread(() =&gt;</a:t>
+                      </a:r>
+                    </a:p>
+                    <a:p>
+                      <a:r>
+                        <a:rPr lang="en-US" dirty="0"/>
+                        <a:t>{</a:t>
+                      </a:r>
+                    </a:p>
+                    <a:p>
+                      <a:r>
+                        <a:rPr lang="en-US" dirty="0"/>
+                        <a:t>    </a:t>
+                      </a:r>
+                      <a:r>
+                        <a:rPr lang="en-US" dirty="0" err="1"/>
+                        <a:t>Console.WriteLine</a:t>
+                      </a:r>
+                      <a:r>
+                        <a:rPr lang="en-US" dirty="0"/>
+                        <a:t>("Running in a Thread");</a:t>
+                      </a:r>
+                    </a:p>
+                    <a:p>
+                      <a:r>
+                        <a:rPr lang="en-US" dirty="0"/>
+                        <a:t>}).Start();</a:t>
+                      </a:r>
+                    </a:p>
+                  </a:txBody>
+                  <a:tcPr/>
+                </a:tc>
+                <a:tc>
+                  <a:txBody>
+                    <a:bodyPr/>
+                    <a:lstStyle/>
+                    <a:p>
+                      <a:r>
+                        <a:rPr lang="en-US" b="1" dirty="0" err="1"/>
+                        <a:t>Task.Run</a:t>
+                      </a:r>
+                      <a:r>
+                        <a:rPr lang="en-US" b="1" dirty="0"/>
+                        <a:t>(() =&gt;</a:t>
+                      </a:r>
+                    </a:p>
+                    <a:p>
+                      <a:r>
+                        <a:rPr lang="en-US" b="1" dirty="0"/>
+                        <a:t>{</a:t>
+                      </a:r>
+                    </a:p>
+                    <a:p>
+                      <a:r>
+                        <a:rPr lang="en-US" b="1" dirty="0"/>
+                        <a:t>    </a:t>
+                      </a:r>
+                      <a:r>
+                        <a:rPr lang="en-US" b="1" dirty="0" err="1"/>
+                        <a:t>Console.WriteLine</a:t>
+                      </a:r>
+                      <a:r>
+                        <a:rPr lang="en-US" b="1" dirty="0"/>
+                        <a:t>("Running in a Task");</a:t>
+                      </a:r>
+                    </a:p>
+                    <a:p>
+                      <a:r>
+                        <a:rPr lang="en-US" b="1" dirty="0"/>
+                        <a:t>});</a:t>
+                      </a:r>
+                    </a:p>
+                  </a:txBody>
+                  <a:tcPr/>
+                </a:tc>
+                <a:extLst>
+                  <a:ext uri="{0D108BD9-81ED-4DB2-BD59-A6C34878D82A}">
+                    <a16:rowId xmlns:a16="http://schemas.microsoft.com/office/drawing/2014/main" val="2723839016"/>
+                  </a:ext>
+                </a:extLst>
+              </a:tr>
+            </a:tbl>
+          </a:graphicData>
+        </a:graphic>
+      </p:graphicFrame>
+      <p:graphicFrame>
+        <p:nvGraphicFramePr>
+          <p:cNvPr id="5" name="Table 4">
+            <a:extLst>
+              <a:ext uri="{FF2B5EF4-FFF2-40B4-BE49-F238E27FC236}">
+                <a16:creationId xmlns:a16="http://schemas.microsoft.com/office/drawing/2014/main" id="{6E3F1724-66CF-04FC-91D5-FF7D179D8E87}"/>
+              </a:ext>
+            </a:extLst>
+          </p:cNvPr>
+          <p:cNvGraphicFramePr>
+            <a:graphicFrameLocks noGrp="1"/>
+          </p:cNvGraphicFramePr>
+          <p:nvPr>
+            <p:extLst>
+              <p:ext uri="{D42A27DB-BD31-4B8C-83A1-F6EECF244321}">
+                <p14:modId xmlns:p14="http://schemas.microsoft.com/office/powerpoint/2010/main" val="4218768826"/>
+              </p:ext>
+            </p:extLst>
+          </p:nvPr>
+        </p:nvGraphicFramePr>
+        <p:xfrm>
+          <a:off x="4145466" y="3721517"/>
+          <a:ext cx="3961394" cy="2849880"/>
+        </p:xfrm>
+        <a:graphic>
+          <a:graphicData uri="http://schemas.openxmlformats.org/drawingml/2006/table">
+            <a:tbl>
+              <a:tblPr firstRow="1" bandRow="1">
+                <a:tableStyleId>{5C22544A-7EE6-4342-B048-85BDC9FD1C3A}</a:tableStyleId>
+              </a:tblPr>
+              <a:tblGrid>
+                <a:gridCol w="3961394">
+                  <a:extLst>
+                    <a:ext uri="{9D8B030D-6E8A-4147-A177-3AD203B41FA5}">
+                      <a16:colId xmlns:a16="http://schemas.microsoft.com/office/drawing/2014/main" val="3489056649"/>
+                    </a:ext>
+                  </a:extLst>
+                </a:gridCol>
+              </a:tblGrid>
+              <a:tr h="370840">
+                <a:tc>
+                  <a:txBody>
+                    <a:bodyPr/>
+                    <a:lstStyle/>
+                    <a:p>
+                      <a:r>
+                        <a:rPr lang="en-US" dirty="0"/>
+                        <a:t>Benefits of Task</a:t>
+                      </a:r>
+                    </a:p>
+                  </a:txBody>
+                  <a:tcPr/>
+                </a:tc>
+                <a:extLst>
+                  <a:ext uri="{0D108BD9-81ED-4DB2-BD59-A6C34878D82A}">
+                    <a16:rowId xmlns:a16="http://schemas.microsoft.com/office/drawing/2014/main" val="4134398903"/>
+                  </a:ext>
+                </a:extLst>
+              </a:tr>
+              <a:tr h="370840">
+                <a:tc>
+                  <a:txBody>
+                    <a:bodyPr/>
+                    <a:lstStyle/>
+                    <a:p>
+                      <a:r>
+                        <a:rPr lang="en-US" dirty="0"/>
+                        <a:t>Task is simpler.</a:t>
+                      </a:r>
+                    </a:p>
+                  </a:txBody>
+                  <a:tcPr/>
+                </a:tc>
+                <a:extLst>
+                  <a:ext uri="{0D108BD9-81ED-4DB2-BD59-A6C34878D82A}">
+                    <a16:rowId xmlns:a16="http://schemas.microsoft.com/office/drawing/2014/main" val="2217343723"/>
+                  </a:ext>
+                </a:extLst>
+              </a:tr>
+              <a:tr h="370840">
+                <a:tc>
+                  <a:txBody>
+                    <a:bodyPr/>
+                    <a:lstStyle/>
+                    <a:p>
+                      <a:r>
+                        <a:rPr lang="en-US" dirty="0"/>
+                        <a:t>Runs on </a:t>
+                      </a:r>
+                      <a:r>
+                        <a:rPr lang="en-US" dirty="0" err="1"/>
+                        <a:t>ThreadPool</a:t>
+                      </a:r>
+                      <a:r>
+                        <a:rPr lang="en-US" dirty="0"/>
+                        <a:t>.</a:t>
+                      </a:r>
+                    </a:p>
+                  </a:txBody>
+                  <a:tcPr/>
+                </a:tc>
+                <a:extLst>
+                  <a:ext uri="{0D108BD9-81ED-4DB2-BD59-A6C34878D82A}">
+                    <a16:rowId xmlns:a16="http://schemas.microsoft.com/office/drawing/2014/main" val="896547560"/>
+                  </a:ext>
+                </a:extLst>
+              </a:tr>
+              <a:tr h="370840">
+                <a:tc>
+                  <a:txBody>
+                    <a:bodyPr/>
+                    <a:lstStyle/>
+                    <a:p>
+                      <a:r>
+                        <a:rPr lang="en-US" dirty="0"/>
+                        <a:t>Returns a Task object, allowing you to</a:t>
+                      </a:r>
+                    </a:p>
+                    <a:p>
+                      <a:pPr marL="285750" indent="-285750">
+                        <a:buFont typeface="Arial" panose="020B0604020202020204" pitchFamily="34" charset="0"/>
+                        <a:buChar char="•"/>
+                      </a:pPr>
+                      <a:r>
+                        <a:rPr lang="en-US" dirty="0"/>
+                        <a:t>Use .</a:t>
+                      </a:r>
+                      <a:r>
+                        <a:rPr lang="en-US" dirty="0" err="1"/>
+                        <a:t>ContinueWith</a:t>
+                      </a:r>
+                      <a:r>
+                        <a:rPr lang="en-US" dirty="0"/>
+                        <a:t>()</a:t>
+                      </a:r>
+                    </a:p>
+                    <a:p>
+                      <a:pPr marL="285750" indent="-285750">
+                        <a:buFont typeface="Arial" panose="020B0604020202020204" pitchFamily="34" charset="0"/>
+                        <a:buChar char="•"/>
+                      </a:pPr>
+                      <a:r>
+                        <a:rPr lang="en-US" dirty="0"/>
+                        <a:t>Await the result (await)</a:t>
+                      </a:r>
+                    </a:p>
+                    <a:p>
+                      <a:pPr marL="285750" indent="-285750">
+                        <a:buFont typeface="Arial" panose="020B0604020202020204" pitchFamily="34" charset="0"/>
+                        <a:buChar char="•"/>
+                      </a:pPr>
+                      <a:r>
+                        <a:rPr lang="en-US" dirty="0"/>
+                        <a:t>Handle exceptions easily</a:t>
+                      </a:r>
+                    </a:p>
+                    <a:p>
+                      <a:pPr marL="285750" indent="-285750">
+                        <a:buFont typeface="Arial" panose="020B0604020202020204" pitchFamily="34" charset="0"/>
+                        <a:buChar char="•"/>
+                      </a:pPr>
+                      <a:r>
+                        <a:rPr lang="en-US" dirty="0"/>
+                        <a:t>Use cancellation tokens</a:t>
+                      </a:r>
+                    </a:p>
+                    <a:p>
+                      <a:endParaRPr lang="en-US" dirty="0"/>
+                    </a:p>
+                  </a:txBody>
+                  <a:tcPr/>
+                </a:tc>
+                <a:extLst>
+                  <a:ext uri="{0D108BD9-81ED-4DB2-BD59-A6C34878D82A}">
+                    <a16:rowId xmlns:a16="http://schemas.microsoft.com/office/drawing/2014/main" val="1679162172"/>
+                  </a:ext>
+                </a:extLst>
+              </a:tr>
+            </a:tbl>
+          </a:graphicData>
+        </a:graphic>
+      </p:graphicFrame>
+    </p:spTree>
+    <p:extLst>
+      <p:ext uri="{BB962C8B-B14F-4D97-AF65-F5344CB8AC3E}">
+        <p14:creationId xmlns:p14="http://schemas.microsoft.com/office/powerpoint/2010/main" val="1727636027"/>
+      </p:ext>
+    </p:extLst>
+  </p:cSld>
+  <p:clrMapOvr>
+    <a:masterClrMapping/>
+  </p:clrMapOvr>
+</p:sld>
+</file>
+
+<file path=ppt/slides/slide19.xml><?xml version="1.0" encoding="utf-8"?>
+<p:sld xmlns:a="http://schemas.openxmlformats.org/drawingml/2006/main" xmlns:r="http://schemas.openxmlformats.org/officeDocument/2006/relationships" xmlns:p="http://schemas.openxmlformats.org/presentationml/2006/main">
+  <p:cSld>
+    <p:spTree>
+      <p:nvGrpSpPr>
+        <p:cNvPr id="1" name=""/>
+        <p:cNvGrpSpPr/>
+        <p:nvPr/>
+      </p:nvGrpSpPr>
+      <p:grpSpPr>
+        <a:xfrm>
+          <a:off x="0" y="0"/>
+          <a:ext cx="0" cy="0"/>
+          <a:chOff x="0" y="0"/>
+          <a:chExt cx="0" cy="0"/>
+        </a:xfrm>
+      </p:grpSpPr>
+      <p:sp>
+        <p:nvSpPr>
+          <p:cNvPr id="2" name="Title 1">
+            <a:extLst>
+              <a:ext uri="{FF2B5EF4-FFF2-40B4-BE49-F238E27FC236}">
+                <a16:creationId xmlns:a16="http://schemas.microsoft.com/office/drawing/2014/main" id="{EAD2EBE0-7E53-65E9-7956-0C4B624E0A75}"/>
+              </a:ext>
+            </a:extLst>
+          </p:cNvPr>
+          <p:cNvSpPr>
+            <a:spLocks noGrp="1"/>
+          </p:cNvSpPr>
+          <p:nvPr>
+            <p:ph type="title"/>
+          </p:nvPr>
+        </p:nvSpPr>
+        <p:spPr/>
+        <p:txBody>
+          <a:bodyPr/>
+          <a:lstStyle/>
+          <a:p>
+            <a:r>
+              <a:rPr lang="en-US" dirty="0"/>
+              <a:t>Real-World Use Case of Task</a:t>
+            </a:r>
+          </a:p>
+        </p:txBody>
+      </p:sp>
+      <p:sp>
+        <p:nvSpPr>
+          <p:cNvPr id="3" name="Content Placeholder 2">
+            <a:extLst>
+              <a:ext uri="{FF2B5EF4-FFF2-40B4-BE49-F238E27FC236}">
+                <a16:creationId xmlns:a16="http://schemas.microsoft.com/office/drawing/2014/main" id="{DD6CA077-6652-372C-856F-097F650C38A5}"/>
+              </a:ext>
+            </a:extLst>
+          </p:cNvPr>
+          <p:cNvSpPr>
+            <a:spLocks noGrp="1"/>
+          </p:cNvSpPr>
+          <p:nvPr>
+            <p:ph idx="1"/>
+          </p:nvPr>
+        </p:nvSpPr>
+        <p:spPr/>
+        <p:txBody>
+          <a:bodyPr/>
+          <a:lstStyle/>
+          <a:p>
+            <a:r>
+              <a:rPr lang="en-US" b="1" dirty="0"/>
+              <a:t>Task t1 = </a:t>
+            </a:r>
+            <a:r>
+              <a:rPr lang="en-US" b="1" dirty="0" err="1"/>
+              <a:t>Task.Run</a:t>
+            </a:r>
+            <a:r>
+              <a:rPr lang="en-US" b="1" dirty="0"/>
+              <a:t>(() =&gt; </a:t>
+            </a:r>
+            <a:r>
+              <a:rPr lang="en-US" b="1" dirty="0" err="1"/>
+              <a:t>DownloadFile</a:t>
+            </a:r>
+            <a:r>
+              <a:rPr lang="en-US" b="1" dirty="0"/>
+              <a:t>("file1.txt"));</a:t>
+            </a:r>
+          </a:p>
+          <a:p>
+            <a:r>
+              <a:rPr lang="en-US" b="1" dirty="0"/>
+              <a:t>Task t2 = </a:t>
+            </a:r>
+            <a:r>
+              <a:rPr lang="en-US" b="1" dirty="0" err="1"/>
+              <a:t>Task.Run</a:t>
+            </a:r>
+            <a:r>
+              <a:rPr lang="en-US" b="1" dirty="0"/>
+              <a:t>(() =&gt; </a:t>
+            </a:r>
+            <a:r>
+              <a:rPr lang="en-US" b="1" dirty="0" err="1"/>
+              <a:t>DownloadFile</a:t>
+            </a:r>
+            <a:r>
+              <a:rPr lang="en-US" b="1" dirty="0"/>
+              <a:t>("file2.txt"));</a:t>
+            </a:r>
+          </a:p>
+          <a:p>
+            <a:r>
+              <a:rPr lang="en-US" b="1" dirty="0"/>
+              <a:t>await </a:t>
+            </a:r>
+            <a:r>
+              <a:rPr lang="en-US" b="1" dirty="0" err="1"/>
+              <a:t>Task.WhenAll</a:t>
+            </a:r>
+            <a:r>
+              <a:rPr lang="en-US" b="1" dirty="0"/>
+              <a:t>(t1, t2);</a:t>
+            </a:r>
+          </a:p>
+          <a:p>
+            <a:endParaRPr lang="en-US" b="1" dirty="0"/>
+          </a:p>
+          <a:p>
+            <a:endParaRPr lang="en-US" dirty="0"/>
+          </a:p>
+        </p:txBody>
+      </p:sp>
+    </p:spTree>
+    <p:extLst>
+      <p:ext uri="{BB962C8B-B14F-4D97-AF65-F5344CB8AC3E}">
+        <p14:creationId xmlns:p14="http://schemas.microsoft.com/office/powerpoint/2010/main" val="3274640258"/>
       </p:ext>
     </p:extLst>
   </p:cSld>
@@ -8910,6 +10430,208 @@
     <p:extLst>
       <p:ext uri="{BB962C8B-B14F-4D97-AF65-F5344CB8AC3E}">
         <p14:creationId xmlns:p14="http://schemas.microsoft.com/office/powerpoint/2010/main" val="265522590"/>
+      </p:ext>
+    </p:extLst>
+  </p:cSld>
+  <p:clrMapOvr>
+    <a:masterClrMapping/>
+  </p:clrMapOvr>
+</p:sld>
+</file>
+
+<file path=ppt/slides/slide20.xml><?xml version="1.0" encoding="utf-8"?>
+<p:sld xmlns:a="http://schemas.openxmlformats.org/drawingml/2006/main" xmlns:r="http://schemas.openxmlformats.org/officeDocument/2006/relationships" xmlns:p="http://schemas.openxmlformats.org/presentationml/2006/main">
+  <p:cSld>
+    <p:spTree>
+      <p:nvGrpSpPr>
+        <p:cNvPr id="1" name=""/>
+        <p:cNvGrpSpPr/>
+        <p:nvPr/>
+      </p:nvGrpSpPr>
+      <p:grpSpPr>
+        <a:xfrm>
+          <a:off x="0" y="0"/>
+          <a:ext cx="0" cy="0"/>
+          <a:chOff x="0" y="0"/>
+          <a:chExt cx="0" cy="0"/>
+        </a:xfrm>
+      </p:grpSpPr>
+      <p:sp>
+        <p:nvSpPr>
+          <p:cNvPr id="2" name="Title 1">
+            <a:extLst>
+              <a:ext uri="{FF2B5EF4-FFF2-40B4-BE49-F238E27FC236}">
+                <a16:creationId xmlns:a16="http://schemas.microsoft.com/office/drawing/2014/main" id="{6441C4E9-A17A-9AAD-74EA-CBF2F97F2735}"/>
+              </a:ext>
+            </a:extLst>
+          </p:cNvPr>
+          <p:cNvSpPr>
+            <a:spLocks noGrp="1"/>
+          </p:cNvSpPr>
+          <p:nvPr>
+            <p:ph type="title"/>
+          </p:nvPr>
+        </p:nvSpPr>
+        <p:spPr/>
+        <p:txBody>
+          <a:bodyPr/>
+          <a:lstStyle/>
+          <a:p>
+            <a:r>
+              <a:rPr lang="en-US" dirty="0"/>
+              <a:t>Why Task over Thread Today</a:t>
+            </a:r>
+          </a:p>
+        </p:txBody>
+      </p:sp>
+      <p:graphicFrame>
+        <p:nvGraphicFramePr>
+          <p:cNvPr id="4" name="Content Placeholder 3">
+            <a:extLst>
+              <a:ext uri="{FF2B5EF4-FFF2-40B4-BE49-F238E27FC236}">
+                <a16:creationId xmlns:a16="http://schemas.microsoft.com/office/drawing/2014/main" id="{51B2F9D1-6D2F-8371-E608-8B138A357075}"/>
+              </a:ext>
+            </a:extLst>
+          </p:cNvPr>
+          <p:cNvGraphicFramePr>
+            <a:graphicFrameLocks noGrp="1"/>
+          </p:cNvGraphicFramePr>
+          <p:nvPr>
+            <p:ph idx="1"/>
+            <p:extLst>
+              <p:ext uri="{D42A27DB-BD31-4B8C-83A1-F6EECF244321}">
+                <p14:modId xmlns:p14="http://schemas.microsoft.com/office/powerpoint/2010/main" val="3474077815"/>
+              </p:ext>
+            </p:extLst>
+          </p:nvPr>
+        </p:nvGraphicFramePr>
+        <p:xfrm>
+          <a:off x="1096963" y="2108200"/>
+          <a:ext cx="10058400" cy="1854200"/>
+        </p:xfrm>
+        <a:graphic>
+          <a:graphicData uri="http://schemas.openxmlformats.org/drawingml/2006/table">
+            <a:tbl>
+              <a:tblPr firstRow="1" bandRow="1">
+                <a:tableStyleId>{5C22544A-7EE6-4342-B048-85BDC9FD1C3A}</a:tableStyleId>
+              </a:tblPr>
+              <a:tblGrid>
+                <a:gridCol w="10058400">
+                  <a:extLst>
+                    <a:ext uri="{9D8B030D-6E8A-4147-A177-3AD203B41FA5}">
+                      <a16:colId xmlns:a16="http://schemas.microsoft.com/office/drawing/2014/main" val="888329694"/>
+                    </a:ext>
+                  </a:extLst>
+                </a:gridCol>
+              </a:tblGrid>
+              <a:tr h="370840">
+                <a:tc>
+                  <a:txBody>
+                    <a:bodyPr/>
+                    <a:lstStyle/>
+                    <a:p>
+                      <a:r>
+                        <a:rPr lang="en-US" dirty="0"/>
+                        <a:t>Why Task over Thread Today</a:t>
+                      </a:r>
+                    </a:p>
+                  </a:txBody>
+                  <a:tcPr/>
+                </a:tc>
+                <a:extLst>
+                  <a:ext uri="{0D108BD9-81ED-4DB2-BD59-A6C34878D82A}">
+                    <a16:rowId xmlns:a16="http://schemas.microsoft.com/office/drawing/2014/main" val="3254341812"/>
+                  </a:ext>
+                </a:extLst>
+              </a:tr>
+              <a:tr h="370840">
+                <a:tc>
+                  <a:txBody>
+                    <a:bodyPr/>
+                    <a:lstStyle/>
+                    <a:p>
+                      <a:r>
+                        <a:rPr lang="en-US" dirty="0"/>
+                        <a:t>Less error-prone</a:t>
+                      </a:r>
+                    </a:p>
+                  </a:txBody>
+                  <a:tcPr/>
+                </a:tc>
+                <a:extLst>
+                  <a:ext uri="{0D108BD9-81ED-4DB2-BD59-A6C34878D82A}">
+                    <a16:rowId xmlns:a16="http://schemas.microsoft.com/office/drawing/2014/main" val="2956829529"/>
+                  </a:ext>
+                </a:extLst>
+              </a:tr>
+              <a:tr h="370840">
+                <a:tc>
+                  <a:txBody>
+                    <a:bodyPr/>
+                    <a:lstStyle/>
+                    <a:p>
+                      <a:r>
+                        <a:rPr lang="en-US" dirty="0"/>
+                        <a:t>More scalable.</a:t>
+                      </a:r>
+                    </a:p>
+                  </a:txBody>
+                  <a:tcPr/>
+                </a:tc>
+                <a:extLst>
+                  <a:ext uri="{0D108BD9-81ED-4DB2-BD59-A6C34878D82A}">
+                    <a16:rowId xmlns:a16="http://schemas.microsoft.com/office/drawing/2014/main" val="2946631268"/>
+                  </a:ext>
+                </a:extLst>
+              </a:tr>
+              <a:tr h="370840">
+                <a:tc>
+                  <a:txBody>
+                    <a:bodyPr/>
+                    <a:lstStyle/>
+                    <a:p>
+                      <a:r>
+                        <a:rPr lang="en-US" dirty="0"/>
+                        <a:t>Integrates with async/await.</a:t>
+                      </a:r>
+                    </a:p>
+                  </a:txBody>
+                  <a:tcPr/>
+                </a:tc>
+                <a:extLst>
+                  <a:ext uri="{0D108BD9-81ED-4DB2-BD59-A6C34878D82A}">
+                    <a16:rowId xmlns:a16="http://schemas.microsoft.com/office/drawing/2014/main" val="9965065"/>
+                  </a:ext>
+                </a:extLst>
+              </a:tr>
+              <a:tr h="370840">
+                <a:tc>
+                  <a:txBody>
+                    <a:bodyPr/>
+                    <a:lstStyle/>
+                    <a:p>
+                      <a:r>
+                        <a:rPr lang="en-US" dirty="0"/>
+                        <a:t>Built-in support for performance optimization and system resource reuse.</a:t>
+                      </a:r>
+                    </a:p>
+                  </a:txBody>
+                  <a:tcPr/>
+                </a:tc>
+                <a:extLst>
+                  <a:ext uri="{0D108BD9-81ED-4DB2-BD59-A6C34878D82A}">
+                    <a16:rowId xmlns:a16="http://schemas.microsoft.com/office/drawing/2014/main" val="1190679673"/>
+                  </a:ext>
+                </a:extLst>
+              </a:tr>
+            </a:tbl>
+          </a:graphicData>
+        </a:graphic>
+      </p:graphicFrame>
+    </p:spTree>
+    <p:extLst>
+      <p:ext uri="{BB962C8B-B14F-4D97-AF65-F5344CB8AC3E}">
+        <p14:creationId xmlns:p14="http://schemas.microsoft.com/office/powerpoint/2010/main" val="4274328439"/>
       </p:ext>
     </p:extLst>
   </p:cSld>
@@ -10788,24 +12510,6 @@
 </file>
 
 <file path=customXml/item1.xml><?xml version="1.0" encoding="utf-8"?>
-<p:properties xmlns:p="http://schemas.microsoft.com/office/2006/metadata/properties" xmlns:xsi="http://www.w3.org/2001/XMLSchema-instance" xmlns:pc="http://schemas.microsoft.com/office/infopath/2007/PartnerControls">
-  <documentManagement>
-    <Status xmlns="71af3243-3dd4-4a8d-8c0d-dd76da1f02a5">Not started</Status>
-    <MediaServiceKeyPoints xmlns="71af3243-3dd4-4a8d-8c0d-dd76da1f02a5" xsi:nil="true"/>
-  </documentManagement>
-</p:properties>
-</file>
-
-<file path=customXml/item2.xml><?xml version="1.0" encoding="utf-8"?>
-<?mso-contentType ?>
-<FormTemplates xmlns="http://schemas.microsoft.com/sharepoint/v3/contenttype/forms">
-  <Display>DocumentLibraryForm</Display>
-  <Edit>DocumentLibraryForm</Edit>
-  <New>DocumentLibraryForm</New>
-</FormTemplates>
-</file>
-
-<file path=customXml/item3.xml><?xml version="1.0" encoding="utf-8"?>
 <ct:contentTypeSchema xmlns:ct="http://schemas.microsoft.com/office/2006/metadata/contentType" xmlns:ma="http://schemas.microsoft.com/office/2006/metadata/properties/metaAttributes" ct:_="" ma:_="" ma:contentTypeName="Document" ma:contentTypeID="0x01010079F111ED35F8CC479449609E8A0923A6" ma:contentTypeVersion="12" ma:contentTypeDescription="Create a new document." ma:contentTypeScope="" ma:versionID="a410dd7f93c95333ffa1b60ed6adedd1">
   <xsd:schema xmlns:xsd="http://www.w3.org/2001/XMLSchema" xmlns:xs="http://www.w3.org/2001/XMLSchema" xmlns:p="http://schemas.microsoft.com/office/2006/metadata/properties" xmlns:ns2="71af3243-3dd4-4a8d-8c0d-dd76da1f02a5" xmlns:ns3="16c05727-aa75-4e4a-9b5f-8a80a1165891" targetNamespace="http://schemas.microsoft.com/office/2006/metadata/properties" ma:root="true" ma:fieldsID="a936d9baba76aa3866493feff160faab" ns2:_="" ns3:_="">
     <xsd:import namespace="71af3243-3dd4-4a8d-8c0d-dd76da1f02a5"/>
@@ -11026,25 +12730,25 @@
 </ct:contentTypeSchema>
 </file>
 
-<file path=customXml/itemProps1.xml><?xml version="1.0" encoding="utf-8"?>
-<ds:datastoreItem xmlns:ds="http://schemas.openxmlformats.org/officeDocument/2006/customXml" ds:itemID="{8F3CD65D-61A5-43C9-A837-6EC73C7DA8AB}">
-  <ds:schemaRefs>
-    <ds:schemaRef ds:uri="http://schemas.microsoft.com/office/2006/metadata/properties"/>
-    <ds:schemaRef ds:uri="http://schemas.microsoft.com/office/infopath/2007/PartnerControls"/>
-    <ds:schemaRef ds:uri="71af3243-3dd4-4a8d-8c0d-dd76da1f02a5"/>
-  </ds:schemaRefs>
-</ds:datastoreItem>
+<file path=customXml/item2.xml><?xml version="1.0" encoding="utf-8"?>
+<?mso-contentType ?>
+<FormTemplates xmlns="http://schemas.microsoft.com/sharepoint/v3/contenttype/forms">
+  <Display>DocumentLibraryForm</Display>
+  <Edit>DocumentLibraryForm</Edit>
+  <New>DocumentLibraryForm</New>
+</FormTemplates>
 </file>
 
-<file path=customXml/itemProps2.xml><?xml version="1.0" encoding="utf-8"?>
-<ds:datastoreItem xmlns:ds="http://schemas.openxmlformats.org/officeDocument/2006/customXml" ds:itemID="{31F006B4-A9E1-4F39-85C8-FB836F919348}">
-  <ds:schemaRefs>
-    <ds:schemaRef ds:uri="http://schemas.microsoft.com/sharepoint/v3/contenttype/forms"/>
-  </ds:schemaRefs>
-</ds:datastoreItem>
+<file path=customXml/item3.xml><?xml version="1.0" encoding="utf-8"?>
+<p:properties xmlns:p="http://schemas.microsoft.com/office/2006/metadata/properties" xmlns:xsi="http://www.w3.org/2001/XMLSchema-instance" xmlns:pc="http://schemas.microsoft.com/office/infopath/2007/PartnerControls">
+  <documentManagement>
+    <Status xmlns="71af3243-3dd4-4a8d-8c0d-dd76da1f02a5">Not started</Status>
+    <MediaServiceKeyPoints xmlns="71af3243-3dd4-4a8d-8c0d-dd76da1f02a5" xsi:nil="true"/>
+  </documentManagement>
+</p:properties>
 </file>
 
-<file path=customXml/itemProps3.xml><?xml version="1.0" encoding="utf-8"?>
+<file path=customXml/itemProps1.xml><?xml version="1.0" encoding="utf-8"?>
 <ds:datastoreItem xmlns:ds="http://schemas.openxmlformats.org/officeDocument/2006/customXml" ds:itemID="{16377351-63A1-4C2E-8C9A-66CDD70F16AC}">
   <ds:schemaRefs>
     <ds:schemaRef ds:uri="http://schemas.microsoft.com/office/2006/metadata/contentType"/>
@@ -11061,4 +12765,22 @@
     <ds:schemaRef ds:uri="http://schemas.microsoft.com/internal/obd"/>
   </ds:schemaRefs>
 </ds:datastoreItem>
+</file>
+
+<file path=customXml/itemProps2.xml><?xml version="1.0" encoding="utf-8"?>
+<ds:datastoreItem xmlns:ds="http://schemas.openxmlformats.org/officeDocument/2006/customXml" ds:itemID="{31F006B4-A9E1-4F39-85C8-FB836F919348}">
+  <ds:schemaRefs>
+    <ds:schemaRef ds:uri="http://schemas.microsoft.com/sharepoint/v3/contenttype/forms"/>
+  </ds:schemaRefs>
+</ds:datastoreItem>
+</file>
+
+<file path=customXml/itemProps3.xml><?xml version="1.0" encoding="utf-8"?>
+<ds:datastoreItem xmlns:ds="http://schemas.openxmlformats.org/officeDocument/2006/customXml" ds:itemID="{8F3CD65D-61A5-43C9-A837-6EC73C7DA8AB}">
+  <ds:schemaRefs>
+    <ds:schemaRef ds:uri="http://schemas.microsoft.com/office/2006/metadata/properties"/>
+    <ds:schemaRef ds:uri="http://schemas.microsoft.com/office/infopath/2007/PartnerControls"/>
+    <ds:schemaRef ds:uri="71af3243-3dd4-4a8d-8c0d-dd76da1f02a5"/>
+  </ds:schemaRefs>
+</ds:datastoreItem>
 </file>
</xml_diff>

<commit_message>
Updating Simple Async Await
</commit_message>
<xml_diff>
--- a/PPT/Mastering Multithreading in DotNet.pptx
+++ b/PPT/Mastering Multithreading in DotNet.pptx
@@ -25,6 +25,7 @@
     <p:sldId id="324" r:id="rId22"/>
     <p:sldId id="325" r:id="rId23"/>
     <p:sldId id="326" r:id="rId24"/>
+    <p:sldId id="327" r:id="rId25"/>
   </p:sldIdLst>
   <p:sldSz cx="12192000" cy="6858000"/>
   <p:notesSz cx="6858000" cy="9144000"/>
@@ -3369,7 +3370,7 @@
           <a:p>
             <a:fld id="{9184DA70-C731-4C70-880D-CCD4705E623C}" type="datetime1">
               <a:rPr lang="en-US" smtClean="0"/>
-              <a:t>5/6/2025</a:t>
+              <a:t>5/9/2025</a:t>
             </a:fld>
             <a:endParaRPr lang="en-US" dirty="0"/>
           </a:p>
@@ -3557,7 +3558,7 @@
           <a:p>
             <a:fld id="{4BE1D723-8F53-4F53-90B0-1982A396982E}" type="datetime1">
               <a:rPr lang="en-US" smtClean="0"/>
-              <a:t>5/6/2025</a:t>
+              <a:t>5/9/2025</a:t>
             </a:fld>
             <a:endParaRPr lang="en-US" dirty="0"/>
           </a:p>
@@ -3930,7 +3931,7 @@
           <a:p>
             <a:fld id="{97669AF7-7BEB-44E4-9852-375E34362B5B}" type="datetime1">
               <a:rPr lang="en-US" smtClean="0"/>
-              <a:t>5/6/2025</a:t>
+              <a:t>5/9/2025</a:t>
             </a:fld>
             <a:endParaRPr lang="en-US" dirty="0"/>
           </a:p>
@@ -4185,7 +4186,7 @@
           <a:p>
             <a:fld id="{BAAAC38D-0552-4C82-B593-E6124DFADBE2}" type="datetime1">
               <a:rPr lang="en-US" smtClean="0"/>
-              <a:t>5/6/2025</a:t>
+              <a:t>5/9/2025</a:t>
             </a:fld>
             <a:endParaRPr lang="en-US" dirty="0"/>
           </a:p>
@@ -4582,7 +4583,7 @@
           <a:p>
             <a:fld id="{D9DF0F1C-5577-4ACB-BB62-DF8F3C494C7E}" type="datetime1">
               <a:rPr lang="en-US" smtClean="0"/>
-              <a:t>5/6/2025</a:t>
+              <a:t>5/9/2025</a:t>
             </a:fld>
             <a:endParaRPr lang="en-US" dirty="0"/>
           </a:p>
@@ -4718,7 +4719,7 @@
           <a:p>
             <a:fld id="{1775B394-D9F9-4F0C-B15D-605F45CB9E9F}" type="datetime1">
               <a:rPr lang="en-US" smtClean="0"/>
-              <a:t>5/6/2025</a:t>
+              <a:t>5/9/2025</a:t>
             </a:fld>
             <a:endParaRPr lang="en-US" dirty="0"/>
           </a:p>
@@ -4875,7 +4876,7 @@
           <a:p>
             <a:fld id="{39667345-2558-425A-8533-9BFDBCE15005}" type="datetime1">
               <a:rPr lang="en-US" smtClean="0"/>
-              <a:t>5/6/2025</a:t>
+              <a:t>5/9/2025</a:t>
             </a:fld>
             <a:endParaRPr lang="en-US" dirty="0"/>
           </a:p>
@@ -5204,7 +5205,7 @@
           <a:p>
             <a:fld id="{92BEA474-078D-4E9B-9B14-09A87B19DC46}" type="datetime1">
               <a:rPr lang="en-US" smtClean="0"/>
-              <a:t>5/6/2025</a:t>
+              <a:t>5/9/2025</a:t>
             </a:fld>
             <a:endParaRPr lang="en-US" dirty="0"/>
           </a:p>
@@ -5554,7 +5555,7 @@
           <a:p>
             <a:fld id="{4907D986-8816-4272-A432-0437A28A9828}" type="datetime1">
               <a:rPr lang="en-US" smtClean="0"/>
-              <a:t>5/6/2025</a:t>
+              <a:t>5/9/2025</a:t>
             </a:fld>
             <a:endParaRPr lang="en-US" dirty="0"/>
           </a:p>
@@ -5815,7 +5816,7 @@
           <a:p>
             <a:fld id="{62D6E202-B606-4609-B914-27C9371A1F6D}" type="datetime1">
               <a:rPr lang="en-US" smtClean="0"/>
-              <a:t>5/6/2025</a:t>
+              <a:t>5/9/2025</a:t>
             </a:fld>
             <a:endParaRPr lang="en-US" dirty="0"/>
           </a:p>
@@ -10641,6 +10642,257 @@
 </p:sld>
 </file>
 
+<file path=ppt/slides/slide21.xml><?xml version="1.0" encoding="utf-8"?>
+<p:sld xmlns:a="http://schemas.openxmlformats.org/drawingml/2006/main" xmlns:r="http://schemas.openxmlformats.org/officeDocument/2006/relationships" xmlns:p="http://schemas.openxmlformats.org/presentationml/2006/main">
+  <p:cSld>
+    <p:spTree>
+      <p:nvGrpSpPr>
+        <p:cNvPr id="1" name=""/>
+        <p:cNvGrpSpPr/>
+        <p:nvPr/>
+      </p:nvGrpSpPr>
+      <p:grpSpPr>
+        <a:xfrm>
+          <a:off x="0" y="0"/>
+          <a:ext cx="0" cy="0"/>
+          <a:chOff x="0" y="0"/>
+          <a:chExt cx="0" cy="0"/>
+        </a:xfrm>
+      </p:grpSpPr>
+      <p:sp>
+        <p:nvSpPr>
+          <p:cNvPr id="2" name="Title 1">
+            <a:extLst>
+              <a:ext uri="{FF2B5EF4-FFF2-40B4-BE49-F238E27FC236}">
+                <a16:creationId xmlns:a16="http://schemas.microsoft.com/office/drawing/2014/main" id="{AB862BDB-662F-9A33-06D4-AAE2DC597947}"/>
+              </a:ext>
+            </a:extLst>
+          </p:cNvPr>
+          <p:cNvSpPr>
+            <a:spLocks noGrp="1"/>
+          </p:cNvSpPr>
+          <p:nvPr>
+            <p:ph type="title"/>
+          </p:nvPr>
+        </p:nvSpPr>
+        <p:spPr/>
+        <p:txBody>
+          <a:bodyPr/>
+          <a:lstStyle/>
+          <a:p>
+            <a:r>
+              <a:rPr lang="en-US" dirty="0"/>
+              <a:t>When to Use What</a:t>
+            </a:r>
+          </a:p>
+        </p:txBody>
+      </p:sp>
+      <p:graphicFrame>
+        <p:nvGraphicFramePr>
+          <p:cNvPr id="4" name="Content Placeholder 3">
+            <a:extLst>
+              <a:ext uri="{FF2B5EF4-FFF2-40B4-BE49-F238E27FC236}">
+                <a16:creationId xmlns:a16="http://schemas.microsoft.com/office/drawing/2014/main" id="{26069269-7D7C-E738-4E4A-001B9AD43EF6}"/>
+              </a:ext>
+            </a:extLst>
+          </p:cNvPr>
+          <p:cNvGraphicFramePr>
+            <a:graphicFrameLocks noGrp="1"/>
+          </p:cNvGraphicFramePr>
+          <p:nvPr>
+            <p:ph idx="1"/>
+            <p:extLst>
+              <p:ext uri="{D42A27DB-BD31-4B8C-83A1-F6EECF244321}">
+                <p14:modId xmlns:p14="http://schemas.microsoft.com/office/powerpoint/2010/main" val="1099646409"/>
+              </p:ext>
+            </p:extLst>
+          </p:nvPr>
+        </p:nvGraphicFramePr>
+        <p:xfrm>
+          <a:off x="1096963" y="2108200"/>
+          <a:ext cx="10058400" cy="1854200"/>
+        </p:xfrm>
+        <a:graphic>
+          <a:graphicData uri="http://schemas.openxmlformats.org/drawingml/2006/table">
+            <a:tbl>
+              <a:tblPr firstRow="1" bandRow="1">
+                <a:tableStyleId>{5C22544A-7EE6-4342-B048-85BDC9FD1C3A}</a:tableStyleId>
+              </a:tblPr>
+              <a:tblGrid>
+                <a:gridCol w="10058400">
+                  <a:extLst>
+                    <a:ext uri="{9D8B030D-6E8A-4147-A177-3AD203B41FA5}">
+                      <a16:colId xmlns:a16="http://schemas.microsoft.com/office/drawing/2014/main" val="2318198136"/>
+                    </a:ext>
+                  </a:extLst>
+                </a:gridCol>
+              </a:tblGrid>
+              <a:tr h="370840">
+                <a:tc>
+                  <a:txBody>
+                    <a:bodyPr/>
+                    <a:lstStyle/>
+                    <a:p>
+                      <a:endParaRPr lang="en-US"/>
+                    </a:p>
+                  </a:txBody>
+                  <a:tcPr/>
+                </a:tc>
+                <a:extLst>
+                  <a:ext uri="{0D108BD9-81ED-4DB2-BD59-A6C34878D82A}">
+                    <a16:rowId xmlns:a16="http://schemas.microsoft.com/office/drawing/2014/main" val="1393175015"/>
+                  </a:ext>
+                </a:extLst>
+              </a:tr>
+              <a:tr h="370840">
+                <a:tc>
+                  <a:txBody>
+                    <a:bodyPr/>
+                    <a:lstStyle/>
+                    <a:p>
+                      <a:r>
+                        <a:rPr lang="en-US" b="1" dirty="0"/>
+                        <a:t>Use Thread</a:t>
+                      </a:r>
+                      <a:r>
+                        <a:rPr lang="en-US" dirty="0"/>
+                        <a:t> if you need </a:t>
+                      </a:r>
+                      <a:r>
+                        <a:rPr lang="en-US" i="1" dirty="0"/>
+                        <a:t>long-running, dedicated threads</a:t>
+                      </a:r>
+                      <a:r>
+                        <a:rPr lang="en-US" dirty="0"/>
+                        <a:t> with full control.</a:t>
+                      </a:r>
+                    </a:p>
+                  </a:txBody>
+                  <a:tcPr/>
+                </a:tc>
+                <a:extLst>
+                  <a:ext uri="{0D108BD9-81ED-4DB2-BD59-A6C34878D82A}">
+                    <a16:rowId xmlns:a16="http://schemas.microsoft.com/office/drawing/2014/main" val="1703240609"/>
+                  </a:ext>
+                </a:extLst>
+              </a:tr>
+              <a:tr h="370840">
+                <a:tc>
+                  <a:txBody>
+                    <a:bodyPr/>
+                    <a:lstStyle/>
+                    <a:p>
+                      <a:r>
+                        <a:rPr lang="en-US" b="1" dirty="0"/>
+                        <a:t>Use </a:t>
+                      </a:r>
+                      <a:r>
+                        <a:rPr lang="en-US" b="1" dirty="0" err="1"/>
+                        <a:t>ThreadPool</a:t>
+                      </a:r>
+                      <a:r>
+                        <a:rPr lang="en-US" dirty="0"/>
+                        <a:t> for </a:t>
+                      </a:r>
+                      <a:r>
+                        <a:rPr lang="en-US" i="1" dirty="0"/>
+                        <a:t>fire-and-forget background work</a:t>
+                      </a:r>
+                      <a:r>
+                        <a:rPr lang="en-US" dirty="0"/>
+                        <a:t>.</a:t>
+                      </a:r>
+                    </a:p>
+                  </a:txBody>
+                  <a:tcPr/>
+                </a:tc>
+                <a:extLst>
+                  <a:ext uri="{0D108BD9-81ED-4DB2-BD59-A6C34878D82A}">
+                    <a16:rowId xmlns:a16="http://schemas.microsoft.com/office/drawing/2014/main" val="2478446949"/>
+                  </a:ext>
+                </a:extLst>
+              </a:tr>
+              <a:tr h="370840">
+                <a:tc>
+                  <a:txBody>
+                    <a:bodyPr/>
+                    <a:lstStyle/>
+                    <a:p>
+                      <a:r>
+                        <a:rPr lang="en-US" b="1" dirty="0"/>
+                        <a:t>Use Task</a:t>
+                      </a:r>
+                      <a:r>
+                        <a:rPr lang="en-US" dirty="0"/>
+                        <a:t> for </a:t>
+                      </a:r>
+                      <a:r>
+                        <a:rPr lang="en-US" i="1" dirty="0"/>
+                        <a:t>parallelism with return values and better exception handling</a:t>
+                      </a:r>
+                      <a:r>
+                        <a:rPr lang="en-US" dirty="0"/>
+                        <a:t>.</a:t>
+                      </a:r>
+                    </a:p>
+                  </a:txBody>
+                  <a:tcPr/>
+                </a:tc>
+                <a:extLst>
+                  <a:ext uri="{0D108BD9-81ED-4DB2-BD59-A6C34878D82A}">
+                    <a16:rowId xmlns:a16="http://schemas.microsoft.com/office/drawing/2014/main" val="2190615983"/>
+                  </a:ext>
+                </a:extLst>
+              </a:tr>
+              <a:tr h="370840">
+                <a:tc>
+                  <a:txBody>
+                    <a:bodyPr/>
+                    <a:lstStyle/>
+                    <a:p>
+                      <a:r>
+                        <a:rPr lang="en-US" b="1" dirty="0"/>
+                        <a:t>Use async/await</a:t>
+                      </a:r>
+                      <a:r>
+                        <a:rPr lang="en-US" dirty="0"/>
+                        <a:t> for </a:t>
+                      </a:r>
+                      <a:r>
+                        <a:rPr lang="en-US" i="1" dirty="0"/>
+                        <a:t>asynchronous IO</a:t>
+                      </a:r>
+                      <a:r>
+                        <a:rPr lang="en-US" dirty="0"/>
+                        <a:t>, cleaner code, and responsiveness.</a:t>
+                      </a:r>
+                    </a:p>
+                  </a:txBody>
+                  <a:tcPr/>
+                </a:tc>
+                <a:extLst>
+                  <a:ext uri="{0D108BD9-81ED-4DB2-BD59-A6C34878D82A}">
+                    <a16:rowId xmlns:a16="http://schemas.microsoft.com/office/drawing/2014/main" val="2712573506"/>
+                  </a:ext>
+                </a:extLst>
+              </a:tr>
+            </a:tbl>
+          </a:graphicData>
+        </a:graphic>
+      </p:graphicFrame>
+    </p:spTree>
+    <p:extLst>
+      <p:ext uri="{BB962C8B-B14F-4D97-AF65-F5344CB8AC3E}">
+        <p14:creationId xmlns:p14="http://schemas.microsoft.com/office/powerpoint/2010/main" val="2027151557"/>
+      </p:ext>
+    </p:extLst>
+  </p:cSld>
+  <p:clrMapOvr>
+    <a:masterClrMapping/>
+  </p:clrMapOvr>
+</p:sld>
+</file>
+
 <file path=ppt/slides/slide3.xml><?xml version="1.0" encoding="utf-8"?>
 <p:sld xmlns:a="http://schemas.openxmlformats.org/drawingml/2006/main" xmlns:r="http://schemas.openxmlformats.org/officeDocument/2006/relationships" xmlns:p="http://schemas.openxmlformats.org/presentationml/2006/main">
   <p:cSld>
@@ -12510,6 +12762,15 @@
 </file>
 
 <file path=customXml/item1.xml><?xml version="1.0" encoding="utf-8"?>
+<?mso-contentType ?>
+<FormTemplates xmlns="http://schemas.microsoft.com/sharepoint/v3/contenttype/forms">
+  <Display>DocumentLibraryForm</Display>
+  <Edit>DocumentLibraryForm</Edit>
+  <New>DocumentLibraryForm</New>
+</FormTemplates>
+</file>
+
+<file path=customXml/item2.xml><?xml version="1.0" encoding="utf-8"?>
 <ct:contentTypeSchema xmlns:ct="http://schemas.microsoft.com/office/2006/metadata/contentType" xmlns:ma="http://schemas.microsoft.com/office/2006/metadata/properties/metaAttributes" ct:_="" ma:_="" ma:contentTypeName="Document" ma:contentTypeID="0x01010079F111ED35F8CC479449609E8A0923A6" ma:contentTypeVersion="12" ma:contentTypeDescription="Create a new document." ma:contentTypeScope="" ma:versionID="a410dd7f93c95333ffa1b60ed6adedd1">
   <xsd:schema xmlns:xsd="http://www.w3.org/2001/XMLSchema" xmlns:xs="http://www.w3.org/2001/XMLSchema" xmlns:p="http://schemas.microsoft.com/office/2006/metadata/properties" xmlns:ns2="71af3243-3dd4-4a8d-8c0d-dd76da1f02a5" xmlns:ns3="16c05727-aa75-4e4a-9b5f-8a80a1165891" targetNamespace="http://schemas.microsoft.com/office/2006/metadata/properties" ma:root="true" ma:fieldsID="a936d9baba76aa3866493feff160faab" ns2:_="" ns3:_="">
     <xsd:import namespace="71af3243-3dd4-4a8d-8c0d-dd76da1f02a5"/>
@@ -12730,15 +12991,6 @@
 </ct:contentTypeSchema>
 </file>
 
-<file path=customXml/item2.xml><?xml version="1.0" encoding="utf-8"?>
-<?mso-contentType ?>
-<FormTemplates xmlns="http://schemas.microsoft.com/sharepoint/v3/contenttype/forms">
-  <Display>DocumentLibraryForm</Display>
-  <Edit>DocumentLibraryForm</Edit>
-  <New>DocumentLibraryForm</New>
-</FormTemplates>
-</file>
-
 <file path=customXml/item3.xml><?xml version="1.0" encoding="utf-8"?>
 <p:properties xmlns:p="http://schemas.microsoft.com/office/2006/metadata/properties" xmlns:xsi="http://www.w3.org/2001/XMLSchema-instance" xmlns:pc="http://schemas.microsoft.com/office/infopath/2007/PartnerControls">
   <documentManagement>
@@ -12749,6 +13001,14 @@
 </file>
 
 <file path=customXml/itemProps1.xml><?xml version="1.0" encoding="utf-8"?>
+<ds:datastoreItem xmlns:ds="http://schemas.openxmlformats.org/officeDocument/2006/customXml" ds:itemID="{31F006B4-A9E1-4F39-85C8-FB836F919348}">
+  <ds:schemaRefs>
+    <ds:schemaRef ds:uri="http://schemas.microsoft.com/sharepoint/v3/contenttype/forms"/>
+  </ds:schemaRefs>
+</ds:datastoreItem>
+</file>
+
+<file path=customXml/itemProps2.xml><?xml version="1.0" encoding="utf-8"?>
 <ds:datastoreItem xmlns:ds="http://schemas.openxmlformats.org/officeDocument/2006/customXml" ds:itemID="{16377351-63A1-4C2E-8C9A-66CDD70F16AC}">
   <ds:schemaRefs>
     <ds:schemaRef ds:uri="http://schemas.microsoft.com/office/2006/metadata/contentType"/>
@@ -12767,14 +13027,6 @@
 </ds:datastoreItem>
 </file>
 
-<file path=customXml/itemProps2.xml><?xml version="1.0" encoding="utf-8"?>
-<ds:datastoreItem xmlns:ds="http://schemas.openxmlformats.org/officeDocument/2006/customXml" ds:itemID="{31F006B4-A9E1-4F39-85C8-FB836F919348}">
-  <ds:schemaRefs>
-    <ds:schemaRef ds:uri="http://schemas.microsoft.com/sharepoint/v3/contenttype/forms"/>
-  </ds:schemaRefs>
-</ds:datastoreItem>
-</file>
-
 <file path=customXml/itemProps3.xml><?xml version="1.0" encoding="utf-8"?>
 <ds:datastoreItem xmlns:ds="http://schemas.openxmlformats.org/officeDocument/2006/customXml" ds:itemID="{8F3CD65D-61A5-43C9-A837-6EC73C7DA8AB}">
   <ds:schemaRefs>

</xml_diff>